<commit_message>
Modify Model class diagram to include EventList, DeadlineList and FloatingTaskList.
</commit_message>
<xml_diff>
--- a/docs/diagrams/ModelComponentClassDiagram.pptx
+++ b/docs/diagrams/ModelComponentClassDiagram.pptx
@@ -5,13 +5,12 @@
     <p:sldMasterId id="2147483648" r:id="rId1"/>
   </p:sldMasterIdLst>
   <p:notesMasterIdLst>
-    <p:notesMasterId r:id="rId6"/>
+    <p:notesMasterId r:id="rId5"/>
   </p:notesMasterIdLst>
   <p:sldIdLst>
     <p:sldId id="265" r:id="rId2"/>
     <p:sldId id="263" r:id="rId3"/>
     <p:sldId id="266" r:id="rId4"/>
-    <p:sldId id="267" r:id="rId5"/>
   </p:sldIdLst>
   <p:sldSz cx="9144000" cy="6858000" type="screen4x3"/>
   <p:notesSz cx="6858000" cy="9144000"/>
@@ -10837,7 +10836,7 @@
         </p:nvSpPr>
         <p:spPr>
           <a:xfrm>
-            <a:off x="6006879" y="1524000"/>
+            <a:off x="5994896" y="1524425"/>
             <a:ext cx="236048" cy="173380"/>
           </a:xfrm>
           <a:prstGeom prst="flowChartDecision">
@@ -10886,8 +10885,8 @@
         </p:nvCxnSpPr>
         <p:spPr>
           <a:xfrm>
-            <a:off x="6242927" y="1610690"/>
-            <a:ext cx="286243" cy="239658"/>
+            <a:off x="6230944" y="1611115"/>
+            <a:ext cx="298226" cy="239233"/>
           </a:xfrm>
           <a:prstGeom prst="bentConnector3">
             <a:avLst/>
@@ -11281,15 +11280,15 @@
           <p:cNvPr id="97" name="Elbow Connector 63"/>
           <p:cNvCxnSpPr>
             <a:cxnSpLocks/>
-            <a:stCxn id="99" idx="3"/>
+            <a:stCxn id="138" idx="3"/>
             <a:endCxn id="46" idx="0"/>
           </p:cNvCxnSpPr>
           <p:nvPr/>
         </p:nvCxnSpPr>
         <p:spPr>
           <a:xfrm rot="16200000" flipH="1">
-            <a:off x="3304062" y="1536226"/>
-            <a:ext cx="103181" cy="78"/>
+            <a:off x="3297348" y="1529513"/>
+            <a:ext cx="114374" cy="2311"/>
           </a:xfrm>
           <a:prstGeom prst="bentConnector3">
             <a:avLst>
@@ -11321,54 +11320,6 @@
           </a:fontRef>
         </p:style>
       </p:cxnSp>
-      <p:sp>
-        <p:nvSpPr>
-          <p:cNvPr id="99" name="Isosceles Triangle 102"/>
-          <p:cNvSpPr/>
-          <p:nvPr/>
-        </p:nvSpPr>
-        <p:spPr>
-          <a:xfrm rot="10800000" flipV="1">
-            <a:off x="3220361" y="1309152"/>
-            <a:ext cx="270504" cy="175523"/>
-          </a:xfrm>
-          <a:prstGeom prst="triangle">
-            <a:avLst/>
-          </a:prstGeom>
-          <a:ln w="19050">
-            <a:solidFill>
-              <a:srgbClr val="7030A0"/>
-            </a:solidFill>
-          </a:ln>
-          <a:effectLst/>
-        </p:spPr>
-        <p:style>
-          <a:lnRef idx="1">
-            <a:schemeClr val="accent4"/>
-          </a:lnRef>
-          <a:fillRef idx="2">
-            <a:schemeClr val="accent4"/>
-          </a:fillRef>
-          <a:effectRef idx="1">
-            <a:schemeClr val="accent4"/>
-          </a:effectRef>
-          <a:fontRef idx="minor">
-            <a:schemeClr val="dk1"/>
-          </a:fontRef>
-        </p:style>
-        <p:txBody>
-          <a:bodyPr rtlCol="0" anchor="ctr"/>
-          <a:lstStyle/>
-          <a:p>
-            <a:pPr algn="ctr"/>
-            <a:endParaRPr lang="en-SG" sz="1050" b="1">
-              <a:solidFill>
-                <a:srgbClr val="92D050"/>
-              </a:solidFill>
-            </a:endParaRPr>
-          </a:p>
-        </p:txBody>
-      </p:sp>
       <p:sp>
         <p:nvSpPr>
           <p:cNvPr id="100" name="Rectangle 8"/>
@@ -11878,45 +11829,6 @@
         <p:spPr>
           <a:xfrm>
             <a:off x="2585753" y="2346486"/>
-            <a:ext cx="189257" cy="178683"/>
-          </a:xfrm>
-          <a:prstGeom prst="rect">
-            <a:avLst/>
-          </a:prstGeom>
-          <a:noFill/>
-        </p:spPr>
-        <p:txBody>
-          <a:bodyPr wrap="square" lIns="0" tIns="0" rIns="0" bIns="0" rtlCol="0">
-            <a:noAutofit/>
-          </a:bodyPr>
-          <a:lstStyle/>
-          <a:p>
-            <a:pPr algn="ctr"/>
-            <a:r>
-              <a:rPr lang="en-US" sz="1100" dirty="0">
-                <a:solidFill>
-                  <a:srgbClr val="7030A0"/>
-                </a:solidFill>
-              </a:rPr>
-              <a:t>1</a:t>
-            </a:r>
-            <a:endParaRPr lang="en-SG" sz="1100" dirty="0">
-              <a:solidFill>
-                <a:srgbClr val="7030A0"/>
-              </a:solidFill>
-            </a:endParaRPr>
-          </a:p>
-        </p:txBody>
-      </p:sp>
-      <p:sp>
-        <p:nvSpPr>
-          <p:cNvPr id="70" name="TextBox 69"/>
-          <p:cNvSpPr txBox="1"/>
-          <p:nvPr/>
-        </p:nvSpPr>
-        <p:spPr>
-          <a:xfrm>
-            <a:off x="4154143" y="4546398"/>
             <a:ext cx="189257" cy="178683"/>
           </a:xfrm>
           <a:prstGeom prst="rect">
@@ -12395,8 +12307,8 @@
         </p:nvCxnSpPr>
         <p:spPr>
           <a:xfrm rot="10800000" flipV="1">
-            <a:off x="4765498" y="5484510"/>
-            <a:ext cx="1246854" cy="1262"/>
+            <a:off x="5138196" y="5484510"/>
+            <a:ext cx="874156" cy="1262"/>
           </a:xfrm>
           <a:prstGeom prst="bentConnector3">
             <a:avLst>
@@ -12445,8 +12357,8 @@
         </p:nvCxnSpPr>
         <p:spPr>
           <a:xfrm rot="10800000">
-            <a:off x="4135349" y="5621600"/>
-            <a:ext cx="2543042" cy="255308"/>
+            <a:off x="4508047" y="5621600"/>
+            <a:ext cx="2170344" cy="255308"/>
           </a:xfrm>
           <a:prstGeom prst="bentConnector2">
             <a:avLst/>
@@ -12489,7 +12401,7 @@
         </p:nvSpPr>
         <p:spPr>
           <a:xfrm>
-            <a:off x="3505200" y="5349944"/>
+            <a:off x="3877898" y="5349944"/>
             <a:ext cx="1260298" cy="271656"/>
           </a:xfrm>
           <a:prstGeom prst="rect">
@@ -12527,7 +12439,7 @@
                   <a:srgbClr val="7030A0"/>
                 </a:solidFill>
               </a:rPr>
-              <a:t>Java.util.Calendar</a:t>
+              <a:t>EntryDateAndTime</a:t>
             </a:r>
             <a:endParaRPr lang="en-SG" sz="1050" dirty="0">
               <a:solidFill>
@@ -12921,7 +12833,7 @@
         </p:nvSpPr>
         <p:spPr>
           <a:xfrm>
-            <a:off x="3897739" y="5705726"/>
+            <a:off x="4270437" y="5705726"/>
             <a:ext cx="189257" cy="178683"/>
           </a:xfrm>
           <a:prstGeom prst="rect">
@@ -12966,7 +12878,7 @@
         </p:nvSpPr>
         <p:spPr>
           <a:xfrm>
-            <a:off x="4848245" y="5280627"/>
+            <a:off x="5220943" y="5280627"/>
             <a:ext cx="189257" cy="178683"/>
           </a:xfrm>
           <a:prstGeom prst="rect">
@@ -13473,7 +13385,6 @@
           </p:cNvPr>
           <p:cNvCxnSpPr>
             <a:cxnSpLocks/>
-            <a:stCxn id="115" idx="3"/>
             <a:endCxn id="49" idx="1"/>
           </p:cNvCxnSpPr>
           <p:nvPr/>
@@ -13513,60 +13424,6 @@
           </a:fontRef>
         </p:style>
       </p:cxnSp>
-      <p:sp>
-        <p:nvSpPr>
-          <p:cNvPr id="115" name="Isosceles Triangle 102">
-            <a:extLst>
-              <a:ext uri="{FF2B5EF4-FFF2-40B4-BE49-F238E27FC236}">
-                <a16:creationId xmlns:a16="http://schemas.microsoft.com/office/drawing/2014/main" id="{CEC3CD33-62F4-457F-B391-47EC0406E552}"/>
-              </a:ext>
-            </a:extLst>
-          </p:cNvPr>
-          <p:cNvSpPr/>
-          <p:nvPr/>
-        </p:nvSpPr>
-        <p:spPr>
-          <a:xfrm rot="5400000" flipV="1">
-            <a:off x="3755551" y="2790691"/>
-            <a:ext cx="270504" cy="175523"/>
-          </a:xfrm>
-          <a:prstGeom prst="triangle">
-            <a:avLst/>
-          </a:prstGeom>
-          <a:ln w="19050">
-            <a:solidFill>
-              <a:srgbClr val="7030A0"/>
-            </a:solidFill>
-          </a:ln>
-          <a:effectLst/>
-        </p:spPr>
-        <p:style>
-          <a:lnRef idx="1">
-            <a:schemeClr val="accent4"/>
-          </a:lnRef>
-          <a:fillRef idx="2">
-            <a:schemeClr val="accent4"/>
-          </a:fillRef>
-          <a:effectRef idx="1">
-            <a:schemeClr val="accent4"/>
-          </a:effectRef>
-          <a:fontRef idx="minor">
-            <a:schemeClr val="dk1"/>
-          </a:fontRef>
-        </p:style>
-        <p:txBody>
-          <a:bodyPr rtlCol="0" anchor="ctr"/>
-          <a:lstStyle/>
-          <a:p>
-            <a:pPr algn="ctr"/>
-            <a:endParaRPr lang="en-SG" sz="1050" b="1">
-              <a:solidFill>
-                <a:srgbClr val="92D050"/>
-              </a:solidFill>
-            </a:endParaRPr>
-          </a:p>
-        </p:txBody>
-      </p:sp>
       <p:cxnSp>
         <p:nvCxnSpPr>
           <p:cNvPr id="136" name="Elbow Connector 63">
@@ -13578,7 +13435,6 @@
           </p:cNvPr>
           <p:cNvCxnSpPr>
             <a:cxnSpLocks/>
-            <a:stCxn id="115" idx="3"/>
             <a:endCxn id="84" idx="1"/>
           </p:cNvCxnSpPr>
           <p:nvPr/>
@@ -13629,14 +13485,13 @@
           </p:cNvPr>
           <p:cNvCxnSpPr>
             <a:cxnSpLocks/>
-            <a:stCxn id="115" idx="3"/>
           </p:cNvCxnSpPr>
           <p:nvPr/>
         </p:nvCxnSpPr>
         <p:spPr>
-          <a:xfrm flipV="1">
-            <a:off x="3978565" y="2874550"/>
-            <a:ext cx="836608" cy="3903"/>
+          <a:xfrm>
+            <a:off x="3978565" y="2878453"/>
+            <a:ext cx="827933" cy="897"/>
           </a:xfrm>
           <a:prstGeom prst="bentConnector3">
             <a:avLst>
@@ -14150,7 +14005,6 @@
           </p:cNvPr>
           <p:cNvCxnSpPr>
             <a:cxnSpLocks/>
-            <a:stCxn id="115" idx="3"/>
           </p:cNvCxnSpPr>
           <p:nvPr/>
         </p:nvCxnSpPr>
@@ -14413,637 +14267,356 @@
           </a:fontRef>
         </p:style>
       </p:cxnSp>
-    </p:spTree>
-    <p:extLst>
-      <p:ext uri="{BB962C8B-B14F-4D97-AF65-F5344CB8AC3E}">
-        <p14:creationId xmlns:p14="http://schemas.microsoft.com/office/powerpoint/2010/main" val="1794726962"/>
-      </p:ext>
-    </p:extLst>
-  </p:cSld>
-  <p:clrMapOvr>
-    <a:masterClrMapping/>
-  </p:clrMapOvr>
-</p:sld>
-</file>
-
-<file path=ppt/slides/slide4.xml><?xml version="1.0" encoding="utf-8"?>
-<p:sld xmlns:a="http://schemas.openxmlformats.org/drawingml/2006/main" xmlns:r="http://schemas.openxmlformats.org/officeDocument/2006/relationships" xmlns:p="http://schemas.openxmlformats.org/presentationml/2006/main">
-  <p:cSld>
-    <p:spTree>
-      <p:nvGrpSpPr>
-        <p:cNvPr id="1" name=""/>
-        <p:cNvGrpSpPr/>
-        <p:nvPr/>
-      </p:nvGrpSpPr>
-      <p:grpSpPr>
-        <a:xfrm>
-          <a:off x="0" y="0"/>
-          <a:ext cx="0" cy="0"/>
-          <a:chOff x="0" y="0"/>
-          <a:chExt cx="0" cy="0"/>
-        </a:xfrm>
-      </p:grpSpPr>
-      <p:sp>
-        <p:nvSpPr>
-          <p:cNvPr id="118" name="Rectangle 65"/>
+      <p:sp>
+        <p:nvSpPr>
+          <p:cNvPr id="127" name="Flowchart: Decision 96">
+            <a:extLst>
+              <a:ext uri="{FF2B5EF4-FFF2-40B4-BE49-F238E27FC236}">
+                <a16:creationId xmlns:a16="http://schemas.microsoft.com/office/drawing/2014/main" id="{D2B8E737-BBB7-4B8C-BDF8-2EF7A3E1DE44}"/>
+              </a:ext>
+            </a:extLst>
+          </p:cNvPr>
           <p:cNvSpPr/>
           <p:nvPr/>
         </p:nvSpPr>
         <p:spPr>
           <a:xfrm>
-            <a:off x="990600" y="533400"/>
-            <a:ext cx="7239000" cy="4876800"/>
-          </a:xfrm>
-          <a:prstGeom prst="roundRect">
-            <a:avLst>
-              <a:gd name="adj" fmla="val 3484"/>
-            </a:avLst>
-          </a:prstGeom>
-          <a:solidFill>
-            <a:schemeClr val="accent4">
-              <a:lumMod val="20000"/>
-              <a:lumOff val="80000"/>
-            </a:schemeClr>
-          </a:solidFill>
-          <a:ln w="19050">
-            <a:noFill/>
-          </a:ln>
-          <a:effectLst/>
-        </p:spPr>
-        <p:style>
-          <a:lnRef idx="1">
-            <a:schemeClr val="accent2"/>
-          </a:lnRef>
-          <a:fillRef idx="2">
-            <a:schemeClr val="accent2"/>
-          </a:fillRef>
-          <a:effectRef idx="1">
-            <a:schemeClr val="accent2"/>
-          </a:effectRef>
-          <a:fontRef idx="minor">
-            <a:schemeClr val="dk1"/>
-          </a:fontRef>
-        </p:style>
-        <p:txBody>
-          <a:bodyPr rtlCol="0" anchor="t"/>
-          <a:lstStyle/>
-          <a:p>
-            <a:r>
-              <a:rPr lang="en-US" sz="1200" b="1" dirty="0">
+            <a:off x="6011342" y="4334585"/>
+            <a:ext cx="236048" cy="173380"/>
+          </a:xfrm>
+          <a:prstGeom prst="flowChartDecision">
+            <a:avLst/>
+          </a:prstGeom>
+          <a:noFill/>
+          <a:ln w="19050">
+            <a:solidFill>
+              <a:srgbClr val="7030A0"/>
+            </a:solidFill>
+          </a:ln>
+          <a:effectLst/>
+        </p:spPr>
+        <p:style>
+          <a:lnRef idx="1">
+            <a:schemeClr val="accent6"/>
+          </a:lnRef>
+          <a:fillRef idx="2">
+            <a:schemeClr val="accent6"/>
+          </a:fillRef>
+          <a:effectRef idx="1">
+            <a:schemeClr val="accent6"/>
+          </a:effectRef>
+          <a:fontRef idx="minor">
+            <a:schemeClr val="dk1"/>
+          </a:fontRef>
+        </p:style>
+        <p:txBody>
+          <a:bodyPr rtlCol="0" anchor="ctr"/>
+          <a:lstStyle/>
+          <a:p>
+            <a:pPr algn="ctr"/>
+            <a:endParaRPr lang="en-US" sz="1050"/>
+          </a:p>
+        </p:txBody>
+      </p:sp>
+      <p:cxnSp>
+        <p:nvCxnSpPr>
+          <p:cNvPr id="128" name="Elbow Connector 63">
+            <a:extLst>
+              <a:ext uri="{FF2B5EF4-FFF2-40B4-BE49-F238E27FC236}">
+                <a16:creationId xmlns:a16="http://schemas.microsoft.com/office/drawing/2014/main" id="{374521C2-65BA-4C6B-99B3-454966DC871F}"/>
+              </a:ext>
+            </a:extLst>
+          </p:cNvPr>
+          <p:cNvCxnSpPr>
+            <a:cxnSpLocks/>
+            <a:stCxn id="127" idx="3"/>
+            <a:endCxn id="62" idx="1"/>
+          </p:cNvCxnSpPr>
+          <p:nvPr/>
+        </p:nvCxnSpPr>
+        <p:spPr>
+          <a:xfrm flipV="1">
+            <a:off x="6247390" y="1850348"/>
+            <a:ext cx="281780" cy="2570927"/>
+          </a:xfrm>
+          <a:prstGeom prst="bentConnector3">
+            <a:avLst/>
+          </a:prstGeom>
+          <a:ln w="19050">
+            <a:solidFill>
+              <a:srgbClr val="7030A0"/>
+            </a:solidFill>
+            <a:headEnd type="none" w="med" len="med"/>
+            <a:tailEnd type="arrow" w="med" len="med"/>
+          </a:ln>
+          <a:effectLst/>
+        </p:spPr>
+        <p:style>
+          <a:lnRef idx="1">
+            <a:schemeClr val="accent2"/>
+          </a:lnRef>
+          <a:fillRef idx="2">
+            <a:schemeClr val="accent2"/>
+          </a:fillRef>
+          <a:effectRef idx="1">
+            <a:schemeClr val="accent2"/>
+          </a:effectRef>
+          <a:fontRef idx="minor">
+            <a:schemeClr val="dk1"/>
+          </a:fontRef>
+        </p:style>
+      </p:cxnSp>
+      <p:sp>
+        <p:nvSpPr>
+          <p:cNvPr id="130" name="Flowchart: Decision 96">
+            <a:extLst>
+              <a:ext uri="{FF2B5EF4-FFF2-40B4-BE49-F238E27FC236}">
+                <a16:creationId xmlns:a16="http://schemas.microsoft.com/office/drawing/2014/main" id="{29550259-9575-4556-85FA-77BF2816480E}"/>
+              </a:ext>
+            </a:extLst>
+          </p:cNvPr>
+          <p:cNvSpPr/>
+          <p:nvPr/>
+        </p:nvSpPr>
+        <p:spPr>
+          <a:xfrm>
+            <a:off x="6011146" y="3767034"/>
+            <a:ext cx="236048" cy="173380"/>
+          </a:xfrm>
+          <a:prstGeom prst="flowChartDecision">
+            <a:avLst/>
+          </a:prstGeom>
+          <a:noFill/>
+          <a:ln w="19050">
+            <a:solidFill>
+              <a:srgbClr val="7030A0"/>
+            </a:solidFill>
+          </a:ln>
+          <a:effectLst/>
+        </p:spPr>
+        <p:style>
+          <a:lnRef idx="1">
+            <a:schemeClr val="accent6"/>
+          </a:lnRef>
+          <a:fillRef idx="2">
+            <a:schemeClr val="accent6"/>
+          </a:fillRef>
+          <a:effectRef idx="1">
+            <a:schemeClr val="accent6"/>
+          </a:effectRef>
+          <a:fontRef idx="minor">
+            <a:schemeClr val="dk1"/>
+          </a:fontRef>
+        </p:style>
+        <p:txBody>
+          <a:bodyPr rtlCol="0" anchor="ctr"/>
+          <a:lstStyle/>
+          <a:p>
+            <a:pPr algn="ctr"/>
+            <a:endParaRPr lang="en-US" sz="1050"/>
+          </a:p>
+        </p:txBody>
+      </p:sp>
+      <p:cxnSp>
+        <p:nvCxnSpPr>
+          <p:cNvPr id="131" name="Elbow Connector 63">
+            <a:extLst>
+              <a:ext uri="{FF2B5EF4-FFF2-40B4-BE49-F238E27FC236}">
+                <a16:creationId xmlns:a16="http://schemas.microsoft.com/office/drawing/2014/main" id="{EB39E71E-810D-4B41-98B2-26F71047CDC8}"/>
+              </a:ext>
+            </a:extLst>
+          </p:cNvPr>
+          <p:cNvCxnSpPr>
+            <a:cxnSpLocks/>
+            <a:stCxn id="130" idx="3"/>
+            <a:endCxn id="62" idx="1"/>
+          </p:cNvCxnSpPr>
+          <p:nvPr/>
+        </p:nvCxnSpPr>
+        <p:spPr>
+          <a:xfrm flipV="1">
+            <a:off x="6247194" y="1850348"/>
+            <a:ext cx="281976" cy="2003376"/>
+          </a:xfrm>
+          <a:prstGeom prst="bentConnector3">
+            <a:avLst/>
+          </a:prstGeom>
+          <a:ln w="19050">
+            <a:solidFill>
+              <a:srgbClr val="7030A0"/>
+            </a:solidFill>
+            <a:headEnd type="none" w="med" len="med"/>
+            <a:tailEnd type="arrow" w="med" len="med"/>
+          </a:ln>
+          <a:effectLst/>
+        </p:spPr>
+        <p:style>
+          <a:lnRef idx="1">
+            <a:schemeClr val="accent2"/>
+          </a:lnRef>
+          <a:fillRef idx="2">
+            <a:schemeClr val="accent2"/>
+          </a:fillRef>
+          <a:effectRef idx="1">
+            <a:schemeClr val="accent2"/>
+          </a:effectRef>
+          <a:fontRef idx="minor">
+            <a:schemeClr val="dk1"/>
+          </a:fontRef>
+        </p:style>
+      </p:cxnSp>
+      <p:sp>
+        <p:nvSpPr>
+          <p:cNvPr id="132" name="Flowchart: Decision 96">
+            <a:extLst>
+              <a:ext uri="{FF2B5EF4-FFF2-40B4-BE49-F238E27FC236}">
+                <a16:creationId xmlns:a16="http://schemas.microsoft.com/office/drawing/2014/main" id="{94A79EB7-80BA-4FBB-9C94-4480E40AF89C}"/>
+              </a:ext>
+            </a:extLst>
+          </p:cNvPr>
+          <p:cNvSpPr/>
+          <p:nvPr/>
+        </p:nvSpPr>
+        <p:spPr>
+          <a:xfrm>
+            <a:off x="5999067" y="3209250"/>
+            <a:ext cx="236048" cy="173380"/>
+          </a:xfrm>
+          <a:prstGeom prst="flowChartDecision">
+            <a:avLst/>
+          </a:prstGeom>
+          <a:noFill/>
+          <a:ln w="19050">
+            <a:solidFill>
+              <a:srgbClr val="7030A0"/>
+            </a:solidFill>
+          </a:ln>
+          <a:effectLst/>
+        </p:spPr>
+        <p:style>
+          <a:lnRef idx="1">
+            <a:schemeClr val="accent6"/>
+          </a:lnRef>
+          <a:fillRef idx="2">
+            <a:schemeClr val="accent6"/>
+          </a:fillRef>
+          <a:effectRef idx="1">
+            <a:schemeClr val="accent6"/>
+          </a:effectRef>
+          <a:fontRef idx="minor">
+            <a:schemeClr val="dk1"/>
+          </a:fontRef>
+        </p:style>
+        <p:txBody>
+          <a:bodyPr rtlCol="0" anchor="ctr"/>
+          <a:lstStyle/>
+          <a:p>
+            <a:pPr algn="ctr"/>
+            <a:endParaRPr lang="en-US" sz="1050"/>
+          </a:p>
+        </p:txBody>
+      </p:sp>
+      <p:cxnSp>
+        <p:nvCxnSpPr>
+          <p:cNvPr id="133" name="Elbow Connector 63">
+            <a:extLst>
+              <a:ext uri="{FF2B5EF4-FFF2-40B4-BE49-F238E27FC236}">
+                <a16:creationId xmlns:a16="http://schemas.microsoft.com/office/drawing/2014/main" id="{26376927-F58A-48A5-B14D-FD12DFD768F8}"/>
+              </a:ext>
+            </a:extLst>
+          </p:cNvPr>
+          <p:cNvCxnSpPr>
+            <a:cxnSpLocks/>
+            <a:stCxn id="132" idx="3"/>
+            <a:endCxn id="62" idx="1"/>
+          </p:cNvCxnSpPr>
+          <p:nvPr/>
+        </p:nvCxnSpPr>
+        <p:spPr>
+          <a:xfrm flipV="1">
+            <a:off x="6235115" y="1850348"/>
+            <a:ext cx="294055" cy="1445592"/>
+          </a:xfrm>
+          <a:prstGeom prst="bentConnector3">
+            <a:avLst/>
+          </a:prstGeom>
+          <a:ln w="19050">
+            <a:solidFill>
+              <a:srgbClr val="7030A0"/>
+            </a:solidFill>
+            <a:headEnd type="none" w="med" len="med"/>
+            <a:tailEnd type="arrow" w="med" len="med"/>
+          </a:ln>
+          <a:effectLst/>
+        </p:spPr>
+        <p:style>
+          <a:lnRef idx="1">
+            <a:schemeClr val="accent2"/>
+          </a:lnRef>
+          <a:fillRef idx="2">
+            <a:schemeClr val="accent2"/>
+          </a:fillRef>
+          <a:effectRef idx="1">
+            <a:schemeClr val="accent2"/>
+          </a:effectRef>
+          <a:fontRef idx="minor">
+            <a:schemeClr val="dk1"/>
+          </a:fontRef>
+        </p:style>
+      </p:cxnSp>
+      <p:sp>
+        <p:nvSpPr>
+          <p:cNvPr id="129" name="Rectangle 8">
+            <a:extLst>
+              <a:ext uri="{FF2B5EF4-FFF2-40B4-BE49-F238E27FC236}">
+                <a16:creationId xmlns:a16="http://schemas.microsoft.com/office/drawing/2014/main" id="{903E1365-C308-4B91-A75F-2DFC5EDB686C}"/>
+              </a:ext>
+            </a:extLst>
+          </p:cNvPr>
+          <p:cNvSpPr/>
+          <p:nvPr/>
+        </p:nvSpPr>
+        <p:spPr>
+          <a:xfrm>
+            <a:off x="2037784" y="5349944"/>
+            <a:ext cx="1260298" cy="271656"/>
+          </a:xfrm>
+          <a:prstGeom prst="rect">
+            <a:avLst/>
+          </a:prstGeom>
+          <a:ln w="19050">
+            <a:solidFill>
+              <a:srgbClr val="7030A0"/>
+            </a:solidFill>
+          </a:ln>
+          <a:effectLst/>
+        </p:spPr>
+        <p:style>
+          <a:lnRef idx="1">
+            <a:schemeClr val="accent4"/>
+          </a:lnRef>
+          <a:fillRef idx="2">
+            <a:schemeClr val="accent4"/>
+          </a:fillRef>
+          <a:effectRef idx="1">
+            <a:schemeClr val="accent4"/>
+          </a:effectRef>
+          <a:fontRef idx="minor">
+            <a:schemeClr val="dk1"/>
+          </a:fontRef>
+        </p:style>
+        <p:txBody>
+          <a:bodyPr rtlCol="0" anchor="ctr"/>
+          <a:lstStyle/>
+          <a:p>
+            <a:pPr algn="ctr"/>
+            <a:r>
+              <a:rPr lang="en-SG" sz="1050" dirty="0" err="1">
                 <a:solidFill>
                   <a:srgbClr val="7030A0"/>
                 </a:solidFill>
               </a:rPr>
-              <a:t>Model</a:t>
-            </a:r>
-            <a:endParaRPr lang="en-SG" sz="1200" b="1" dirty="0">
-              <a:solidFill>
-                <a:srgbClr val="7030A0"/>
-              </a:solidFill>
-            </a:endParaRPr>
-          </a:p>
-        </p:txBody>
-      </p:sp>
-      <p:sp>
-        <p:nvSpPr>
-          <p:cNvPr id="2" name="Rectangle 8"/>
-          <p:cNvSpPr/>
-          <p:nvPr/>
-        </p:nvSpPr>
-        <p:spPr>
-          <a:xfrm>
-            <a:off x="2806563" y="2499876"/>
-            <a:ext cx="1093635" cy="346760"/>
-          </a:xfrm>
-          <a:prstGeom prst="rect">
-            <a:avLst/>
-          </a:prstGeom>
-          <a:solidFill>
-            <a:srgbClr val="7030A0"/>
-          </a:solidFill>
-          <a:ln w="19050">
-            <a:solidFill>
-              <a:srgbClr val="7030A0"/>
-            </a:solidFill>
-          </a:ln>
-          <a:effectLst/>
-        </p:spPr>
-        <p:style>
-          <a:lnRef idx="1">
-            <a:schemeClr val="accent2"/>
-          </a:lnRef>
-          <a:fillRef idx="2">
-            <a:schemeClr val="accent2"/>
-          </a:fillRef>
-          <a:effectRef idx="1">
-            <a:schemeClr val="accent2"/>
-          </a:effectRef>
-          <a:fontRef idx="minor">
-            <a:schemeClr val="dk1"/>
-          </a:fontRef>
-        </p:style>
-        <p:txBody>
-          <a:bodyPr rtlCol="0" anchor="ctr"/>
-          <a:lstStyle/>
-          <a:p>
-            <a:pPr algn="ctr"/>
-            <a:r>
-              <a:rPr lang="en-US" sz="1050" dirty="0" err="1">
-                <a:solidFill>
-                  <a:schemeClr val="bg1"/>
-                </a:solidFill>
-              </a:rPr>
-              <a:t>UserPref</a:t>
-            </a:r>
-            <a:endParaRPr lang="en-SG" sz="1050" dirty="0">
-              <a:solidFill>
-                <a:schemeClr val="bg1"/>
-              </a:solidFill>
-            </a:endParaRPr>
-          </a:p>
-        </p:txBody>
-      </p:sp>
-      <p:sp>
-        <p:nvSpPr>
-          <p:cNvPr id="9" name="Rectangle 62"/>
-          <p:cNvSpPr/>
-          <p:nvPr/>
-        </p:nvSpPr>
-        <p:spPr>
-          <a:xfrm rot="16200000">
-            <a:off x="1666826" y="2210123"/>
-            <a:ext cx="1093635" cy="346760"/>
-          </a:xfrm>
-          <a:prstGeom prst="rect">
-            <a:avLst/>
-          </a:prstGeom>
-          <a:solidFill>
-            <a:srgbClr val="7030A0"/>
-          </a:solidFill>
-          <a:ln w="19050">
-            <a:solidFill>
-              <a:srgbClr val="7030A0"/>
-            </a:solidFill>
-          </a:ln>
-          <a:effectLst/>
-        </p:spPr>
-        <p:style>
-          <a:lnRef idx="1">
-            <a:schemeClr val="accent2"/>
-          </a:lnRef>
-          <a:fillRef idx="2">
-            <a:schemeClr val="accent2"/>
-          </a:fillRef>
-          <a:effectRef idx="1">
-            <a:schemeClr val="accent2"/>
-          </a:effectRef>
-          <a:fontRef idx="minor">
-            <a:schemeClr val="dk1"/>
-          </a:fontRef>
-        </p:style>
-        <p:txBody>
-          <a:bodyPr rtlCol="0" anchor="ctr"/>
-          <a:lstStyle/>
-          <a:p>
-            <a:pPr algn="ctr"/>
-            <a:r>
-              <a:rPr lang="en-US" sz="1050" dirty="0" err="1">
-                <a:solidFill>
-                  <a:schemeClr val="bg1"/>
-                </a:solidFill>
-              </a:rPr>
-              <a:t>ModelManager</a:t>
-            </a:r>
-            <a:endParaRPr lang="en-SG" sz="1050" dirty="0">
-              <a:solidFill>
-                <a:schemeClr val="bg1"/>
-              </a:solidFill>
-            </a:endParaRPr>
-          </a:p>
-        </p:txBody>
-      </p:sp>
-      <p:cxnSp>
-        <p:nvCxnSpPr>
-          <p:cNvPr id="53" name="Elbow Connector 63"/>
-          <p:cNvCxnSpPr>
-            <a:cxnSpLocks/>
-            <a:stCxn id="111" idx="3"/>
-            <a:endCxn id="82" idx="0"/>
-          </p:cNvCxnSpPr>
-          <p:nvPr/>
-        </p:nvCxnSpPr>
-        <p:spPr>
-          <a:xfrm>
-            <a:off x="4117193" y="3865221"/>
-            <a:ext cx="1734698" cy="159748"/>
-          </a:xfrm>
-          <a:prstGeom prst="bentConnector2">
-            <a:avLst/>
-          </a:prstGeom>
-          <a:ln w="19050">
-            <a:solidFill>
-              <a:srgbClr val="7030A0"/>
-            </a:solidFill>
-            <a:prstDash val="sysDot"/>
-            <a:headEnd type="none" w="med" len="med"/>
-            <a:tailEnd type="none" w="med" len="med"/>
-          </a:ln>
-          <a:effectLst/>
-        </p:spPr>
-        <p:style>
-          <a:lnRef idx="1">
-            <a:schemeClr val="accent2"/>
-          </a:lnRef>
-          <a:fillRef idx="2">
-            <a:schemeClr val="accent2"/>
-          </a:fillRef>
-          <a:effectRef idx="1">
-            <a:schemeClr val="accent2"/>
-          </a:effectRef>
-          <a:fontRef idx="minor">
-            <a:schemeClr val="dk1"/>
-          </a:fontRef>
-        </p:style>
-      </p:cxnSp>
-      <p:cxnSp>
-        <p:nvCxnSpPr>
-          <p:cNvPr id="107" name="Elbow Connector 106"/>
-          <p:cNvCxnSpPr>
-            <a:cxnSpLocks/>
-            <a:stCxn id="9" idx="1"/>
-            <a:endCxn id="72" idx="1"/>
-          </p:cNvCxnSpPr>
-          <p:nvPr/>
-        </p:nvCxnSpPr>
-        <p:spPr>
-          <a:xfrm rot="16200000" flipH="1">
-            <a:off x="2084446" y="3059518"/>
-            <a:ext cx="934899" cy="676503"/>
-          </a:xfrm>
-          <a:prstGeom prst="bentConnector2">
-            <a:avLst/>
-          </a:prstGeom>
-          <a:ln w="19050">
-            <a:solidFill>
-              <a:srgbClr val="7030A0"/>
-            </a:solidFill>
-            <a:prstDash val="solid"/>
-            <a:headEnd type="none" w="med" len="med"/>
-            <a:tailEnd type="arrow" w="med" len="med"/>
-          </a:ln>
-          <a:effectLst/>
-        </p:spPr>
-        <p:style>
-          <a:lnRef idx="1">
-            <a:schemeClr val="accent2"/>
-          </a:lnRef>
-          <a:fillRef idx="2">
-            <a:schemeClr val="accent2"/>
-          </a:fillRef>
-          <a:effectRef idx="1">
-            <a:schemeClr val="accent2"/>
-          </a:effectRef>
-          <a:fontRef idx="minor">
-            <a:schemeClr val="dk1"/>
-          </a:fontRef>
-        </p:style>
-      </p:cxnSp>
-      <p:sp>
-        <p:nvSpPr>
-          <p:cNvPr id="119" name="Rectangle 62"/>
-          <p:cNvSpPr/>
-          <p:nvPr/>
-        </p:nvSpPr>
-        <p:spPr>
-          <a:xfrm rot="16200000">
-            <a:off x="939065" y="2202638"/>
-            <a:ext cx="1093635" cy="346760"/>
-          </a:xfrm>
-          <a:prstGeom prst="rect">
-            <a:avLst/>
-          </a:prstGeom>
-          <a:solidFill>
-            <a:srgbClr val="7030A0"/>
-          </a:solidFill>
-          <a:ln w="19050">
-            <a:solidFill>
-              <a:srgbClr val="7030A0"/>
-            </a:solidFill>
-          </a:ln>
-          <a:effectLst/>
-        </p:spPr>
-        <p:style>
-          <a:lnRef idx="1">
-            <a:schemeClr val="accent2"/>
-          </a:lnRef>
-          <a:fillRef idx="2">
-            <a:schemeClr val="accent2"/>
-          </a:fillRef>
-          <a:effectRef idx="1">
-            <a:schemeClr val="accent2"/>
-          </a:effectRef>
-          <a:fontRef idx="minor">
-            <a:schemeClr val="dk1"/>
-          </a:fontRef>
-        </p:style>
-        <p:txBody>
-          <a:bodyPr rtlCol="0" anchor="ctr"/>
-          <a:lstStyle/>
-          <a:p>
-            <a:pPr algn="ctr"/>
-            <a:r>
-              <a:rPr lang="en-US" sz="1050" dirty="0">
-                <a:solidFill>
-                  <a:schemeClr val="bg1"/>
-                </a:solidFill>
-              </a:rPr>
-              <a:t>&lt;&lt;interface&gt;&gt;</a:t>
-            </a:r>
-          </a:p>
-          <a:p>
-            <a:pPr algn="ctr"/>
-            <a:r>
-              <a:rPr lang="en-US" sz="1050" dirty="0">
-                <a:solidFill>
-                  <a:schemeClr val="bg1"/>
-                </a:solidFill>
-              </a:rPr>
-              <a:t>Model</a:t>
-            </a:r>
-            <a:endParaRPr lang="en-SG" sz="1050" dirty="0">
-              <a:solidFill>
-                <a:schemeClr val="bg1"/>
-              </a:solidFill>
-            </a:endParaRPr>
-          </a:p>
-        </p:txBody>
-      </p:sp>
-      <p:sp>
-        <p:nvSpPr>
-          <p:cNvPr id="120" name="Isosceles Triangle 102"/>
-          <p:cNvSpPr/>
-          <p:nvPr/>
-        </p:nvSpPr>
-        <p:spPr>
-          <a:xfrm rot="16200000">
-            <a:off x="1609773" y="2293727"/>
-            <a:ext cx="270504" cy="175523"/>
-          </a:xfrm>
-          <a:prstGeom prst="triangle">
-            <a:avLst/>
-          </a:prstGeom>
-          <a:solidFill>
-            <a:srgbClr val="7030A0"/>
-          </a:solidFill>
-          <a:ln w="19050">
-            <a:solidFill>
-              <a:srgbClr val="7030A0"/>
-            </a:solidFill>
-          </a:ln>
-          <a:effectLst/>
-        </p:spPr>
-        <p:style>
-          <a:lnRef idx="1">
-            <a:schemeClr val="accent6"/>
-          </a:lnRef>
-          <a:fillRef idx="2">
-            <a:schemeClr val="accent6"/>
-          </a:fillRef>
-          <a:effectRef idx="1">
-            <a:schemeClr val="accent6"/>
-          </a:effectRef>
-          <a:fontRef idx="minor">
-            <a:schemeClr val="dk1"/>
-          </a:fontRef>
-        </p:style>
-        <p:txBody>
-          <a:bodyPr rtlCol="0" anchor="ctr"/>
-          <a:lstStyle/>
-          <a:p>
-            <a:pPr algn="ctr"/>
-            <a:endParaRPr lang="en-SG" sz="1050"/>
-          </a:p>
-        </p:txBody>
-      </p:sp>
-      <p:cxnSp>
-        <p:nvCxnSpPr>
-          <p:cNvPr id="58" name="Straight Arrow Connector 57"/>
-          <p:cNvCxnSpPr>
-            <a:stCxn id="42" idx="3"/>
-            <a:endCxn id="2" idx="1"/>
-          </p:cNvCxnSpPr>
-          <p:nvPr/>
-        </p:nvCxnSpPr>
-        <p:spPr>
-          <a:xfrm>
-            <a:off x="2639233" y="2667972"/>
-            <a:ext cx="167330" cy="5284"/>
-          </a:xfrm>
-          <a:prstGeom prst="straightConnector1">
-            <a:avLst/>
-          </a:prstGeom>
-          <a:ln w="19050">
-            <a:solidFill>
-              <a:srgbClr val="7030A0"/>
-            </a:solidFill>
-            <a:headEnd type="none" w="med" len="med"/>
-            <a:tailEnd type="arrow" w="med" len="med"/>
-          </a:ln>
-          <a:effectLst/>
-        </p:spPr>
-        <p:style>
-          <a:lnRef idx="1">
-            <a:schemeClr val="accent2"/>
-          </a:lnRef>
-          <a:fillRef idx="2">
-            <a:schemeClr val="accent2"/>
-          </a:fillRef>
-          <a:effectRef idx="1">
-            <a:schemeClr val="accent2"/>
-          </a:effectRef>
-          <a:fontRef idx="minor">
-            <a:schemeClr val="dk1"/>
-          </a:fontRef>
-        </p:style>
-      </p:cxnSp>
-      <p:cxnSp>
-        <p:nvCxnSpPr>
-          <p:cNvPr id="75" name="Elbow Connector 122"/>
-          <p:cNvCxnSpPr>
-            <a:cxnSpLocks/>
-          </p:cNvCxnSpPr>
-          <p:nvPr/>
-        </p:nvCxnSpPr>
-        <p:spPr>
-          <a:xfrm>
-            <a:off x="1038789" y="2383503"/>
-            <a:ext cx="273713" cy="846"/>
-          </a:xfrm>
-          <a:prstGeom prst="bentConnector3">
-            <a:avLst>
-              <a:gd name="adj1" fmla="val 50000"/>
-            </a:avLst>
-          </a:prstGeom>
-          <a:ln w="19050">
-            <a:solidFill>
-              <a:schemeClr val="bg1">
-                <a:lumMod val="75000"/>
-              </a:schemeClr>
-            </a:solidFill>
-            <a:prstDash val="sysDot"/>
-            <a:headEnd type="none" w="med" len="med"/>
-            <a:tailEnd type="arrow" w="med" len="med"/>
-          </a:ln>
-          <a:effectLst/>
-        </p:spPr>
-        <p:style>
-          <a:lnRef idx="1">
-            <a:schemeClr val="accent2"/>
-          </a:lnRef>
-          <a:fillRef idx="2">
-            <a:schemeClr val="accent2"/>
-          </a:fillRef>
-          <a:effectRef idx="1">
-            <a:schemeClr val="accent2"/>
-          </a:effectRef>
-          <a:fontRef idx="minor">
-            <a:schemeClr val="dk1"/>
-          </a:fontRef>
-        </p:style>
-      </p:cxnSp>
-      <p:cxnSp>
-        <p:nvCxnSpPr>
-          <p:cNvPr id="21" name="Straight Connector 20"/>
-          <p:cNvCxnSpPr>
-            <a:stCxn id="120" idx="3"/>
-          </p:cNvCxnSpPr>
-          <p:nvPr/>
-        </p:nvCxnSpPr>
-        <p:spPr>
-          <a:xfrm flipV="1">
-            <a:off x="1832787" y="2381488"/>
-            <a:ext cx="216105" cy="1"/>
-          </a:xfrm>
-          <a:prstGeom prst="line">
-            <a:avLst/>
-          </a:prstGeom>
-          <a:ln w="19050">
-            <a:solidFill>
-              <a:srgbClr val="7030A0"/>
-            </a:solidFill>
-            <a:prstDash val="sysDot"/>
-            <a:headEnd type="none" w="med" len="med"/>
-            <a:tailEnd type="none" w="med" len="med"/>
-          </a:ln>
-          <a:effectLst/>
-        </p:spPr>
-        <p:style>
-          <a:lnRef idx="1">
-            <a:schemeClr val="accent2"/>
-          </a:lnRef>
-          <a:fillRef idx="2">
-            <a:schemeClr val="accent2"/>
-          </a:fillRef>
-          <a:effectRef idx="1">
-            <a:schemeClr val="accent2"/>
-          </a:effectRef>
-          <a:fontRef idx="minor">
-            <a:schemeClr val="dk1"/>
-          </a:fontRef>
-        </p:style>
-      </p:cxnSp>
-      <p:sp>
-        <p:nvSpPr>
-          <p:cNvPr id="42" name="Flowchart: Decision 96"/>
-          <p:cNvSpPr/>
-          <p:nvPr/>
-        </p:nvSpPr>
-        <p:spPr>
-          <a:xfrm>
-            <a:off x="2403185" y="2581282"/>
-            <a:ext cx="236048" cy="173380"/>
-          </a:xfrm>
-          <a:prstGeom prst="flowChartDecision">
-            <a:avLst/>
-          </a:prstGeom>
-          <a:noFill/>
-          <a:ln w="19050">
-            <a:solidFill>
-              <a:srgbClr val="7030A0"/>
-            </a:solidFill>
-          </a:ln>
-          <a:effectLst/>
-        </p:spPr>
-        <p:style>
-          <a:lnRef idx="1">
-            <a:schemeClr val="accent6"/>
-          </a:lnRef>
-          <a:fillRef idx="2">
-            <a:schemeClr val="accent6"/>
-          </a:fillRef>
-          <a:effectRef idx="1">
-            <a:schemeClr val="accent6"/>
-          </a:effectRef>
-          <a:fontRef idx="minor">
-            <a:schemeClr val="dk1"/>
-          </a:fontRef>
-        </p:style>
-        <p:txBody>
-          <a:bodyPr rtlCol="0" anchor="ctr"/>
-          <a:lstStyle/>
-          <a:p>
-            <a:pPr algn="ctr"/>
-            <a:endParaRPr lang="en-US" sz="1050"/>
-          </a:p>
-        </p:txBody>
-      </p:sp>
-      <p:sp>
-        <p:nvSpPr>
-          <p:cNvPr id="46" name="Rectangle 8"/>
-          <p:cNvSpPr/>
-          <p:nvPr/>
-        </p:nvSpPr>
-        <p:spPr>
-          <a:xfrm>
-            <a:off x="2808873" y="1968856"/>
-            <a:ext cx="1093635" cy="346760"/>
-          </a:xfrm>
-          <a:prstGeom prst="rect">
-            <a:avLst/>
-          </a:prstGeom>
-          <a:ln w="19050">
-            <a:solidFill>
-              <a:srgbClr val="7030A0"/>
-            </a:solidFill>
-          </a:ln>
-          <a:effectLst/>
-        </p:spPr>
-        <p:style>
-          <a:lnRef idx="1">
-            <a:schemeClr val="accent4"/>
-          </a:lnRef>
-          <a:fillRef idx="2">
-            <a:schemeClr val="accent4"/>
-          </a:fillRef>
-          <a:effectRef idx="1">
-            <a:schemeClr val="accent4"/>
-          </a:effectRef>
-          <a:fontRef idx="minor">
-            <a:schemeClr val="dk1"/>
-          </a:fontRef>
-        </p:style>
-        <p:txBody>
-          <a:bodyPr rtlCol="0" anchor="ctr"/>
-          <a:lstStyle/>
-          <a:p>
-            <a:pPr algn="ctr"/>
-            <a:r>
-              <a:rPr lang="en-US" sz="1050" dirty="0" err="1">
-                <a:solidFill>
-                  <a:srgbClr val="7030A0"/>
-                </a:solidFill>
-              </a:rPr>
-              <a:t>EntryBook</a:t>
+              <a:t>Java.util.Calendar</a:t>
             </a:r>
             <a:endParaRPr lang="en-SG" sz="1050" dirty="0">
               <a:solidFill>
@@ -15055,304 +14628,24 @@
       </p:sp>
       <p:cxnSp>
         <p:nvCxnSpPr>
-          <p:cNvPr id="47" name="Straight Arrow Connector 46"/>
-          <p:cNvCxnSpPr>
-            <a:stCxn id="48" idx="3"/>
-            <a:endCxn id="46" idx="1"/>
-          </p:cNvCxnSpPr>
-          <p:nvPr/>
-        </p:nvCxnSpPr>
-        <p:spPr>
-          <a:xfrm>
-            <a:off x="2641543" y="2136952"/>
-            <a:ext cx="167330" cy="5284"/>
-          </a:xfrm>
-          <a:prstGeom prst="straightConnector1">
-            <a:avLst/>
-          </a:prstGeom>
-          <a:ln w="19050">
-            <a:solidFill>
-              <a:srgbClr val="7030A0"/>
-            </a:solidFill>
-            <a:headEnd type="none" w="med" len="med"/>
-            <a:tailEnd type="arrow" w="med" len="med"/>
-          </a:ln>
-          <a:effectLst/>
-        </p:spPr>
-        <p:style>
-          <a:lnRef idx="1">
-            <a:schemeClr val="accent2"/>
-          </a:lnRef>
-          <a:fillRef idx="2">
-            <a:schemeClr val="accent2"/>
-          </a:fillRef>
-          <a:effectRef idx="1">
-            <a:schemeClr val="accent2"/>
-          </a:effectRef>
-          <a:fontRef idx="minor">
-            <a:schemeClr val="dk1"/>
-          </a:fontRef>
-        </p:style>
-      </p:cxnSp>
-      <p:sp>
-        <p:nvSpPr>
-          <p:cNvPr id="48" name="Flowchart: Decision 96"/>
-          <p:cNvSpPr/>
-          <p:nvPr/>
-        </p:nvSpPr>
-        <p:spPr>
-          <a:xfrm>
-            <a:off x="2405495" y="2050262"/>
-            <a:ext cx="236048" cy="173380"/>
-          </a:xfrm>
-          <a:prstGeom prst="flowChartDecision">
-            <a:avLst/>
-          </a:prstGeom>
-          <a:noFill/>
-          <a:ln w="19050">
-            <a:solidFill>
-              <a:srgbClr val="7030A0"/>
-            </a:solidFill>
-          </a:ln>
-          <a:effectLst/>
-        </p:spPr>
-        <p:style>
-          <a:lnRef idx="1">
-            <a:schemeClr val="accent6"/>
-          </a:lnRef>
-          <a:fillRef idx="2">
-            <a:schemeClr val="accent6"/>
-          </a:fillRef>
-          <a:effectRef idx="1">
-            <a:schemeClr val="accent6"/>
-          </a:effectRef>
-          <a:fontRef idx="minor">
-            <a:schemeClr val="dk1"/>
-          </a:fontRef>
-        </p:style>
-        <p:txBody>
-          <a:bodyPr rtlCol="0" anchor="ctr"/>
-          <a:lstStyle/>
-          <a:p>
-            <a:pPr algn="ctr"/>
-            <a:endParaRPr lang="en-US" sz="1050"/>
-          </a:p>
-        </p:txBody>
-      </p:sp>
-      <p:sp>
-        <p:nvSpPr>
-          <p:cNvPr id="49" name="Rectangle 8"/>
-          <p:cNvSpPr/>
-          <p:nvPr/>
-        </p:nvSpPr>
-        <p:spPr>
-          <a:xfrm>
-            <a:off x="4829662" y="1708053"/>
-            <a:ext cx="1156969" cy="515590"/>
-          </a:xfrm>
-          <a:prstGeom prst="rect">
-            <a:avLst/>
-          </a:prstGeom>
-          <a:ln w="19050">
-            <a:solidFill>
-              <a:srgbClr val="7030A0"/>
-            </a:solidFill>
-          </a:ln>
-          <a:effectLst/>
-        </p:spPr>
-        <p:style>
-          <a:lnRef idx="1">
-            <a:schemeClr val="accent4"/>
-          </a:lnRef>
-          <a:fillRef idx="2">
-            <a:schemeClr val="accent4"/>
-          </a:fillRef>
-          <a:effectRef idx="1">
-            <a:schemeClr val="accent4"/>
-          </a:effectRef>
-          <a:fontRef idx="minor">
-            <a:schemeClr val="dk1"/>
-          </a:fontRef>
-        </p:style>
-        <p:txBody>
-          <a:bodyPr rtlCol="0" anchor="ctr"/>
-          <a:lstStyle/>
-          <a:p>
-            <a:pPr algn="ctr"/>
-            <a:r>
-              <a:rPr lang="en-US" sz="1050" dirty="0" err="1">
-                <a:solidFill>
-                  <a:srgbClr val="7030A0"/>
-                </a:solidFill>
-              </a:rPr>
-              <a:t>ActiveList</a:t>
-            </a:r>
-            <a:endParaRPr lang="en-SG" sz="1050" dirty="0">
-              <a:solidFill>
-                <a:srgbClr val="7030A0"/>
-              </a:solidFill>
-            </a:endParaRPr>
-          </a:p>
-        </p:txBody>
-      </p:sp>
-      <p:sp>
-        <p:nvSpPr>
-          <p:cNvPr id="51" name="Flowchart: Decision 96"/>
-          <p:cNvSpPr/>
-          <p:nvPr/>
-        </p:nvSpPr>
-        <p:spPr>
-          <a:xfrm>
-            <a:off x="3917173" y="2070782"/>
-            <a:ext cx="236048" cy="173380"/>
-          </a:xfrm>
-          <a:prstGeom prst="flowChartDecision">
-            <a:avLst/>
-          </a:prstGeom>
-          <a:solidFill>
-            <a:srgbClr val="7030A0"/>
-          </a:solidFill>
-          <a:ln w="19050">
-            <a:solidFill>
-              <a:srgbClr val="7030A0"/>
-            </a:solidFill>
-          </a:ln>
-          <a:effectLst/>
-        </p:spPr>
-        <p:style>
-          <a:lnRef idx="1">
-            <a:schemeClr val="accent6"/>
-          </a:lnRef>
-          <a:fillRef idx="2">
-            <a:schemeClr val="accent6"/>
-          </a:fillRef>
-          <a:effectRef idx="1">
-            <a:schemeClr val="accent6"/>
-          </a:effectRef>
-          <a:fontRef idx="minor">
-            <a:schemeClr val="dk1"/>
-          </a:fontRef>
-        </p:style>
-        <p:txBody>
-          <a:bodyPr rtlCol="0" anchor="ctr"/>
-          <a:lstStyle/>
-          <a:p>
-            <a:pPr algn="ctr"/>
-            <a:endParaRPr lang="en-US" sz="1050"/>
-          </a:p>
-        </p:txBody>
-      </p:sp>
-      <p:cxnSp>
-        <p:nvCxnSpPr>
-          <p:cNvPr id="30" name="Elbow Connector 29"/>
+          <p:cNvPr id="134" name="Elbow Connector 85">
+            <a:extLst>
+              <a:ext uri="{FF2B5EF4-FFF2-40B4-BE49-F238E27FC236}">
+                <a16:creationId xmlns:a16="http://schemas.microsoft.com/office/drawing/2014/main" id="{7B704892-E660-4E06-9104-CA88FFF740AC}"/>
+              </a:ext>
+            </a:extLst>
+          </p:cNvPr>
           <p:cNvCxnSpPr>
             <a:cxnSpLocks/>
-            <a:stCxn id="51" idx="3"/>
+            <a:stCxn id="80" idx="1"/>
+            <a:endCxn id="135" idx="3"/>
           </p:cNvCxnSpPr>
           <p:nvPr/>
         </p:nvCxnSpPr>
         <p:spPr>
-          <a:xfrm flipV="1">
-            <a:off x="4153221" y="1815473"/>
-            <a:ext cx="678824" cy="341999"/>
-          </a:xfrm>
-          <a:prstGeom prst="bentConnector3">
-            <a:avLst/>
-          </a:prstGeom>
-          <a:ln w="19050">
-            <a:solidFill>
-              <a:srgbClr val="7030A0"/>
-            </a:solidFill>
-            <a:headEnd type="none" w="med" len="med"/>
-            <a:tailEnd type="arrow" w="med" len="med"/>
-          </a:ln>
-          <a:effectLst/>
-        </p:spPr>
-        <p:style>
-          <a:lnRef idx="1">
-            <a:schemeClr val="accent2"/>
-          </a:lnRef>
-          <a:fillRef idx="2">
-            <a:schemeClr val="accent2"/>
-          </a:fillRef>
-          <a:effectRef idx="1">
-            <a:schemeClr val="accent2"/>
-          </a:effectRef>
-          <a:fontRef idx="minor">
-            <a:schemeClr val="dk1"/>
-          </a:fontRef>
-        </p:style>
-      </p:cxnSp>
-      <p:sp>
-        <p:nvSpPr>
-          <p:cNvPr id="57" name="Rectangle 8"/>
-          <p:cNvSpPr/>
-          <p:nvPr/>
-        </p:nvSpPr>
-        <p:spPr>
-          <a:xfrm>
-            <a:off x="4832045" y="1267964"/>
-            <a:ext cx="1156969" cy="346760"/>
-          </a:xfrm>
-          <a:prstGeom prst="rect">
-            <a:avLst/>
-          </a:prstGeom>
-          <a:ln w="19050">
-            <a:solidFill>
-              <a:srgbClr val="7030A0"/>
-            </a:solidFill>
-          </a:ln>
-          <a:effectLst/>
-        </p:spPr>
-        <p:style>
-          <a:lnRef idx="1">
-            <a:schemeClr val="accent4"/>
-          </a:lnRef>
-          <a:fillRef idx="2">
-            <a:schemeClr val="accent4"/>
-          </a:fillRef>
-          <a:effectRef idx="1">
-            <a:schemeClr val="accent4"/>
-          </a:effectRef>
-          <a:fontRef idx="minor">
-            <a:schemeClr val="dk1"/>
-          </a:fontRef>
-        </p:style>
-        <p:txBody>
-          <a:bodyPr rtlCol="0" anchor="ctr"/>
-          <a:lstStyle/>
-          <a:p>
-            <a:pPr algn="ctr"/>
-            <a:r>
-              <a:rPr lang="en-US" sz="1050" dirty="0" err="1">
-                <a:solidFill>
-                  <a:srgbClr val="7030A0"/>
-                </a:solidFill>
-              </a:rPr>
-              <a:t>UniqueTagList</a:t>
-            </a:r>
-            <a:endParaRPr lang="en-SG" sz="1050" dirty="0">
-              <a:solidFill>
-                <a:srgbClr val="7030A0"/>
-              </a:solidFill>
-            </a:endParaRPr>
-          </a:p>
-        </p:txBody>
-      </p:sp>
-      <p:cxnSp>
-        <p:nvCxnSpPr>
-          <p:cNvPr id="59" name="Elbow Connector 58"/>
-          <p:cNvCxnSpPr>
-            <a:cxnSpLocks/>
-            <a:stCxn id="51" idx="3"/>
-            <a:endCxn id="57" idx="1"/>
-          </p:cNvCxnSpPr>
-          <p:nvPr/>
-        </p:nvCxnSpPr>
-        <p:spPr>
-          <a:xfrm flipV="1">
-            <a:off x="4153221" y="1441344"/>
-            <a:ext cx="678824" cy="716128"/>
+          <a:xfrm rot="10800000">
+            <a:off x="3489482" y="5484688"/>
+            <a:ext cx="388416" cy="1085"/>
           </a:xfrm>
           <a:prstGeom prst="bentConnector3">
             <a:avLst>
@@ -15364,7 +14657,7 @@
               <a:srgbClr val="7030A0"/>
             </a:solidFill>
             <a:headEnd type="none" w="med" len="med"/>
-            <a:tailEnd type="arrow" w="med" len="med"/>
+            <a:tailEnd type="none" w="med" len="med"/>
           </a:ln>
           <a:effectLst/>
         </p:spPr>
@@ -15385,567 +14678,19 @@
       </p:cxnSp>
       <p:sp>
         <p:nvSpPr>
-          <p:cNvPr id="62" name="Rectangle 8"/>
+          <p:cNvPr id="135" name="Isosceles Triangle 102">
+            <a:extLst>
+              <a:ext uri="{FF2B5EF4-FFF2-40B4-BE49-F238E27FC236}">
+                <a16:creationId xmlns:a16="http://schemas.microsoft.com/office/drawing/2014/main" id="{960F6039-F600-4C86-962C-9DF2ECC12C2B}"/>
+              </a:ext>
+            </a:extLst>
+          </p:cNvPr>
           <p:cNvSpPr/>
           <p:nvPr/>
         </p:nvSpPr>
         <p:spPr>
-          <a:xfrm>
-            <a:off x="6529170" y="2057967"/>
-            <a:ext cx="951336" cy="346761"/>
-          </a:xfrm>
-          <a:prstGeom prst="rect">
-            <a:avLst/>
-          </a:prstGeom>
-          <a:ln w="19050">
-            <a:solidFill>
-              <a:srgbClr val="7030A0"/>
-            </a:solidFill>
-          </a:ln>
-          <a:effectLst/>
-        </p:spPr>
-        <p:style>
-          <a:lnRef idx="1">
-            <a:schemeClr val="accent4"/>
-          </a:lnRef>
-          <a:fillRef idx="2">
-            <a:schemeClr val="accent4"/>
-          </a:fillRef>
-          <a:effectRef idx="1">
-            <a:schemeClr val="accent4"/>
-          </a:effectRef>
-          <a:fontRef idx="minor">
-            <a:schemeClr val="dk1"/>
-          </a:fontRef>
-        </p:style>
-        <p:txBody>
-          <a:bodyPr rtlCol="0" anchor="ctr"/>
-          <a:lstStyle/>
-          <a:p>
-            <a:pPr algn="ctr"/>
-            <a:r>
-              <a:rPr lang="en-SG" sz="1050" dirty="0">
-                <a:solidFill>
-                  <a:srgbClr val="7030A0"/>
-                </a:solidFill>
-              </a:rPr>
-              <a:t>{abstract}</a:t>
-            </a:r>
-          </a:p>
-          <a:p>
-            <a:pPr algn="ctr"/>
-            <a:r>
-              <a:rPr lang="en-SG" sz="1050" dirty="0">
-                <a:solidFill>
-                  <a:srgbClr val="7030A0"/>
-                </a:solidFill>
-              </a:rPr>
-              <a:t>Entry</a:t>
-            </a:r>
-          </a:p>
-        </p:txBody>
-      </p:sp>
-      <p:sp>
-        <p:nvSpPr>
-          <p:cNvPr id="63" name="Flowchart: Decision 96"/>
-          <p:cNvSpPr/>
-          <p:nvPr/>
-        </p:nvSpPr>
-        <p:spPr>
-          <a:xfrm>
-            <a:off x="6006879" y="1905000"/>
-            <a:ext cx="236048" cy="173380"/>
-          </a:xfrm>
-          <a:prstGeom prst="flowChartDecision">
-            <a:avLst/>
-          </a:prstGeom>
-          <a:noFill/>
-          <a:ln w="19050">
-            <a:solidFill>
-              <a:srgbClr val="7030A0"/>
-            </a:solidFill>
-          </a:ln>
-          <a:effectLst/>
-        </p:spPr>
-        <p:style>
-          <a:lnRef idx="1">
-            <a:schemeClr val="accent6"/>
-          </a:lnRef>
-          <a:fillRef idx="2">
-            <a:schemeClr val="accent6"/>
-          </a:fillRef>
-          <a:effectRef idx="1">
-            <a:schemeClr val="accent6"/>
-          </a:effectRef>
-          <a:fontRef idx="minor">
-            <a:schemeClr val="dk1"/>
-          </a:fontRef>
-        </p:style>
-        <p:txBody>
-          <a:bodyPr rtlCol="0" anchor="ctr"/>
-          <a:lstStyle/>
-          <a:p>
-            <a:pPr algn="ctr"/>
-            <a:endParaRPr lang="en-US" sz="1050"/>
-          </a:p>
-        </p:txBody>
-      </p:sp>
-      <p:cxnSp>
-        <p:nvCxnSpPr>
-          <p:cNvPr id="64" name="Elbow Connector 63"/>
-          <p:cNvCxnSpPr>
-            <a:cxnSpLocks/>
-            <a:stCxn id="63" idx="3"/>
-            <a:endCxn id="62" idx="1"/>
-          </p:cNvCxnSpPr>
-          <p:nvPr/>
-        </p:nvCxnSpPr>
-        <p:spPr>
-          <a:xfrm>
-            <a:off x="6242927" y="1991690"/>
-            <a:ext cx="286243" cy="239658"/>
-          </a:xfrm>
-          <a:prstGeom prst="bentConnector3">
-            <a:avLst/>
-          </a:prstGeom>
-          <a:ln w="19050">
-            <a:solidFill>
-              <a:srgbClr val="7030A0"/>
-            </a:solidFill>
-            <a:headEnd type="none" w="med" len="med"/>
-            <a:tailEnd type="arrow" w="med" len="med"/>
-          </a:ln>
-          <a:effectLst/>
-        </p:spPr>
-        <p:style>
-          <a:lnRef idx="1">
-            <a:schemeClr val="accent2"/>
-          </a:lnRef>
-          <a:fillRef idx="2">
-            <a:schemeClr val="accent2"/>
-          </a:fillRef>
-          <a:effectRef idx="1">
-            <a:schemeClr val="accent2"/>
-          </a:effectRef>
-          <a:fontRef idx="minor">
-            <a:schemeClr val="dk1"/>
-          </a:fontRef>
-        </p:style>
-      </p:cxnSp>
-      <p:sp>
-        <p:nvSpPr>
-          <p:cNvPr id="67" name="Rectangle 8"/>
-          <p:cNvSpPr/>
-          <p:nvPr/>
-        </p:nvSpPr>
-        <p:spPr>
-          <a:xfrm>
-            <a:off x="5705589" y="796727"/>
-            <a:ext cx="483700" cy="346760"/>
-          </a:xfrm>
-          <a:prstGeom prst="rect">
-            <a:avLst/>
-          </a:prstGeom>
-          <a:ln w="19050">
-            <a:solidFill>
-              <a:srgbClr val="7030A0"/>
-            </a:solidFill>
-          </a:ln>
-          <a:effectLst/>
-        </p:spPr>
-        <p:style>
-          <a:lnRef idx="1">
-            <a:schemeClr val="accent4"/>
-          </a:lnRef>
-          <a:fillRef idx="2">
-            <a:schemeClr val="accent4"/>
-          </a:fillRef>
-          <a:effectRef idx="1">
-            <a:schemeClr val="accent4"/>
-          </a:effectRef>
-          <a:fontRef idx="minor">
-            <a:schemeClr val="dk1"/>
-          </a:fontRef>
-        </p:style>
-        <p:txBody>
-          <a:bodyPr rtlCol="0" anchor="ctr"/>
-          <a:lstStyle/>
-          <a:p>
-            <a:pPr algn="ctr"/>
-            <a:r>
-              <a:rPr lang="en-US" sz="1050" dirty="0">
-                <a:solidFill>
-                  <a:srgbClr val="7030A0"/>
-                </a:solidFill>
-              </a:rPr>
-              <a:t>Tag</a:t>
-            </a:r>
-            <a:endParaRPr lang="en-SG" sz="1050" dirty="0">
-              <a:solidFill>
-                <a:srgbClr val="7030A0"/>
-              </a:solidFill>
-            </a:endParaRPr>
-          </a:p>
-        </p:txBody>
-      </p:sp>
-      <p:sp>
-        <p:nvSpPr>
-          <p:cNvPr id="68" name="Flowchart: Decision 96"/>
-          <p:cNvSpPr/>
-          <p:nvPr/>
-        </p:nvSpPr>
-        <p:spPr>
-          <a:xfrm rot="16200000">
-            <a:off x="5291150" y="1053935"/>
-            <a:ext cx="236048" cy="173380"/>
-          </a:xfrm>
-          <a:prstGeom prst="flowChartDecision">
-            <a:avLst/>
-          </a:prstGeom>
-          <a:noFill/>
-          <a:ln w="19050">
-            <a:solidFill>
-              <a:srgbClr val="7030A0"/>
-            </a:solidFill>
-          </a:ln>
-          <a:effectLst/>
-        </p:spPr>
-        <p:style>
-          <a:lnRef idx="1">
-            <a:schemeClr val="accent6"/>
-          </a:lnRef>
-          <a:fillRef idx="2">
-            <a:schemeClr val="accent6"/>
-          </a:fillRef>
-          <a:effectRef idx="1">
-            <a:schemeClr val="accent6"/>
-          </a:effectRef>
-          <a:fontRef idx="minor">
-            <a:schemeClr val="dk1"/>
-          </a:fontRef>
-        </p:style>
-        <p:txBody>
-          <a:bodyPr rtlCol="0" anchor="ctr"/>
-          <a:lstStyle/>
-          <a:p>
-            <a:pPr algn="ctr"/>
-            <a:endParaRPr lang="en-US" sz="1050"/>
-          </a:p>
-        </p:txBody>
-      </p:sp>
-      <p:cxnSp>
-        <p:nvCxnSpPr>
-          <p:cNvPr id="69" name="Elbow Connector 68"/>
-          <p:cNvCxnSpPr>
-            <a:stCxn id="68" idx="3"/>
-            <a:endCxn id="67" idx="1"/>
-          </p:cNvCxnSpPr>
-          <p:nvPr/>
-        </p:nvCxnSpPr>
-        <p:spPr>
-          <a:xfrm rot="5400000" flipH="1" flipV="1">
-            <a:off x="5531134" y="848147"/>
-            <a:ext cx="52494" cy="296415"/>
-          </a:xfrm>
-          <a:prstGeom prst="bentConnector2">
-            <a:avLst/>
-          </a:prstGeom>
-          <a:ln w="19050">
-            <a:solidFill>
-              <a:srgbClr val="7030A0"/>
-            </a:solidFill>
-            <a:headEnd type="none" w="med" len="med"/>
-            <a:tailEnd type="arrow" w="med" len="med"/>
-          </a:ln>
-          <a:effectLst/>
-        </p:spPr>
-        <p:style>
-          <a:lnRef idx="1">
-            <a:schemeClr val="accent2"/>
-          </a:lnRef>
-          <a:fillRef idx="2">
-            <a:schemeClr val="accent2"/>
-          </a:fillRef>
-          <a:effectRef idx="1">
-            <a:schemeClr val="accent2"/>
-          </a:effectRef>
-          <a:fontRef idx="minor">
-            <a:schemeClr val="dk1"/>
-          </a:fontRef>
-        </p:style>
-      </p:cxnSp>
-      <p:sp>
-        <p:nvSpPr>
-          <p:cNvPr id="72" name="Rectangle 8"/>
-          <p:cNvSpPr/>
-          <p:nvPr/>
-        </p:nvSpPr>
-        <p:spPr>
-          <a:xfrm>
-            <a:off x="2890147" y="3691840"/>
-            <a:ext cx="1045383" cy="346760"/>
-          </a:xfrm>
-          <a:prstGeom prst="rect">
-            <a:avLst/>
-          </a:prstGeom>
-          <a:ln w="19050">
-            <a:solidFill>
-              <a:srgbClr val="7030A0"/>
-            </a:solidFill>
-          </a:ln>
-          <a:effectLst/>
-        </p:spPr>
-        <p:style>
-          <a:lnRef idx="1">
-            <a:schemeClr val="accent4"/>
-          </a:lnRef>
-          <a:fillRef idx="2">
-            <a:schemeClr val="accent4"/>
-          </a:fillRef>
-          <a:effectRef idx="1">
-            <a:schemeClr val="accent4"/>
-          </a:effectRef>
-          <a:fontRef idx="minor">
-            <a:schemeClr val="dk1"/>
-          </a:fontRef>
-        </p:style>
-        <p:txBody>
-          <a:bodyPr rtlCol="0" anchor="ctr"/>
-          <a:lstStyle/>
-          <a:p>
-            <a:pPr algn="ctr"/>
-            <a:r>
-              <a:rPr lang="en-US" sz="1050" dirty="0">
-                <a:solidFill>
-                  <a:srgbClr val="7030A0"/>
-                </a:solidFill>
-              </a:rPr>
-              <a:t>&lt;&lt;interface&gt;&gt;</a:t>
-            </a:r>
-            <a:br>
-              <a:rPr lang="en-US" sz="1050" dirty="0">
-                <a:solidFill>
-                  <a:srgbClr val="7030A0"/>
-                </a:solidFill>
-              </a:rPr>
-            </a:br>
-            <a:r>
-              <a:rPr lang="en-US" sz="1050" dirty="0" err="1">
-                <a:solidFill>
-                  <a:srgbClr val="7030A0"/>
-                </a:solidFill>
-              </a:rPr>
-              <a:t>ReadOnlyEntry</a:t>
-            </a:r>
-            <a:endParaRPr lang="en-SG" sz="1050" dirty="0">
-              <a:solidFill>
-                <a:srgbClr val="7030A0"/>
-              </a:solidFill>
-            </a:endParaRPr>
-          </a:p>
-        </p:txBody>
-      </p:sp>
-      <p:sp>
-        <p:nvSpPr>
-          <p:cNvPr id="76" name="Rectangle 8"/>
-          <p:cNvSpPr/>
-          <p:nvPr/>
-        </p:nvSpPr>
-        <p:spPr>
-          <a:xfrm>
-            <a:off x="6641977" y="838200"/>
-            <a:ext cx="708186" cy="285783"/>
-          </a:xfrm>
-          <a:prstGeom prst="rect">
-            <a:avLst/>
-          </a:prstGeom>
-          <a:ln w="19050">
-            <a:solidFill>
-              <a:srgbClr val="7030A0"/>
-            </a:solidFill>
-          </a:ln>
-          <a:effectLst/>
-        </p:spPr>
-        <p:style>
-          <a:lnRef idx="1">
-            <a:schemeClr val="accent4"/>
-          </a:lnRef>
-          <a:fillRef idx="2">
-            <a:schemeClr val="accent4"/>
-          </a:fillRef>
-          <a:effectRef idx="1">
-            <a:schemeClr val="accent4"/>
-          </a:effectRef>
-          <a:fontRef idx="minor">
-            <a:schemeClr val="dk1"/>
-          </a:fontRef>
-        </p:style>
-        <p:txBody>
-          <a:bodyPr rtlCol="0" anchor="ctr"/>
-          <a:lstStyle/>
-          <a:p>
-            <a:pPr algn="ctr"/>
-            <a:r>
-              <a:rPr lang="en-US" sz="1050">
-                <a:solidFill>
-                  <a:srgbClr val="7030A0"/>
-                </a:solidFill>
-              </a:rPr>
-              <a:t>Name</a:t>
-            </a:r>
-            <a:endParaRPr lang="en-SG" sz="1050" dirty="0">
-              <a:solidFill>
-                <a:srgbClr val="7030A0"/>
-              </a:solidFill>
-            </a:endParaRPr>
-          </a:p>
-        </p:txBody>
-      </p:sp>
-      <p:sp>
-        <p:nvSpPr>
-          <p:cNvPr id="78" name="Flowchart: Decision 96"/>
-          <p:cNvSpPr/>
-          <p:nvPr/>
-        </p:nvSpPr>
-        <p:spPr>
-          <a:xfrm rot="16200000">
-            <a:off x="6878045" y="1833175"/>
-            <a:ext cx="236048" cy="173380"/>
-          </a:xfrm>
-          <a:prstGeom prst="flowChartDecision">
-            <a:avLst/>
-          </a:prstGeom>
-          <a:solidFill>
-            <a:srgbClr val="7030A0"/>
-          </a:solidFill>
-          <a:ln w="19050">
-            <a:solidFill>
-              <a:srgbClr val="7030A0"/>
-            </a:solidFill>
-          </a:ln>
-          <a:effectLst/>
-        </p:spPr>
-        <p:style>
-          <a:lnRef idx="1">
-            <a:schemeClr val="accent6"/>
-          </a:lnRef>
-          <a:fillRef idx="2">
-            <a:schemeClr val="accent6"/>
-          </a:fillRef>
-          <a:effectRef idx="1">
-            <a:schemeClr val="accent6"/>
-          </a:effectRef>
-          <a:fontRef idx="minor">
-            <a:schemeClr val="dk1"/>
-          </a:fontRef>
-        </p:style>
-        <p:txBody>
-          <a:bodyPr rtlCol="0" anchor="ctr"/>
-          <a:lstStyle/>
-          <a:p>
-            <a:pPr algn="ctr"/>
-            <a:endParaRPr lang="en-US" sz="1050"/>
-          </a:p>
-        </p:txBody>
-      </p:sp>
-      <p:cxnSp>
-        <p:nvCxnSpPr>
-          <p:cNvPr id="79" name="Elbow Connector 78"/>
-          <p:cNvCxnSpPr>
-            <a:cxnSpLocks/>
-            <a:stCxn id="78" idx="3"/>
-            <a:endCxn id="76" idx="2"/>
-          </p:cNvCxnSpPr>
-          <p:nvPr/>
-        </p:nvCxnSpPr>
-        <p:spPr>
-          <a:xfrm rot="5400000" flipH="1" flipV="1">
-            <a:off x="6657140" y="1462912"/>
-            <a:ext cx="677858" cy="1"/>
-          </a:xfrm>
-          <a:prstGeom prst="bentConnector3">
-            <a:avLst>
-              <a:gd name="adj1" fmla="val 50000"/>
-            </a:avLst>
-          </a:prstGeom>
-          <a:ln w="19050">
-            <a:solidFill>
-              <a:srgbClr val="7030A0"/>
-            </a:solidFill>
-            <a:headEnd type="none" w="med" len="med"/>
-            <a:tailEnd type="arrow" w="med" len="med"/>
-          </a:ln>
-          <a:effectLst/>
-        </p:spPr>
-        <p:style>
-          <a:lnRef idx="1">
-            <a:schemeClr val="accent2"/>
-          </a:lnRef>
-          <a:fillRef idx="2">
-            <a:schemeClr val="accent2"/>
-          </a:fillRef>
-          <a:effectRef idx="1">
-            <a:schemeClr val="accent2"/>
-          </a:effectRef>
-          <a:fontRef idx="minor">
-            <a:schemeClr val="dk1"/>
-          </a:fontRef>
-        </p:style>
-      </p:cxnSp>
-      <p:cxnSp>
-        <p:nvCxnSpPr>
-          <p:cNvPr id="97" name="Elbow Connector 63"/>
-          <p:cNvCxnSpPr>
-            <a:cxnSpLocks/>
-            <a:stCxn id="99" idx="3"/>
-            <a:endCxn id="46" idx="0"/>
-          </p:cNvCxnSpPr>
-          <p:nvPr/>
-        </p:nvCxnSpPr>
-        <p:spPr>
-          <a:xfrm rot="16200000" flipH="1">
-            <a:off x="3304062" y="1917226"/>
-            <a:ext cx="103181" cy="78"/>
-          </a:xfrm>
-          <a:prstGeom prst="bentConnector3">
-            <a:avLst>
-              <a:gd name="adj1" fmla="val 50000"/>
-            </a:avLst>
-          </a:prstGeom>
-          <a:ln w="19050">
-            <a:solidFill>
-              <a:srgbClr val="7030A0"/>
-            </a:solidFill>
-            <a:prstDash val="sysDot"/>
-            <a:headEnd type="none" w="med" len="med"/>
-            <a:tailEnd type="none" w="med" len="med"/>
-          </a:ln>
-          <a:effectLst/>
-        </p:spPr>
-        <p:style>
-          <a:lnRef idx="1">
-            <a:schemeClr val="accent2"/>
-          </a:lnRef>
-          <a:fillRef idx="2">
-            <a:schemeClr val="accent2"/>
-          </a:fillRef>
-          <a:effectRef idx="1">
-            <a:schemeClr val="accent2"/>
-          </a:effectRef>
-          <a:fontRef idx="minor">
-            <a:schemeClr val="dk1"/>
-          </a:fontRef>
-        </p:style>
-      </p:cxnSp>
-      <p:sp>
-        <p:nvSpPr>
-          <p:cNvPr id="99" name="Isosceles Triangle 102"/>
-          <p:cNvSpPr/>
-          <p:nvPr/>
-        </p:nvSpPr>
-        <p:spPr>
-          <a:xfrm rot="10800000" flipV="1">
-            <a:off x="3220361" y="1690152"/>
+          <a:xfrm rot="5400000" flipV="1">
+            <a:off x="3266468" y="5396925"/>
             <a:ext cx="270504" cy="175523"/>
           </a:xfrm>
           <a:prstGeom prst="triangle">
@@ -15987,687 +14732,10 @@
       </p:sp>
       <p:sp>
         <p:nvSpPr>
-          <p:cNvPr id="100" name="Rectangle 8"/>
-          <p:cNvSpPr/>
-          <p:nvPr/>
-        </p:nvSpPr>
-        <p:spPr>
-          <a:xfrm>
-            <a:off x="2589686" y="1329640"/>
-            <a:ext cx="1539926" cy="346760"/>
-          </a:xfrm>
-          <a:prstGeom prst="rect">
-            <a:avLst/>
-          </a:prstGeom>
-          <a:ln w="19050">
-            <a:solidFill>
-              <a:srgbClr val="7030A0"/>
-            </a:solidFill>
-          </a:ln>
-          <a:effectLst/>
-        </p:spPr>
-        <p:style>
-          <a:lnRef idx="1">
-            <a:schemeClr val="accent4"/>
-          </a:lnRef>
-          <a:fillRef idx="2">
-            <a:schemeClr val="accent4"/>
-          </a:fillRef>
-          <a:effectRef idx="1">
-            <a:schemeClr val="accent4"/>
-          </a:effectRef>
-          <a:fontRef idx="minor">
-            <a:schemeClr val="dk1"/>
-          </a:fontRef>
-        </p:style>
-        <p:txBody>
-          <a:bodyPr rtlCol="0" anchor="ctr"/>
-          <a:lstStyle/>
-          <a:p>
-            <a:pPr algn="ctr"/>
-            <a:r>
-              <a:rPr lang="en-US" sz="1050" dirty="0">
-                <a:solidFill>
-                  <a:srgbClr val="7030A0"/>
-                </a:solidFill>
-              </a:rPr>
-              <a:t>&lt;&lt;interface&gt;&gt;</a:t>
-            </a:r>
-            <a:br>
-              <a:rPr lang="en-US" sz="1050" dirty="0">
-                <a:solidFill>
-                  <a:srgbClr val="7030A0"/>
-                </a:solidFill>
-              </a:rPr>
-            </a:br>
-            <a:r>
-              <a:rPr lang="en-US" sz="1050" dirty="0" err="1">
-                <a:solidFill>
-                  <a:srgbClr val="7030A0"/>
-                </a:solidFill>
-              </a:rPr>
-              <a:t>ReadOnlyEntryBook</a:t>
-            </a:r>
-            <a:endParaRPr lang="en-SG" sz="1050" dirty="0">
-              <a:solidFill>
-                <a:srgbClr val="7030A0"/>
-              </a:solidFill>
-            </a:endParaRPr>
-          </a:p>
-        </p:txBody>
-      </p:sp>
-      <p:sp>
-        <p:nvSpPr>
-          <p:cNvPr id="114" name="TextBox 113"/>
-          <p:cNvSpPr txBox="1"/>
-          <p:nvPr/>
-        </p:nvSpPr>
-        <p:spPr>
-          <a:xfrm rot="16200000">
-            <a:off x="1642329" y="3357704"/>
-            <a:ext cx="881018" cy="261610"/>
-          </a:xfrm>
-          <a:prstGeom prst="rect">
-            <a:avLst/>
-          </a:prstGeom>
-          <a:noFill/>
-        </p:spPr>
-        <p:txBody>
-          <a:bodyPr wrap="square" rtlCol="0">
-            <a:spAutoFit/>
-          </a:bodyPr>
-          <a:lstStyle/>
-          <a:p>
-            <a:pPr algn="r"/>
-            <a:r>
-              <a:rPr lang="en-US" sz="1100" dirty="0">
-                <a:solidFill>
-                  <a:srgbClr val="7030A0"/>
-                </a:solidFill>
-              </a:rPr>
-              <a:t>filtered list</a:t>
-            </a:r>
-            <a:endParaRPr lang="en-SG" sz="1100" dirty="0">
-              <a:solidFill>
-                <a:srgbClr val="7030A0"/>
-              </a:solidFill>
-            </a:endParaRPr>
-          </a:p>
-        </p:txBody>
-      </p:sp>
-      <p:sp>
-        <p:nvSpPr>
-          <p:cNvPr id="122" name="Rectangle 8"/>
-          <p:cNvSpPr/>
-          <p:nvPr/>
-        </p:nvSpPr>
-        <p:spPr>
-          <a:xfrm>
-            <a:off x="2343612" y="860095"/>
-            <a:ext cx="1775949" cy="346760"/>
-          </a:xfrm>
-          <a:prstGeom prst="rect">
-            <a:avLst/>
-          </a:prstGeom>
-          <a:ln w="19050">
-            <a:solidFill>
-              <a:srgbClr val="7030A0"/>
-            </a:solidFill>
-          </a:ln>
-          <a:effectLst/>
-        </p:spPr>
-        <p:style>
-          <a:lnRef idx="1">
-            <a:schemeClr val="accent4"/>
-          </a:lnRef>
-          <a:fillRef idx="2">
-            <a:schemeClr val="accent4"/>
-          </a:fillRef>
-          <a:effectRef idx="1">
-            <a:schemeClr val="accent4"/>
-          </a:effectRef>
-          <a:fontRef idx="minor">
-            <a:schemeClr val="dk1"/>
-          </a:fontRef>
-        </p:style>
-        <p:txBody>
-          <a:bodyPr rtlCol="0" anchor="ctr"/>
-          <a:lstStyle/>
-          <a:p>
-            <a:pPr algn="ctr"/>
-            <a:r>
-              <a:rPr lang="en-US" sz="1050" dirty="0">
-                <a:solidFill>
-                  <a:srgbClr val="7030A0"/>
-                </a:solidFill>
-              </a:rPr>
-              <a:t>&lt;&lt;interface&gt;&gt;</a:t>
-            </a:r>
-            <a:br>
-              <a:rPr lang="en-US" sz="1050" dirty="0">
-                <a:solidFill>
-                  <a:srgbClr val="7030A0"/>
-                </a:solidFill>
-              </a:rPr>
-            </a:br>
-            <a:r>
-              <a:rPr lang="en-US" sz="1050" dirty="0" err="1">
-                <a:solidFill>
-                  <a:srgbClr val="7030A0"/>
-                </a:solidFill>
-              </a:rPr>
-              <a:t>UnmodifiableObservableList</a:t>
-            </a:r>
-            <a:endParaRPr lang="en-SG" sz="1050" dirty="0">
-              <a:solidFill>
-                <a:srgbClr val="7030A0"/>
-              </a:solidFill>
-            </a:endParaRPr>
-          </a:p>
-        </p:txBody>
-      </p:sp>
-      <p:cxnSp>
-        <p:nvCxnSpPr>
-          <p:cNvPr id="124" name="Elbow Connector 122"/>
-          <p:cNvCxnSpPr>
-            <a:cxnSpLocks/>
-            <a:stCxn id="119" idx="3"/>
-            <a:endCxn id="122" idx="1"/>
-          </p:cNvCxnSpPr>
-          <p:nvPr/>
-        </p:nvCxnSpPr>
-        <p:spPr>
-          <a:xfrm rot="5400000" flipH="1" flipV="1">
-            <a:off x="1516884" y="1002473"/>
-            <a:ext cx="795726" cy="857730"/>
-          </a:xfrm>
-          <a:prstGeom prst="bentConnector2">
-            <a:avLst/>
-          </a:prstGeom>
-          <a:ln w="19050">
-            <a:solidFill>
-              <a:srgbClr val="7030A0"/>
-            </a:solidFill>
-            <a:prstDash val="sysDot"/>
-            <a:headEnd type="none" w="med" len="med"/>
-            <a:tailEnd type="arrow" w="med" len="med"/>
-          </a:ln>
-          <a:effectLst/>
-        </p:spPr>
-        <p:style>
-          <a:lnRef idx="1">
-            <a:schemeClr val="accent2"/>
-          </a:lnRef>
-          <a:fillRef idx="2">
-            <a:schemeClr val="accent2"/>
-          </a:fillRef>
-          <a:effectRef idx="1">
-            <a:schemeClr val="accent2"/>
-          </a:effectRef>
-          <a:fontRef idx="minor">
-            <a:schemeClr val="dk1"/>
-          </a:fontRef>
-        </p:style>
-      </p:cxnSp>
-      <p:cxnSp>
-        <p:nvCxnSpPr>
-          <p:cNvPr id="50" name="Elbow Connector 49"/>
-          <p:cNvCxnSpPr>
-            <a:cxnSpLocks/>
-            <a:stCxn id="78" idx="3"/>
-            <a:endCxn id="57" idx="3"/>
-          </p:cNvCxnSpPr>
-          <p:nvPr/>
-        </p:nvCxnSpPr>
-        <p:spPr>
-          <a:xfrm rot="16200000" flipV="1">
-            <a:off x="6312294" y="1118065"/>
-            <a:ext cx="360497" cy="1007055"/>
-          </a:xfrm>
-          <a:prstGeom prst="bentConnector2">
-            <a:avLst/>
-          </a:prstGeom>
-          <a:ln w="19050">
-            <a:solidFill>
-              <a:srgbClr val="7030A0"/>
-            </a:solidFill>
-            <a:headEnd type="none" w="med" len="med"/>
-            <a:tailEnd type="arrow" w="med" len="med"/>
-          </a:ln>
-          <a:effectLst/>
-        </p:spPr>
-        <p:style>
-          <a:lnRef idx="1">
-            <a:schemeClr val="accent2"/>
-          </a:lnRef>
-          <a:fillRef idx="2">
-            <a:schemeClr val="accent2"/>
-          </a:fillRef>
-          <a:effectRef idx="1">
-            <a:schemeClr val="accent2"/>
-          </a:effectRef>
-          <a:fontRef idx="minor">
-            <a:schemeClr val="dk1"/>
-          </a:fontRef>
-        </p:style>
-      </p:cxnSp>
-      <p:sp>
-        <p:nvSpPr>
-          <p:cNvPr id="11" name="TextBox 10"/>
-          <p:cNvSpPr txBox="1"/>
-          <p:nvPr/>
-        </p:nvSpPr>
-        <p:spPr>
-          <a:xfrm>
-            <a:off x="4564394" y="1224242"/>
-            <a:ext cx="189257" cy="178683"/>
-          </a:xfrm>
-          <a:prstGeom prst="rect">
-            <a:avLst/>
-          </a:prstGeom>
-          <a:noFill/>
-        </p:spPr>
-        <p:txBody>
-          <a:bodyPr wrap="square" lIns="0" tIns="0" rIns="0" bIns="0" rtlCol="0">
-            <a:noAutofit/>
-          </a:bodyPr>
-          <a:lstStyle/>
-          <a:p>
-            <a:pPr algn="ctr"/>
-            <a:r>
-              <a:rPr lang="en-US" sz="1100" dirty="0">
-                <a:solidFill>
-                  <a:srgbClr val="7030A0"/>
-                </a:solidFill>
-              </a:rPr>
-              <a:t>1</a:t>
-            </a:r>
-            <a:endParaRPr lang="en-SG" sz="1100" dirty="0">
-              <a:solidFill>
-                <a:srgbClr val="7030A0"/>
-              </a:solidFill>
-            </a:endParaRPr>
-          </a:p>
-        </p:txBody>
-      </p:sp>
-      <p:sp>
-        <p:nvSpPr>
-          <p:cNvPr id="54" name="TextBox 53"/>
-          <p:cNvSpPr txBox="1"/>
-          <p:nvPr/>
-        </p:nvSpPr>
-        <p:spPr>
-          <a:xfrm>
-            <a:off x="4573055" y="1624714"/>
-            <a:ext cx="189257" cy="178683"/>
-          </a:xfrm>
-          <a:prstGeom prst="rect">
-            <a:avLst/>
-          </a:prstGeom>
-          <a:noFill/>
-        </p:spPr>
-        <p:txBody>
-          <a:bodyPr wrap="square" lIns="0" tIns="0" rIns="0" bIns="0" rtlCol="0">
-            <a:noAutofit/>
-          </a:bodyPr>
-          <a:lstStyle/>
-          <a:p>
-            <a:pPr algn="ctr"/>
-            <a:r>
-              <a:rPr lang="en-US" sz="1100" dirty="0">
-                <a:solidFill>
-                  <a:srgbClr val="7030A0"/>
-                </a:solidFill>
-              </a:rPr>
-              <a:t>1</a:t>
-            </a:r>
-            <a:endParaRPr lang="en-SG" sz="1100" dirty="0">
-              <a:solidFill>
-                <a:srgbClr val="7030A0"/>
-              </a:solidFill>
-            </a:endParaRPr>
-          </a:p>
-        </p:txBody>
-      </p:sp>
-      <p:sp>
-        <p:nvSpPr>
-          <p:cNvPr id="56" name="TextBox 55"/>
-          <p:cNvSpPr txBox="1"/>
-          <p:nvPr/>
-        </p:nvSpPr>
-        <p:spPr>
-          <a:xfrm>
-            <a:off x="6059245" y="1482808"/>
-            <a:ext cx="189257" cy="178683"/>
-          </a:xfrm>
-          <a:prstGeom prst="rect">
-            <a:avLst/>
-          </a:prstGeom>
-          <a:noFill/>
-        </p:spPr>
-        <p:txBody>
-          <a:bodyPr wrap="square" lIns="0" tIns="0" rIns="0" bIns="0" rtlCol="0">
-            <a:noAutofit/>
-          </a:bodyPr>
-          <a:lstStyle/>
-          <a:p>
-            <a:pPr algn="ctr"/>
-            <a:r>
-              <a:rPr lang="en-US" sz="1100" dirty="0">
-                <a:solidFill>
-                  <a:srgbClr val="7030A0"/>
-                </a:solidFill>
-              </a:rPr>
-              <a:t>1</a:t>
-            </a:r>
-            <a:endParaRPr lang="en-SG" sz="1100" dirty="0">
-              <a:solidFill>
-                <a:srgbClr val="7030A0"/>
-              </a:solidFill>
-            </a:endParaRPr>
-          </a:p>
-        </p:txBody>
-      </p:sp>
-      <p:sp>
-        <p:nvSpPr>
-          <p:cNvPr id="60" name="TextBox 59"/>
-          <p:cNvSpPr txBox="1"/>
-          <p:nvPr/>
-        </p:nvSpPr>
-        <p:spPr>
-          <a:xfrm>
-            <a:off x="5506098" y="769536"/>
-            <a:ext cx="189257" cy="178683"/>
-          </a:xfrm>
-          <a:prstGeom prst="rect">
-            <a:avLst/>
-          </a:prstGeom>
-          <a:noFill/>
-        </p:spPr>
-        <p:txBody>
-          <a:bodyPr wrap="square" lIns="0" tIns="0" rIns="0" bIns="0" rtlCol="0">
-            <a:noAutofit/>
-          </a:bodyPr>
-          <a:lstStyle/>
-          <a:p>
-            <a:pPr algn="ctr"/>
-            <a:r>
-              <a:rPr lang="en-US" sz="1100" dirty="0">
-                <a:solidFill>
-                  <a:srgbClr val="7030A0"/>
-                </a:solidFill>
-              </a:rPr>
-              <a:t>*</a:t>
-            </a:r>
-            <a:endParaRPr lang="en-SG" sz="1100" dirty="0">
-              <a:solidFill>
-                <a:srgbClr val="7030A0"/>
-              </a:solidFill>
-            </a:endParaRPr>
-          </a:p>
-        </p:txBody>
-      </p:sp>
-      <p:sp>
-        <p:nvSpPr>
-          <p:cNvPr id="61" name="TextBox 60"/>
-          <p:cNvSpPr txBox="1"/>
-          <p:nvPr/>
-        </p:nvSpPr>
-        <p:spPr>
-          <a:xfrm>
-            <a:off x="6357509" y="2043611"/>
-            <a:ext cx="189257" cy="178683"/>
-          </a:xfrm>
-          <a:prstGeom prst="rect">
-            <a:avLst/>
-          </a:prstGeom>
-          <a:noFill/>
-        </p:spPr>
-        <p:txBody>
-          <a:bodyPr wrap="square" lIns="0" tIns="0" rIns="0" bIns="0" rtlCol="0">
-            <a:noAutofit/>
-          </a:bodyPr>
-          <a:lstStyle/>
-          <a:p>
-            <a:pPr algn="ctr"/>
-            <a:r>
-              <a:rPr lang="en-US" sz="1100" dirty="0">
-                <a:solidFill>
-                  <a:srgbClr val="7030A0"/>
-                </a:solidFill>
-              </a:rPr>
-              <a:t>*</a:t>
-            </a:r>
-            <a:endParaRPr lang="en-SG" sz="1100" dirty="0">
-              <a:solidFill>
-                <a:srgbClr val="7030A0"/>
-              </a:solidFill>
-            </a:endParaRPr>
-          </a:p>
-        </p:txBody>
-      </p:sp>
-      <p:sp>
-        <p:nvSpPr>
-          <p:cNvPr id="65" name="TextBox 64"/>
-          <p:cNvSpPr txBox="1"/>
-          <p:nvPr/>
-        </p:nvSpPr>
-        <p:spPr>
-          <a:xfrm>
-            <a:off x="2617306" y="1905674"/>
-            <a:ext cx="189257" cy="178683"/>
-          </a:xfrm>
-          <a:prstGeom prst="rect">
-            <a:avLst/>
-          </a:prstGeom>
-          <a:noFill/>
-        </p:spPr>
-        <p:txBody>
-          <a:bodyPr wrap="square" lIns="0" tIns="0" rIns="0" bIns="0" rtlCol="0">
-            <a:noAutofit/>
-          </a:bodyPr>
-          <a:lstStyle/>
-          <a:p>
-            <a:pPr algn="ctr"/>
-            <a:r>
-              <a:rPr lang="en-US" sz="1100" dirty="0">
-                <a:solidFill>
-                  <a:srgbClr val="7030A0"/>
-                </a:solidFill>
-              </a:rPr>
-              <a:t>1</a:t>
-            </a:r>
-            <a:endParaRPr lang="en-SG" sz="1100" dirty="0">
-              <a:solidFill>
-                <a:srgbClr val="7030A0"/>
-              </a:solidFill>
-            </a:endParaRPr>
-          </a:p>
-        </p:txBody>
-      </p:sp>
-      <p:sp>
-        <p:nvSpPr>
-          <p:cNvPr id="66" name="TextBox 65"/>
-          <p:cNvSpPr txBox="1"/>
-          <p:nvPr/>
-        </p:nvSpPr>
-        <p:spPr>
-          <a:xfrm>
-            <a:off x="2585753" y="2727486"/>
-            <a:ext cx="189257" cy="178683"/>
-          </a:xfrm>
-          <a:prstGeom prst="rect">
-            <a:avLst/>
-          </a:prstGeom>
-          <a:noFill/>
-        </p:spPr>
-        <p:txBody>
-          <a:bodyPr wrap="square" lIns="0" tIns="0" rIns="0" bIns="0" rtlCol="0">
-            <a:noAutofit/>
-          </a:bodyPr>
-          <a:lstStyle/>
-          <a:p>
-            <a:pPr algn="ctr"/>
-            <a:r>
-              <a:rPr lang="en-US" sz="1100" dirty="0">
-                <a:solidFill>
-                  <a:srgbClr val="7030A0"/>
-                </a:solidFill>
-              </a:rPr>
-              <a:t>1</a:t>
-            </a:r>
-            <a:endParaRPr lang="en-SG" sz="1100" dirty="0">
-              <a:solidFill>
-                <a:srgbClr val="7030A0"/>
-              </a:solidFill>
-            </a:endParaRPr>
-          </a:p>
-        </p:txBody>
-      </p:sp>
-      <p:sp>
-        <p:nvSpPr>
-          <p:cNvPr id="70" name="TextBox 69"/>
-          <p:cNvSpPr txBox="1"/>
-          <p:nvPr/>
-        </p:nvSpPr>
-        <p:spPr>
-          <a:xfrm>
-            <a:off x="4154143" y="3631998"/>
-            <a:ext cx="189257" cy="178683"/>
-          </a:xfrm>
-          <a:prstGeom prst="rect">
-            <a:avLst/>
-          </a:prstGeom>
-          <a:noFill/>
-        </p:spPr>
-        <p:txBody>
-          <a:bodyPr wrap="square" lIns="0" tIns="0" rIns="0" bIns="0" rtlCol="0">
-            <a:noAutofit/>
-          </a:bodyPr>
-          <a:lstStyle/>
-          <a:p>
-            <a:pPr algn="ctr"/>
-            <a:r>
-              <a:rPr lang="en-US" sz="1100" dirty="0">
-                <a:solidFill>
-                  <a:srgbClr val="7030A0"/>
-                </a:solidFill>
-              </a:rPr>
-              <a:t>1</a:t>
-            </a:r>
-            <a:endParaRPr lang="en-SG" sz="1100" dirty="0">
-              <a:solidFill>
-                <a:srgbClr val="7030A0"/>
-              </a:solidFill>
-            </a:endParaRPr>
-          </a:p>
-        </p:txBody>
-      </p:sp>
-      <p:cxnSp>
-        <p:nvCxnSpPr>
-          <p:cNvPr id="73" name="Elbow Connector 122">
+          <p:cNvPr id="137" name="Isosceles Triangle 102">
             <a:extLst>
               <a:ext uri="{FF2B5EF4-FFF2-40B4-BE49-F238E27FC236}">
-                <a16:creationId xmlns:a16="http://schemas.microsoft.com/office/drawing/2014/main" id="{6C194B6E-AD6B-4C34-821F-85FC683926D2}"/>
-              </a:ext>
-            </a:extLst>
-          </p:cNvPr>
-          <p:cNvCxnSpPr>
-            <a:cxnSpLocks/>
-            <a:stCxn id="119" idx="3"/>
-            <a:endCxn id="100" idx="1"/>
-          </p:cNvCxnSpPr>
-          <p:nvPr/>
-        </p:nvCxnSpPr>
-        <p:spPr>
-          <a:xfrm rot="5400000" flipH="1" flipV="1">
-            <a:off x="1874694" y="1114209"/>
-            <a:ext cx="326181" cy="1103804"/>
-          </a:xfrm>
-          <a:prstGeom prst="bentConnector2">
-            <a:avLst/>
-          </a:prstGeom>
-          <a:ln w="19050">
-            <a:solidFill>
-              <a:srgbClr val="7030A0"/>
-            </a:solidFill>
-            <a:prstDash val="sysDot"/>
-            <a:headEnd type="none" w="med" len="med"/>
-            <a:tailEnd type="arrow" w="med" len="med"/>
-          </a:ln>
-          <a:effectLst/>
-        </p:spPr>
-        <p:style>
-          <a:lnRef idx="1">
-            <a:schemeClr val="accent2"/>
-          </a:lnRef>
-          <a:fillRef idx="2">
-            <a:schemeClr val="accent2"/>
-          </a:fillRef>
-          <a:effectRef idx="1">
-            <a:schemeClr val="accent2"/>
-          </a:effectRef>
-          <a:fontRef idx="minor">
-            <a:schemeClr val="dk1"/>
-          </a:fontRef>
-        </p:style>
-      </p:cxnSp>
-      <p:cxnSp>
-        <p:nvCxnSpPr>
-          <p:cNvPr id="74" name="Elbow Connector 85">
-            <a:extLst>
-              <a:ext uri="{FF2B5EF4-FFF2-40B4-BE49-F238E27FC236}">
-                <a16:creationId xmlns:a16="http://schemas.microsoft.com/office/drawing/2014/main" id="{0BF0A13B-B2CA-43C0-A84A-D92BEE5134B9}"/>
-              </a:ext>
-            </a:extLst>
-          </p:cNvPr>
-          <p:cNvCxnSpPr>
-            <a:cxnSpLocks/>
-            <a:stCxn id="77" idx="3"/>
-            <a:endCxn id="117" idx="3"/>
-          </p:cNvCxnSpPr>
-          <p:nvPr/>
-        </p:nvCxnSpPr>
-        <p:spPr>
-          <a:xfrm flipV="1">
-            <a:off x="6952991" y="2220497"/>
-            <a:ext cx="703039" cy="2357939"/>
-          </a:xfrm>
-          <a:prstGeom prst="bentConnector3">
-            <a:avLst>
-              <a:gd name="adj1" fmla="val 139271"/>
-            </a:avLst>
-          </a:prstGeom>
-          <a:ln w="19050">
-            <a:solidFill>
-              <a:srgbClr val="7030A0"/>
-            </a:solidFill>
-            <a:headEnd type="none" w="med" len="med"/>
-            <a:tailEnd type="none" w="med" len="med"/>
-          </a:ln>
-          <a:effectLst/>
-        </p:spPr>
-        <p:style>
-          <a:lnRef idx="1">
-            <a:schemeClr val="accent2"/>
-          </a:lnRef>
-          <a:fillRef idx="2">
-            <a:schemeClr val="accent2"/>
-          </a:fillRef>
-          <a:effectRef idx="1">
-            <a:schemeClr val="accent2"/>
-          </a:effectRef>
-          <a:fontRef idx="minor">
-            <a:schemeClr val="dk1"/>
-          </a:fontRef>
-        </p:style>
-      </p:cxnSp>
-      <p:sp>
-        <p:nvSpPr>
-          <p:cNvPr id="77" name="Rectangle 8">
-            <a:extLst>
-              <a:ext uri="{FF2B5EF4-FFF2-40B4-BE49-F238E27FC236}">
-                <a16:creationId xmlns:a16="http://schemas.microsoft.com/office/drawing/2014/main" id="{0385A838-EEB2-4922-9B4E-2B6ECA006CD4}"/>
+                <a16:creationId xmlns:a16="http://schemas.microsoft.com/office/drawing/2014/main" id="{8F93B057-65CC-413B-A689-722BA03E4E00}"/>
               </a:ext>
             </a:extLst>
           </p:cNvPr>
@@ -16675,29 +14743,32 @@
           <p:nvPr/>
         </p:nvSpPr>
         <p:spPr>
-          <a:xfrm>
-            <a:off x="6249251" y="4435544"/>
-            <a:ext cx="703740" cy="285783"/>
-          </a:xfrm>
-          <a:prstGeom prst="rect">
-            <a:avLst/>
-          </a:prstGeom>
-          <a:ln w="19050">
-            <a:solidFill>
-              <a:srgbClr val="7030A0"/>
-            </a:solidFill>
-          </a:ln>
-          <a:effectLst/>
-        </p:spPr>
-        <p:style>
-          <a:lnRef idx="1">
-            <a:schemeClr val="accent4"/>
-          </a:lnRef>
-          <a:fillRef idx="2">
-            <a:schemeClr val="accent4"/>
-          </a:fillRef>
-          <a:effectRef idx="1">
-            <a:schemeClr val="accent4"/>
+          <a:xfrm rot="16200000">
+            <a:off x="3740160" y="2788449"/>
+            <a:ext cx="270504" cy="175523"/>
+          </a:xfrm>
+          <a:prstGeom prst="triangle">
+            <a:avLst/>
+          </a:prstGeom>
+          <a:solidFill>
+            <a:srgbClr val="7030A0"/>
+          </a:solidFill>
+          <a:ln w="19050">
+            <a:solidFill>
+              <a:srgbClr val="7030A0"/>
+            </a:solidFill>
+          </a:ln>
+          <a:effectLst/>
+        </p:spPr>
+        <p:style>
+          <a:lnRef idx="1">
+            <a:schemeClr val="accent6"/>
+          </a:lnRef>
+          <a:fillRef idx="2">
+            <a:schemeClr val="accent6"/>
+          </a:fillRef>
+          <a:effectRef idx="1">
+            <a:schemeClr val="accent6"/>
           </a:effectRef>
           <a:fontRef idx="minor">
             <a:schemeClr val="dk1"/>
@@ -16708,28 +14779,16 @@
           <a:lstStyle/>
           <a:p>
             <a:pPr algn="ctr"/>
-            <a:r>
-              <a:rPr lang="en-US" sz="1050">
-                <a:solidFill>
-                  <a:srgbClr val="7030A0"/>
-                </a:solidFill>
-              </a:rPr>
-              <a:t>Event</a:t>
-            </a:r>
-            <a:endParaRPr lang="en-SG" sz="1050" dirty="0">
-              <a:solidFill>
-                <a:srgbClr val="7030A0"/>
-              </a:solidFill>
-            </a:endParaRPr>
-          </a:p>
-        </p:txBody>
-      </p:sp>
-      <p:sp>
-        <p:nvSpPr>
-          <p:cNvPr id="82" name="Rectangle 8">
+            <a:endParaRPr lang="en-SG" sz="1050"/>
+          </a:p>
+        </p:txBody>
+      </p:sp>
+      <p:sp>
+        <p:nvSpPr>
+          <p:cNvPr id="138" name="Isosceles Triangle 102">
             <a:extLst>
               <a:ext uri="{FF2B5EF4-FFF2-40B4-BE49-F238E27FC236}">
-                <a16:creationId xmlns:a16="http://schemas.microsoft.com/office/drawing/2014/main" id="{B018534C-9921-4CC3-8436-96798BAD80C9}"/>
+                <a16:creationId xmlns:a16="http://schemas.microsoft.com/office/drawing/2014/main" id="{C405A132-B740-400A-9F71-C6A22C29B147}"/>
               </a:ext>
             </a:extLst>
           </p:cNvPr>
@@ -16738,756 +14797,10 @@
         </p:nvSpPr>
         <p:spPr>
           <a:xfrm>
-            <a:off x="5411051" y="4024969"/>
-            <a:ext cx="881679" cy="285783"/>
-          </a:xfrm>
-          <a:prstGeom prst="rect">
-            <a:avLst/>
-          </a:prstGeom>
-          <a:ln w="19050">
-            <a:solidFill>
-              <a:srgbClr val="7030A0"/>
-            </a:solidFill>
-          </a:ln>
-          <a:effectLst/>
-        </p:spPr>
-        <p:style>
-          <a:lnRef idx="1">
-            <a:schemeClr val="accent4"/>
-          </a:lnRef>
-          <a:fillRef idx="2">
-            <a:schemeClr val="accent4"/>
-          </a:fillRef>
-          <a:effectRef idx="1">
-            <a:schemeClr val="accent4"/>
-          </a:effectRef>
-          <a:fontRef idx="minor">
-            <a:schemeClr val="dk1"/>
-          </a:fontRef>
-        </p:style>
-        <p:txBody>
-          <a:bodyPr rtlCol="0" anchor="ctr"/>
-          <a:lstStyle/>
-          <a:p>
-            <a:pPr algn="ctr"/>
-            <a:r>
-              <a:rPr lang="en-US" sz="1050" dirty="0" err="1">
-                <a:solidFill>
-                  <a:srgbClr val="7030A0"/>
-                </a:solidFill>
-              </a:rPr>
-              <a:t>FloatingTask</a:t>
-            </a:r>
-            <a:endParaRPr lang="en-US" sz="1050" dirty="0">
-              <a:solidFill>
-                <a:srgbClr val="7030A0"/>
-              </a:solidFill>
-            </a:endParaRPr>
-          </a:p>
-        </p:txBody>
-      </p:sp>
-      <p:sp>
-        <p:nvSpPr>
-          <p:cNvPr id="87" name="Rectangle 8">
-            <a:extLst>
-              <a:ext uri="{FF2B5EF4-FFF2-40B4-BE49-F238E27FC236}">
-                <a16:creationId xmlns:a16="http://schemas.microsoft.com/office/drawing/2014/main" id="{FD92DEDE-8CCC-4D5A-A87C-6D4AD8C4B580}"/>
-              </a:ext>
-            </a:extLst>
-          </p:cNvPr>
-          <p:cNvSpPr/>
-          <p:nvPr/>
-        </p:nvSpPr>
-        <p:spPr>
-          <a:xfrm>
-            <a:off x="6916260" y="4819617"/>
-            <a:ext cx="703740" cy="285783"/>
-          </a:xfrm>
-          <a:prstGeom prst="rect">
-            <a:avLst/>
-          </a:prstGeom>
-          <a:ln w="19050">
-            <a:solidFill>
-              <a:srgbClr val="7030A0"/>
-            </a:solidFill>
-          </a:ln>
-          <a:effectLst/>
-        </p:spPr>
-        <p:style>
-          <a:lnRef idx="1">
-            <a:schemeClr val="accent4"/>
-          </a:lnRef>
-          <a:fillRef idx="2">
-            <a:schemeClr val="accent4"/>
-          </a:fillRef>
-          <a:effectRef idx="1">
-            <a:schemeClr val="accent4"/>
-          </a:effectRef>
-          <a:fontRef idx="minor">
-            <a:schemeClr val="dk1"/>
-          </a:fontRef>
-        </p:style>
-        <p:txBody>
-          <a:bodyPr rtlCol="0" anchor="ctr"/>
-          <a:lstStyle/>
-          <a:p>
-            <a:pPr algn="ctr"/>
-            <a:r>
-              <a:rPr lang="en-US" sz="1050" dirty="0">
-                <a:solidFill>
-                  <a:srgbClr val="7030A0"/>
-                </a:solidFill>
-              </a:rPr>
-              <a:t>Deadline</a:t>
-            </a:r>
-            <a:endParaRPr lang="en-SG" sz="1050" dirty="0">
-              <a:solidFill>
-                <a:srgbClr val="7030A0"/>
-              </a:solidFill>
-            </a:endParaRPr>
-          </a:p>
-        </p:txBody>
-      </p:sp>
-      <p:cxnSp>
-        <p:nvCxnSpPr>
-          <p:cNvPr id="94" name="Elbow Connector 85">
-            <a:extLst>
-              <a:ext uri="{FF2B5EF4-FFF2-40B4-BE49-F238E27FC236}">
-                <a16:creationId xmlns:a16="http://schemas.microsoft.com/office/drawing/2014/main" id="{ED2F0B51-3478-4720-BDF8-DD7B29CB36C3}"/>
-              </a:ext>
-            </a:extLst>
-          </p:cNvPr>
-          <p:cNvCxnSpPr>
-            <a:cxnSpLocks/>
-            <a:stCxn id="87" idx="3"/>
-            <a:endCxn id="117" idx="3"/>
-          </p:cNvCxnSpPr>
-          <p:nvPr/>
-        </p:nvCxnSpPr>
-        <p:spPr>
-          <a:xfrm flipV="1">
-            <a:off x="7620000" y="2220497"/>
-            <a:ext cx="36030" cy="2742012"/>
-          </a:xfrm>
-          <a:prstGeom prst="bentConnector3">
-            <a:avLst>
-              <a:gd name="adj1" fmla="val 866278"/>
-            </a:avLst>
-          </a:prstGeom>
-          <a:ln w="19050">
-            <a:solidFill>
-              <a:srgbClr val="7030A0"/>
-            </a:solidFill>
-            <a:headEnd type="none" w="med" len="med"/>
-            <a:tailEnd type="none" w="med" len="med"/>
-          </a:ln>
-          <a:effectLst/>
-        </p:spPr>
-        <p:style>
-          <a:lnRef idx="1">
-            <a:schemeClr val="accent2"/>
-          </a:lnRef>
-          <a:fillRef idx="2">
-            <a:schemeClr val="accent2"/>
-          </a:fillRef>
-          <a:effectRef idx="1">
-            <a:schemeClr val="accent2"/>
-          </a:effectRef>
-          <a:fontRef idx="minor">
-            <a:schemeClr val="dk1"/>
-          </a:fontRef>
-        </p:style>
-      </p:cxnSp>
-      <p:cxnSp>
-        <p:nvCxnSpPr>
-          <p:cNvPr id="98" name="Elbow Connector 85">
-            <a:extLst>
-              <a:ext uri="{FF2B5EF4-FFF2-40B4-BE49-F238E27FC236}">
-                <a16:creationId xmlns:a16="http://schemas.microsoft.com/office/drawing/2014/main" id="{77D93BAA-6F83-4157-8F77-043E3F11FB25}"/>
-              </a:ext>
-            </a:extLst>
-          </p:cNvPr>
-          <p:cNvCxnSpPr>
-            <a:cxnSpLocks/>
-            <a:stCxn id="82" idx="3"/>
-            <a:endCxn id="117" idx="3"/>
-          </p:cNvCxnSpPr>
-          <p:nvPr/>
-        </p:nvCxnSpPr>
-        <p:spPr>
-          <a:xfrm flipV="1">
-            <a:off x="6292730" y="2220497"/>
-            <a:ext cx="1363300" cy="1947364"/>
-          </a:xfrm>
-          <a:prstGeom prst="bentConnector3">
-            <a:avLst>
-              <a:gd name="adj1" fmla="val 120252"/>
-            </a:avLst>
-          </a:prstGeom>
-          <a:ln w="19050">
-            <a:solidFill>
-              <a:srgbClr val="7030A0"/>
-            </a:solidFill>
-            <a:headEnd type="none" w="med" len="med"/>
-            <a:tailEnd type="none" w="med" len="med"/>
-          </a:ln>
-          <a:effectLst/>
-        </p:spPr>
-        <p:style>
-          <a:lnRef idx="1">
-            <a:schemeClr val="accent2"/>
-          </a:lnRef>
-          <a:fillRef idx="2">
-            <a:schemeClr val="accent2"/>
-          </a:fillRef>
-          <a:effectRef idx="1">
-            <a:schemeClr val="accent2"/>
-          </a:effectRef>
-          <a:fontRef idx="minor">
-            <a:schemeClr val="dk1"/>
-          </a:fontRef>
-        </p:style>
-      </p:cxnSp>
-      <p:sp>
-        <p:nvSpPr>
-          <p:cNvPr id="153" name="TextBox 152">
-            <a:extLst>
-              <a:ext uri="{FF2B5EF4-FFF2-40B4-BE49-F238E27FC236}">
-                <a16:creationId xmlns:a16="http://schemas.microsoft.com/office/drawing/2014/main" id="{88FBB9DB-E26B-428F-AA6E-B20634747BE4}"/>
-              </a:ext>
-            </a:extLst>
-          </p:cNvPr>
-          <p:cNvSpPr txBox="1"/>
-          <p:nvPr/>
-        </p:nvSpPr>
-        <p:spPr>
-          <a:xfrm>
-            <a:off x="7052588" y="1138465"/>
-            <a:ext cx="189257" cy="178683"/>
-          </a:xfrm>
-          <a:prstGeom prst="rect">
-            <a:avLst/>
-          </a:prstGeom>
-          <a:noFill/>
-        </p:spPr>
-        <p:txBody>
-          <a:bodyPr wrap="square" lIns="0" tIns="0" rIns="0" bIns="0" rtlCol="0">
-            <a:noAutofit/>
-          </a:bodyPr>
-          <a:lstStyle/>
-          <a:p>
-            <a:pPr algn="ctr"/>
-            <a:r>
-              <a:rPr lang="en-US" sz="1100">
-                <a:solidFill>
-                  <a:srgbClr val="7030A0"/>
-                </a:solidFill>
-              </a:rPr>
-              <a:t>1</a:t>
-            </a:r>
-            <a:endParaRPr lang="en-SG" sz="1100" dirty="0">
-              <a:solidFill>
-                <a:srgbClr val="7030A0"/>
-              </a:solidFill>
-            </a:endParaRPr>
-          </a:p>
-        </p:txBody>
-      </p:sp>
-      <p:cxnSp>
-        <p:nvCxnSpPr>
-          <p:cNvPr id="268" name="Elbow Connector 58">
-            <a:extLst>
-              <a:ext uri="{FF2B5EF4-FFF2-40B4-BE49-F238E27FC236}">
-                <a16:creationId xmlns:a16="http://schemas.microsoft.com/office/drawing/2014/main" id="{A9D37834-AD78-452C-A0E4-1F0B40A9DA72}"/>
-              </a:ext>
-            </a:extLst>
-          </p:cNvPr>
-          <p:cNvCxnSpPr>
-            <a:cxnSpLocks/>
-            <a:stCxn id="93" idx="1"/>
-            <a:endCxn id="80" idx="3"/>
-          </p:cNvCxnSpPr>
-          <p:nvPr/>
-        </p:nvCxnSpPr>
-        <p:spPr>
-          <a:xfrm rot="10800000" flipV="1">
-            <a:off x="5061996" y="4570110"/>
-            <a:ext cx="950356" cy="1262"/>
-          </a:xfrm>
-          <a:prstGeom prst="bentConnector3">
-            <a:avLst>
-              <a:gd name="adj1" fmla="val 50000"/>
-            </a:avLst>
-          </a:prstGeom>
-          <a:ln w="19050">
-            <a:solidFill>
-              <a:srgbClr val="7030A0"/>
-            </a:solidFill>
-            <a:headEnd type="none" w="med" len="med"/>
-            <a:tailEnd type="arrow" w="med" len="med"/>
-          </a:ln>
-          <a:effectLst/>
-        </p:spPr>
-        <p:style>
-          <a:lnRef idx="1">
-            <a:schemeClr val="accent2"/>
-          </a:lnRef>
-          <a:fillRef idx="2">
-            <a:schemeClr val="accent2"/>
-          </a:fillRef>
-          <a:effectRef idx="1">
-            <a:schemeClr val="accent2"/>
-          </a:effectRef>
-          <a:fontRef idx="minor">
-            <a:schemeClr val="dk1"/>
-          </a:fontRef>
-        </p:style>
-      </p:cxnSp>
-      <p:cxnSp>
-        <p:nvCxnSpPr>
-          <p:cNvPr id="317" name="Elbow Connector 58">
-            <a:extLst>
-              <a:ext uri="{FF2B5EF4-FFF2-40B4-BE49-F238E27FC236}">
-                <a16:creationId xmlns:a16="http://schemas.microsoft.com/office/drawing/2014/main" id="{C3093632-1500-432F-A9DB-7AB4773E006E}"/>
-              </a:ext>
-            </a:extLst>
-          </p:cNvPr>
-          <p:cNvCxnSpPr>
-            <a:cxnSpLocks/>
-            <a:stCxn id="112" idx="1"/>
-            <a:endCxn id="80" idx="2"/>
-          </p:cNvCxnSpPr>
-          <p:nvPr/>
-        </p:nvCxnSpPr>
-        <p:spPr>
-          <a:xfrm rot="10800000">
-            <a:off x="4431847" y="4707200"/>
-            <a:ext cx="2246544" cy="255308"/>
-          </a:xfrm>
-          <a:prstGeom prst="bentConnector2">
-            <a:avLst/>
-          </a:prstGeom>
-          <a:ln w="19050">
-            <a:solidFill>
-              <a:srgbClr val="7030A0"/>
-            </a:solidFill>
-            <a:headEnd type="none" w="med" len="med"/>
-            <a:tailEnd type="arrow" w="med" len="med"/>
-          </a:ln>
-          <a:effectLst/>
-        </p:spPr>
-        <p:style>
-          <a:lnRef idx="1">
-            <a:schemeClr val="accent2"/>
-          </a:lnRef>
-          <a:fillRef idx="2">
-            <a:schemeClr val="accent2"/>
-          </a:fillRef>
-          <a:effectRef idx="1">
-            <a:schemeClr val="accent2"/>
-          </a:effectRef>
-          <a:fontRef idx="minor">
-            <a:schemeClr val="dk1"/>
-          </a:fontRef>
-        </p:style>
-      </p:cxnSp>
-      <p:sp>
-        <p:nvSpPr>
-          <p:cNvPr id="80" name="Rectangle 8">
-            <a:extLst>
-              <a:ext uri="{FF2B5EF4-FFF2-40B4-BE49-F238E27FC236}">
-                <a16:creationId xmlns:a16="http://schemas.microsoft.com/office/drawing/2014/main" id="{38053985-49C0-46E7-9DCF-1E8B04211018}"/>
-              </a:ext>
-            </a:extLst>
-          </p:cNvPr>
-          <p:cNvSpPr/>
-          <p:nvPr/>
-        </p:nvSpPr>
-        <p:spPr>
-          <a:xfrm>
-            <a:off x="3801698" y="4435544"/>
-            <a:ext cx="1260298" cy="271656"/>
-          </a:xfrm>
-          <a:prstGeom prst="rect">
-            <a:avLst/>
-          </a:prstGeom>
-          <a:ln w="19050">
-            <a:solidFill>
-              <a:srgbClr val="7030A0"/>
-            </a:solidFill>
-          </a:ln>
-          <a:effectLst/>
-        </p:spPr>
-        <p:style>
-          <a:lnRef idx="1">
-            <a:schemeClr val="accent4"/>
-          </a:lnRef>
-          <a:fillRef idx="2">
-            <a:schemeClr val="accent4"/>
-          </a:fillRef>
-          <a:effectRef idx="1">
-            <a:schemeClr val="accent4"/>
-          </a:effectRef>
-          <a:fontRef idx="minor">
-            <a:schemeClr val="dk1"/>
-          </a:fontRef>
-        </p:style>
-        <p:txBody>
-          <a:bodyPr rtlCol="0" anchor="ctr"/>
-          <a:lstStyle/>
-          <a:p>
-            <a:pPr algn="ctr"/>
-            <a:r>
-              <a:rPr lang="en-SG" sz="1050" dirty="0" err="1">
-                <a:solidFill>
-                  <a:srgbClr val="7030A0"/>
-                </a:solidFill>
-              </a:rPr>
-              <a:t>Java.util.Calendar</a:t>
-            </a:r>
-            <a:endParaRPr lang="en-SG" sz="1050" dirty="0">
-              <a:solidFill>
-                <a:srgbClr val="7030A0"/>
-              </a:solidFill>
-            </a:endParaRPr>
-          </a:p>
-        </p:txBody>
-      </p:sp>
-      <p:sp>
-        <p:nvSpPr>
-          <p:cNvPr id="84" name="Rectangle 8">
-            <a:extLst>
-              <a:ext uri="{FF2B5EF4-FFF2-40B4-BE49-F238E27FC236}">
-                <a16:creationId xmlns:a16="http://schemas.microsoft.com/office/drawing/2014/main" id="{FC5E9BBE-BA29-466E-87DB-E549C83DCF6F}"/>
-              </a:ext>
-            </a:extLst>
-          </p:cNvPr>
-          <p:cNvSpPr/>
-          <p:nvPr/>
-        </p:nvSpPr>
-        <p:spPr>
-          <a:xfrm>
-            <a:off x="4825428" y="2286000"/>
-            <a:ext cx="1156969" cy="518309"/>
-          </a:xfrm>
-          <a:prstGeom prst="rect">
-            <a:avLst/>
-          </a:prstGeom>
-          <a:ln w="19050">
-            <a:solidFill>
-              <a:srgbClr val="7030A0"/>
-            </a:solidFill>
-          </a:ln>
-          <a:effectLst/>
-        </p:spPr>
-        <p:style>
-          <a:lnRef idx="1">
-            <a:schemeClr val="accent4"/>
-          </a:lnRef>
-          <a:fillRef idx="2">
-            <a:schemeClr val="accent4"/>
-          </a:fillRef>
-          <a:effectRef idx="1">
-            <a:schemeClr val="accent4"/>
-          </a:effectRef>
-          <a:fontRef idx="minor">
-            <a:schemeClr val="dk1"/>
-          </a:fontRef>
-        </p:style>
-        <p:txBody>
-          <a:bodyPr rtlCol="0" anchor="ctr"/>
-          <a:lstStyle/>
-          <a:p>
-            <a:pPr algn="ctr"/>
-            <a:r>
-              <a:rPr lang="en-US" sz="1050" dirty="0">
-                <a:solidFill>
-                  <a:srgbClr val="7030A0"/>
-                </a:solidFill>
-              </a:rPr>
-              <a:t>Archive</a:t>
-            </a:r>
-            <a:endParaRPr lang="en-SG" sz="1050" dirty="0">
-              <a:solidFill>
-                <a:srgbClr val="7030A0"/>
-              </a:solidFill>
-            </a:endParaRPr>
-          </a:p>
-        </p:txBody>
-      </p:sp>
-      <p:sp>
-        <p:nvSpPr>
-          <p:cNvPr id="85" name="Flowchart: Decision 96">
-            <a:extLst>
-              <a:ext uri="{FF2B5EF4-FFF2-40B4-BE49-F238E27FC236}">
-                <a16:creationId xmlns:a16="http://schemas.microsoft.com/office/drawing/2014/main" id="{6A5FF266-C51C-4096-A31D-A2C77CC18DF3}"/>
-              </a:ext>
-            </a:extLst>
-          </p:cNvPr>
-          <p:cNvSpPr/>
-          <p:nvPr/>
-        </p:nvSpPr>
-        <p:spPr>
-          <a:xfrm>
-            <a:off x="5993267" y="2438400"/>
-            <a:ext cx="236048" cy="173380"/>
-          </a:xfrm>
-          <a:prstGeom prst="flowChartDecision">
-            <a:avLst/>
-          </a:prstGeom>
-          <a:noFill/>
-          <a:ln w="19050">
-            <a:solidFill>
-              <a:srgbClr val="7030A0"/>
-            </a:solidFill>
-          </a:ln>
-          <a:effectLst/>
-        </p:spPr>
-        <p:style>
-          <a:lnRef idx="1">
-            <a:schemeClr val="accent6"/>
-          </a:lnRef>
-          <a:fillRef idx="2">
-            <a:schemeClr val="accent6"/>
-          </a:fillRef>
-          <a:effectRef idx="1">
-            <a:schemeClr val="accent6"/>
-          </a:effectRef>
-          <a:fontRef idx="minor">
-            <a:schemeClr val="dk1"/>
-          </a:fontRef>
-        </p:style>
-        <p:txBody>
-          <a:bodyPr rtlCol="0" anchor="ctr"/>
-          <a:lstStyle/>
-          <a:p>
-            <a:pPr algn="ctr"/>
-            <a:endParaRPr lang="en-US" sz="1050"/>
-          </a:p>
-        </p:txBody>
-      </p:sp>
-      <p:cxnSp>
-        <p:nvCxnSpPr>
-          <p:cNvPr id="86" name="Elbow Connector 63">
-            <a:extLst>
-              <a:ext uri="{FF2B5EF4-FFF2-40B4-BE49-F238E27FC236}">
-                <a16:creationId xmlns:a16="http://schemas.microsoft.com/office/drawing/2014/main" id="{EE9C1E64-02F1-4593-A879-5B119D8AA9C5}"/>
-              </a:ext>
-            </a:extLst>
-          </p:cNvPr>
-          <p:cNvCxnSpPr>
-            <a:cxnSpLocks/>
-            <a:stCxn id="85" idx="3"/>
-            <a:endCxn id="62" idx="1"/>
-          </p:cNvCxnSpPr>
-          <p:nvPr/>
-        </p:nvCxnSpPr>
-        <p:spPr>
-          <a:xfrm flipV="1">
-            <a:off x="6229315" y="2231348"/>
-            <a:ext cx="299855" cy="293742"/>
-          </a:xfrm>
-          <a:prstGeom prst="bentConnector3">
-            <a:avLst/>
-          </a:prstGeom>
-          <a:ln w="19050">
-            <a:solidFill>
-              <a:srgbClr val="7030A0"/>
-            </a:solidFill>
-            <a:headEnd type="none" w="med" len="med"/>
-            <a:tailEnd type="arrow" w="med" len="med"/>
-          </a:ln>
-          <a:effectLst/>
-        </p:spPr>
-        <p:style>
-          <a:lnRef idx="1">
-            <a:schemeClr val="accent2"/>
-          </a:lnRef>
-          <a:fillRef idx="2">
-            <a:schemeClr val="accent2"/>
-          </a:fillRef>
-          <a:effectRef idx="1">
-            <a:schemeClr val="accent2"/>
-          </a:effectRef>
-          <a:fontRef idx="minor">
-            <a:schemeClr val="dk1"/>
-          </a:fontRef>
-        </p:style>
-      </p:cxnSp>
-      <p:sp>
-        <p:nvSpPr>
-          <p:cNvPr id="88" name="Rectangle 8">
-            <a:extLst>
-              <a:ext uri="{FF2B5EF4-FFF2-40B4-BE49-F238E27FC236}">
-                <a16:creationId xmlns:a16="http://schemas.microsoft.com/office/drawing/2014/main" id="{E5EE7A86-858B-4AB0-8E94-A35E30A00B59}"/>
-              </a:ext>
-            </a:extLst>
-          </p:cNvPr>
-          <p:cNvSpPr/>
-          <p:nvPr/>
-        </p:nvSpPr>
-        <p:spPr>
-          <a:xfrm>
-            <a:off x="4824247" y="2876751"/>
-            <a:ext cx="1156969" cy="476049"/>
-          </a:xfrm>
-          <a:prstGeom prst="rect">
-            <a:avLst/>
-          </a:prstGeom>
-          <a:ln w="19050">
-            <a:solidFill>
-              <a:srgbClr val="7030A0"/>
-            </a:solidFill>
-          </a:ln>
-          <a:effectLst/>
-        </p:spPr>
-        <p:style>
-          <a:lnRef idx="1">
-            <a:schemeClr val="accent4"/>
-          </a:lnRef>
-          <a:fillRef idx="2">
-            <a:schemeClr val="accent4"/>
-          </a:fillRef>
-          <a:effectRef idx="1">
-            <a:schemeClr val="accent4"/>
-          </a:effectRef>
-          <a:fontRef idx="minor">
-            <a:schemeClr val="dk1"/>
-          </a:fontRef>
-        </p:style>
-        <p:txBody>
-          <a:bodyPr rtlCol="0" anchor="ctr"/>
-          <a:lstStyle/>
-          <a:p>
-            <a:pPr algn="ctr"/>
-            <a:r>
-              <a:rPr lang="en-SG" sz="1050" dirty="0">
-                <a:solidFill>
-                  <a:srgbClr val="7030A0"/>
-                </a:solidFill>
-              </a:rPr>
-              <a:t>Bin</a:t>
-            </a:r>
-          </a:p>
-        </p:txBody>
-      </p:sp>
-      <p:sp>
-        <p:nvSpPr>
-          <p:cNvPr id="89" name="Flowchart: Decision 96">
-            <a:extLst>
-              <a:ext uri="{FF2B5EF4-FFF2-40B4-BE49-F238E27FC236}">
-                <a16:creationId xmlns:a16="http://schemas.microsoft.com/office/drawing/2014/main" id="{949CD2DD-7C3E-4172-8670-B8E57C938879}"/>
-              </a:ext>
-            </a:extLst>
-          </p:cNvPr>
-          <p:cNvSpPr/>
-          <p:nvPr/>
-        </p:nvSpPr>
-        <p:spPr>
-          <a:xfrm>
-            <a:off x="5998965" y="3027020"/>
-            <a:ext cx="236048" cy="173380"/>
-          </a:xfrm>
-          <a:prstGeom prst="flowChartDecision">
-            <a:avLst/>
-          </a:prstGeom>
-          <a:noFill/>
-          <a:ln w="19050">
-            <a:solidFill>
-              <a:srgbClr val="7030A0"/>
-            </a:solidFill>
-          </a:ln>
-          <a:effectLst/>
-        </p:spPr>
-        <p:style>
-          <a:lnRef idx="1">
-            <a:schemeClr val="accent6"/>
-          </a:lnRef>
-          <a:fillRef idx="2">
-            <a:schemeClr val="accent6"/>
-          </a:fillRef>
-          <a:effectRef idx="1">
-            <a:schemeClr val="accent6"/>
-          </a:effectRef>
-          <a:fontRef idx="minor">
-            <a:schemeClr val="dk1"/>
-          </a:fontRef>
-        </p:style>
-        <p:txBody>
-          <a:bodyPr rtlCol="0" anchor="ctr"/>
-          <a:lstStyle/>
-          <a:p>
-            <a:pPr algn="ctr"/>
-            <a:endParaRPr lang="en-US" sz="1050"/>
-          </a:p>
-        </p:txBody>
-      </p:sp>
-      <p:cxnSp>
-        <p:nvCxnSpPr>
-          <p:cNvPr id="90" name="Elbow Connector 63">
-            <a:extLst>
-              <a:ext uri="{FF2B5EF4-FFF2-40B4-BE49-F238E27FC236}">
-                <a16:creationId xmlns:a16="http://schemas.microsoft.com/office/drawing/2014/main" id="{7F134287-400C-42A6-8013-D79C3C996F45}"/>
-              </a:ext>
-            </a:extLst>
-          </p:cNvPr>
-          <p:cNvCxnSpPr>
-            <a:cxnSpLocks/>
-            <a:stCxn id="89" idx="3"/>
-            <a:endCxn id="62" idx="1"/>
-          </p:cNvCxnSpPr>
-          <p:nvPr/>
-        </p:nvCxnSpPr>
-        <p:spPr>
-          <a:xfrm flipV="1">
-            <a:off x="6235013" y="2231348"/>
-            <a:ext cx="294157" cy="882362"/>
-          </a:xfrm>
-          <a:prstGeom prst="bentConnector3">
-            <a:avLst/>
-          </a:prstGeom>
-          <a:ln w="19050">
-            <a:solidFill>
-              <a:srgbClr val="7030A0"/>
-            </a:solidFill>
-            <a:headEnd type="none" w="med" len="med"/>
-            <a:tailEnd type="arrow" w="med" len="med"/>
-          </a:ln>
-          <a:effectLst/>
-        </p:spPr>
-        <p:style>
-          <a:lnRef idx="1">
-            <a:schemeClr val="accent2"/>
-          </a:lnRef>
-          <a:fillRef idx="2">
-            <a:schemeClr val="accent2"/>
-          </a:fillRef>
-          <a:effectRef idx="1">
-            <a:schemeClr val="accent2"/>
-          </a:effectRef>
-          <a:fontRef idx="minor">
-            <a:schemeClr val="dk1"/>
-          </a:fontRef>
-        </p:style>
-      </p:cxnSp>
-      <p:sp>
-        <p:nvSpPr>
-          <p:cNvPr id="93" name="Flowchart: Decision 96">
-            <a:extLst>
-              <a:ext uri="{FF2B5EF4-FFF2-40B4-BE49-F238E27FC236}">
-                <a16:creationId xmlns:a16="http://schemas.microsoft.com/office/drawing/2014/main" id="{7E42058C-7FC1-48B6-B0A0-82326A89238D}"/>
-              </a:ext>
-            </a:extLst>
-          </p:cNvPr>
-          <p:cNvSpPr/>
-          <p:nvPr/>
-        </p:nvSpPr>
-        <p:spPr>
-          <a:xfrm>
-            <a:off x="6012352" y="4483420"/>
-            <a:ext cx="236048" cy="173380"/>
-          </a:xfrm>
-          <a:prstGeom prst="flowChartDecision">
+            <a:off x="3218128" y="1297959"/>
+            <a:ext cx="270504" cy="175523"/>
+          </a:xfrm>
+          <a:prstGeom prst="triangle">
             <a:avLst/>
           </a:prstGeom>
           <a:solidFill>
@@ -17519,873 +14832,14 @@
           <a:lstStyle/>
           <a:p>
             <a:pPr algn="ctr"/>
-            <a:endParaRPr lang="en-US" sz="1050"/>
-          </a:p>
-        </p:txBody>
-      </p:sp>
-      <p:sp>
-        <p:nvSpPr>
-          <p:cNvPr id="104" name="TextBox 103">
-            <a:extLst>
-              <a:ext uri="{FF2B5EF4-FFF2-40B4-BE49-F238E27FC236}">
-                <a16:creationId xmlns:a16="http://schemas.microsoft.com/office/drawing/2014/main" id="{7955D861-12E8-467E-A832-0CD2DE6AF70E}"/>
-              </a:ext>
-            </a:extLst>
-          </p:cNvPr>
-          <p:cNvSpPr txBox="1"/>
-          <p:nvPr/>
-        </p:nvSpPr>
-        <p:spPr>
-          <a:xfrm>
-            <a:off x="4194237" y="4791326"/>
-            <a:ext cx="189257" cy="178683"/>
-          </a:xfrm>
-          <a:prstGeom prst="rect">
-            <a:avLst/>
-          </a:prstGeom>
-          <a:noFill/>
-        </p:spPr>
-        <p:txBody>
-          <a:bodyPr wrap="square" lIns="0" tIns="0" rIns="0" bIns="0" rtlCol="0">
-            <a:noAutofit/>
-          </a:bodyPr>
-          <a:lstStyle/>
-          <a:p>
-            <a:pPr algn="ctr"/>
-            <a:r>
-              <a:rPr lang="en-US" sz="1100" dirty="0">
-                <a:solidFill>
-                  <a:srgbClr val="7030A0"/>
-                </a:solidFill>
-              </a:rPr>
-              <a:t>1</a:t>
-            </a:r>
-            <a:endParaRPr lang="en-SG" sz="1100" dirty="0">
-              <a:solidFill>
-                <a:srgbClr val="7030A0"/>
-              </a:solidFill>
-            </a:endParaRPr>
-          </a:p>
-        </p:txBody>
-      </p:sp>
-      <p:sp>
-        <p:nvSpPr>
-          <p:cNvPr id="105" name="TextBox 104">
-            <a:extLst>
-              <a:ext uri="{FF2B5EF4-FFF2-40B4-BE49-F238E27FC236}">
-                <a16:creationId xmlns:a16="http://schemas.microsoft.com/office/drawing/2014/main" id="{26655E42-5836-4693-B2F5-1B27CF911181}"/>
-              </a:ext>
-            </a:extLst>
-          </p:cNvPr>
-          <p:cNvSpPr txBox="1"/>
-          <p:nvPr/>
-        </p:nvSpPr>
-        <p:spPr>
-          <a:xfrm>
-            <a:off x="5144743" y="4366227"/>
-            <a:ext cx="189257" cy="178683"/>
-          </a:xfrm>
-          <a:prstGeom prst="rect">
-            <a:avLst/>
-          </a:prstGeom>
-          <a:noFill/>
-        </p:spPr>
-        <p:txBody>
-          <a:bodyPr wrap="square" lIns="0" tIns="0" rIns="0" bIns="0" rtlCol="0">
-            <a:noAutofit/>
-          </a:bodyPr>
-          <a:lstStyle/>
-          <a:p>
-            <a:pPr algn="ctr"/>
-            <a:r>
-              <a:rPr lang="en-US" sz="1100" dirty="0">
-                <a:solidFill>
-                  <a:srgbClr val="7030A0"/>
-                </a:solidFill>
-              </a:rPr>
-              <a:t>2</a:t>
-            </a:r>
-            <a:endParaRPr lang="en-SG" sz="1100" dirty="0">
-              <a:solidFill>
-                <a:srgbClr val="7030A0"/>
-              </a:solidFill>
-            </a:endParaRPr>
-          </a:p>
-        </p:txBody>
-      </p:sp>
-      <p:sp>
-        <p:nvSpPr>
-          <p:cNvPr id="112" name="Flowchart: Decision 96">
-            <a:extLst>
-              <a:ext uri="{FF2B5EF4-FFF2-40B4-BE49-F238E27FC236}">
-                <a16:creationId xmlns:a16="http://schemas.microsoft.com/office/drawing/2014/main" id="{293ECA54-CC18-4A53-ABFD-453088B10C9C}"/>
-              </a:ext>
-            </a:extLst>
-          </p:cNvPr>
-          <p:cNvSpPr/>
-          <p:nvPr/>
-        </p:nvSpPr>
-        <p:spPr>
-          <a:xfrm>
-            <a:off x="6678391" y="4875818"/>
-            <a:ext cx="236048" cy="173380"/>
-          </a:xfrm>
-          <a:prstGeom prst="flowChartDecision">
-            <a:avLst/>
-          </a:prstGeom>
-          <a:solidFill>
-            <a:srgbClr val="7030A0"/>
-          </a:solidFill>
-          <a:ln w="19050">
-            <a:solidFill>
-              <a:srgbClr val="7030A0"/>
-            </a:solidFill>
-          </a:ln>
-          <a:effectLst/>
-        </p:spPr>
-        <p:style>
-          <a:lnRef idx="1">
-            <a:schemeClr val="accent6"/>
-          </a:lnRef>
-          <a:fillRef idx="2">
-            <a:schemeClr val="accent6"/>
-          </a:fillRef>
-          <a:effectRef idx="1">
-            <a:schemeClr val="accent6"/>
-          </a:effectRef>
-          <a:fontRef idx="minor">
-            <a:schemeClr val="dk1"/>
-          </a:fontRef>
-        </p:style>
-        <p:txBody>
-          <a:bodyPr rtlCol="0" anchor="ctr"/>
-          <a:lstStyle/>
-          <a:p>
-            <a:pPr algn="ctr"/>
-            <a:endParaRPr lang="en-US" sz="1050"/>
-          </a:p>
-        </p:txBody>
-      </p:sp>
-      <p:sp>
-        <p:nvSpPr>
-          <p:cNvPr id="117" name="Isosceles Triangle 102">
-            <a:extLst>
-              <a:ext uri="{FF2B5EF4-FFF2-40B4-BE49-F238E27FC236}">
-                <a16:creationId xmlns:a16="http://schemas.microsoft.com/office/drawing/2014/main" id="{7AB74330-96D4-4F9A-BFF6-5D372946A3A3}"/>
-              </a:ext>
-            </a:extLst>
-          </p:cNvPr>
-          <p:cNvSpPr/>
-          <p:nvPr/>
-        </p:nvSpPr>
-        <p:spPr>
-          <a:xfrm rot="5400000" flipV="1">
-            <a:off x="7433016" y="2132735"/>
-            <a:ext cx="270504" cy="175523"/>
-          </a:xfrm>
-          <a:prstGeom prst="triangle">
-            <a:avLst/>
-          </a:prstGeom>
-          <a:ln w="19050">
-            <a:solidFill>
-              <a:srgbClr val="7030A0"/>
-            </a:solidFill>
-          </a:ln>
-          <a:effectLst/>
-        </p:spPr>
-        <p:style>
-          <a:lnRef idx="1">
-            <a:schemeClr val="accent4"/>
-          </a:lnRef>
-          <a:fillRef idx="2">
-            <a:schemeClr val="accent4"/>
-          </a:fillRef>
-          <a:effectRef idx="1">
-            <a:schemeClr val="accent4"/>
-          </a:effectRef>
-          <a:fontRef idx="minor">
-            <a:schemeClr val="dk1"/>
-          </a:fontRef>
-        </p:style>
-        <p:txBody>
-          <a:bodyPr rtlCol="0" anchor="ctr"/>
-          <a:lstStyle/>
-          <a:p>
-            <a:pPr algn="ctr"/>
-            <a:endParaRPr lang="en-SG" sz="1050" b="1">
-              <a:solidFill>
-                <a:srgbClr val="92D050"/>
-              </a:solidFill>
-            </a:endParaRPr>
-          </a:p>
-        </p:txBody>
-      </p:sp>
-      <p:cxnSp>
-        <p:nvCxnSpPr>
-          <p:cNvPr id="91" name="Elbow Connector 29">
-            <a:extLst>
-              <a:ext uri="{FF2B5EF4-FFF2-40B4-BE49-F238E27FC236}">
-                <a16:creationId xmlns:a16="http://schemas.microsoft.com/office/drawing/2014/main" id="{165E042F-592B-4526-89B0-72AC27D3EB93}"/>
-              </a:ext>
-            </a:extLst>
-          </p:cNvPr>
-          <p:cNvCxnSpPr>
-            <a:cxnSpLocks/>
-            <a:stCxn id="51" idx="3"/>
-          </p:cNvCxnSpPr>
-          <p:nvPr/>
-        </p:nvCxnSpPr>
-        <p:spPr>
-          <a:xfrm>
-            <a:off x="4153221" y="2157472"/>
-            <a:ext cx="676441" cy="241829"/>
-          </a:xfrm>
-          <a:prstGeom prst="bentConnector3">
-            <a:avLst/>
-          </a:prstGeom>
-          <a:ln w="19050">
-            <a:solidFill>
-              <a:srgbClr val="7030A0"/>
-            </a:solidFill>
-            <a:headEnd type="none" w="med" len="med"/>
-            <a:tailEnd type="arrow" w="med" len="med"/>
-          </a:ln>
-          <a:effectLst/>
-        </p:spPr>
-        <p:style>
-          <a:lnRef idx="1">
-            <a:schemeClr val="accent2"/>
-          </a:lnRef>
-          <a:fillRef idx="2">
-            <a:schemeClr val="accent2"/>
-          </a:fillRef>
-          <a:effectRef idx="1">
-            <a:schemeClr val="accent2"/>
-          </a:effectRef>
-          <a:fontRef idx="minor">
-            <a:schemeClr val="dk1"/>
-          </a:fontRef>
-        </p:style>
-      </p:cxnSp>
-      <p:cxnSp>
-        <p:nvCxnSpPr>
-          <p:cNvPr id="92" name="Elbow Connector 29">
-            <a:extLst>
-              <a:ext uri="{FF2B5EF4-FFF2-40B4-BE49-F238E27FC236}">
-                <a16:creationId xmlns:a16="http://schemas.microsoft.com/office/drawing/2014/main" id="{D1E312B1-F07F-42E0-B909-2C3800006FEC}"/>
-              </a:ext>
-            </a:extLst>
-          </p:cNvPr>
-          <p:cNvCxnSpPr>
-            <a:cxnSpLocks/>
-            <a:stCxn id="51" idx="3"/>
-            <a:endCxn id="88" idx="1"/>
-          </p:cNvCxnSpPr>
-          <p:nvPr/>
-        </p:nvCxnSpPr>
-        <p:spPr>
-          <a:xfrm>
-            <a:off x="4153221" y="2157472"/>
-            <a:ext cx="671026" cy="957304"/>
-          </a:xfrm>
-          <a:prstGeom prst="bentConnector3">
-            <a:avLst>
-              <a:gd name="adj1" fmla="val 50000"/>
-            </a:avLst>
-          </a:prstGeom>
-          <a:ln w="19050">
-            <a:solidFill>
-              <a:srgbClr val="7030A0"/>
-            </a:solidFill>
-            <a:headEnd type="none" w="med" len="med"/>
-            <a:tailEnd type="arrow" w="med" len="med"/>
-          </a:ln>
-          <a:effectLst/>
-        </p:spPr>
-        <p:style>
-          <a:lnRef idx="1">
-            <a:schemeClr val="accent2"/>
-          </a:lnRef>
-          <a:fillRef idx="2">
-            <a:schemeClr val="accent2"/>
-          </a:fillRef>
-          <a:effectRef idx="1">
-            <a:schemeClr val="accent2"/>
-          </a:effectRef>
-          <a:fontRef idx="minor">
-            <a:schemeClr val="dk1"/>
-          </a:fontRef>
-        </p:style>
-      </p:cxnSp>
-      <p:sp>
-        <p:nvSpPr>
-          <p:cNvPr id="95" name="TextBox 94">
-            <a:extLst>
-              <a:ext uri="{FF2B5EF4-FFF2-40B4-BE49-F238E27FC236}">
-                <a16:creationId xmlns:a16="http://schemas.microsoft.com/office/drawing/2014/main" id="{D29B85A3-61AD-46D9-96B7-EC8CCA02159B}"/>
-              </a:ext>
-            </a:extLst>
-          </p:cNvPr>
-          <p:cNvSpPr txBox="1"/>
-          <p:nvPr/>
-        </p:nvSpPr>
-        <p:spPr>
-          <a:xfrm>
-            <a:off x="4575940" y="2196829"/>
-            <a:ext cx="189257" cy="178683"/>
-          </a:xfrm>
-          <a:prstGeom prst="rect">
-            <a:avLst/>
-          </a:prstGeom>
-          <a:noFill/>
-        </p:spPr>
-        <p:txBody>
-          <a:bodyPr wrap="square" lIns="0" tIns="0" rIns="0" bIns="0" rtlCol="0">
-            <a:noAutofit/>
-          </a:bodyPr>
-          <a:lstStyle/>
-          <a:p>
-            <a:pPr algn="ctr"/>
-            <a:r>
-              <a:rPr lang="en-US" sz="1100" dirty="0">
-                <a:solidFill>
-                  <a:srgbClr val="7030A0"/>
-                </a:solidFill>
-              </a:rPr>
-              <a:t>1</a:t>
-            </a:r>
-            <a:endParaRPr lang="en-SG" sz="1100" dirty="0">
-              <a:solidFill>
-                <a:srgbClr val="7030A0"/>
-              </a:solidFill>
-            </a:endParaRPr>
-          </a:p>
-        </p:txBody>
-      </p:sp>
-      <p:sp>
-        <p:nvSpPr>
-          <p:cNvPr id="96" name="TextBox 95">
-            <a:extLst>
-              <a:ext uri="{FF2B5EF4-FFF2-40B4-BE49-F238E27FC236}">
-                <a16:creationId xmlns:a16="http://schemas.microsoft.com/office/drawing/2014/main" id="{4C638C9C-DC93-4F3F-9C3B-86FC32804BAA}"/>
-              </a:ext>
-            </a:extLst>
-          </p:cNvPr>
-          <p:cNvSpPr txBox="1"/>
-          <p:nvPr/>
-        </p:nvSpPr>
-        <p:spPr>
-          <a:xfrm>
-            <a:off x="4577258" y="2889495"/>
-            <a:ext cx="189257" cy="178683"/>
-          </a:xfrm>
-          <a:prstGeom prst="rect">
-            <a:avLst/>
-          </a:prstGeom>
-          <a:noFill/>
-        </p:spPr>
-        <p:txBody>
-          <a:bodyPr wrap="square" lIns="0" tIns="0" rIns="0" bIns="0" rtlCol="0">
-            <a:noAutofit/>
-          </a:bodyPr>
-          <a:lstStyle/>
-          <a:p>
-            <a:pPr algn="ctr"/>
-            <a:r>
-              <a:rPr lang="en-US" sz="1100" dirty="0">
-                <a:solidFill>
-                  <a:srgbClr val="7030A0"/>
-                </a:solidFill>
-              </a:rPr>
-              <a:t>1</a:t>
-            </a:r>
-            <a:endParaRPr lang="en-SG" sz="1100" dirty="0">
-              <a:solidFill>
-                <a:srgbClr val="7030A0"/>
-              </a:solidFill>
-            </a:endParaRPr>
-          </a:p>
-        </p:txBody>
-      </p:sp>
-      <p:sp>
-        <p:nvSpPr>
-          <p:cNvPr id="81" name="Rectangle 8">
-            <a:extLst>
-              <a:ext uri="{FF2B5EF4-FFF2-40B4-BE49-F238E27FC236}">
-                <a16:creationId xmlns:a16="http://schemas.microsoft.com/office/drawing/2014/main" id="{7A38C179-FD0A-4AFF-9DAD-D2B114E689D6}"/>
-              </a:ext>
-            </a:extLst>
-          </p:cNvPr>
-          <p:cNvSpPr/>
-          <p:nvPr/>
-        </p:nvSpPr>
-        <p:spPr>
-          <a:xfrm>
-            <a:off x="2680736" y="3086120"/>
-            <a:ext cx="1099150" cy="377140"/>
-          </a:xfrm>
-          <a:prstGeom prst="rect">
-            <a:avLst/>
-          </a:prstGeom>
-          <a:ln w="19050">
-            <a:solidFill>
-              <a:srgbClr val="7030A0"/>
-            </a:solidFill>
-          </a:ln>
-          <a:effectLst/>
-        </p:spPr>
-        <p:style>
-          <a:lnRef idx="1">
-            <a:schemeClr val="accent4"/>
-          </a:lnRef>
-          <a:fillRef idx="2">
-            <a:schemeClr val="accent4"/>
-          </a:fillRef>
-          <a:effectRef idx="1">
-            <a:schemeClr val="accent4"/>
-          </a:effectRef>
-          <a:fontRef idx="minor">
-            <a:schemeClr val="dk1"/>
-          </a:fontRef>
-        </p:style>
-        <p:txBody>
-          <a:bodyPr rtlCol="0" anchor="ctr"/>
-          <a:lstStyle/>
-          <a:p>
-            <a:pPr algn="ctr"/>
-            <a:r>
-              <a:rPr lang="en-US" sz="1050" dirty="0">
-                <a:solidFill>
-                  <a:srgbClr val="7030A0"/>
-                </a:solidFill>
-              </a:rPr>
-              <a:t>{abstract}</a:t>
-            </a:r>
-            <a:br>
-              <a:rPr lang="en-US" sz="1050" dirty="0">
-                <a:solidFill>
-                  <a:srgbClr val="7030A0"/>
-                </a:solidFill>
-              </a:rPr>
-            </a:br>
-            <a:r>
-              <a:rPr lang="en-US" sz="1050" dirty="0" err="1">
-                <a:solidFill>
-                  <a:srgbClr val="7030A0"/>
-                </a:solidFill>
-              </a:rPr>
-              <a:t>EntryList</a:t>
-            </a:r>
-            <a:endParaRPr lang="en-SG" sz="1050" dirty="0">
-              <a:solidFill>
-                <a:srgbClr val="7030A0"/>
-              </a:solidFill>
-            </a:endParaRPr>
-          </a:p>
-        </p:txBody>
-      </p:sp>
-      <p:sp>
-        <p:nvSpPr>
-          <p:cNvPr id="83" name="TextBox 82">
-            <a:extLst>
-              <a:ext uri="{FF2B5EF4-FFF2-40B4-BE49-F238E27FC236}">
-                <a16:creationId xmlns:a16="http://schemas.microsoft.com/office/drawing/2014/main" id="{B0746313-7EAE-4FD7-BA26-B0CF426E0CE1}"/>
-              </a:ext>
-            </a:extLst>
-          </p:cNvPr>
-          <p:cNvSpPr txBox="1"/>
-          <p:nvPr/>
-        </p:nvSpPr>
-        <p:spPr>
-          <a:xfrm>
-            <a:off x="2631129" y="3631998"/>
-            <a:ext cx="189257" cy="178683"/>
-          </a:xfrm>
-          <a:prstGeom prst="rect">
-            <a:avLst/>
-          </a:prstGeom>
-          <a:noFill/>
-        </p:spPr>
-        <p:txBody>
-          <a:bodyPr wrap="square" lIns="0" tIns="0" rIns="0" bIns="0" rtlCol="0">
-            <a:noAutofit/>
-          </a:bodyPr>
-          <a:lstStyle/>
-          <a:p>
-            <a:pPr algn="ctr"/>
-            <a:r>
-              <a:rPr lang="en-SG" sz="1100" dirty="0">
-                <a:solidFill>
-                  <a:srgbClr val="7030A0"/>
-                </a:solidFill>
-              </a:rPr>
-              <a:t>3</a:t>
-            </a:r>
-          </a:p>
-        </p:txBody>
-      </p:sp>
-      <p:sp>
-        <p:nvSpPr>
-          <p:cNvPr id="111" name="Isosceles Triangle 102">
-            <a:extLst>
-              <a:ext uri="{FF2B5EF4-FFF2-40B4-BE49-F238E27FC236}">
-                <a16:creationId xmlns:a16="http://schemas.microsoft.com/office/drawing/2014/main" id="{A106F481-8113-48BD-B065-34D89F65F0AB}"/>
-              </a:ext>
-            </a:extLst>
-          </p:cNvPr>
-          <p:cNvSpPr/>
-          <p:nvPr/>
-        </p:nvSpPr>
-        <p:spPr>
-          <a:xfrm rot="5400000" flipV="1">
-            <a:off x="3894179" y="3777459"/>
-            <a:ext cx="270504" cy="175523"/>
-          </a:xfrm>
-          <a:prstGeom prst="triangle">
-            <a:avLst/>
-          </a:prstGeom>
-          <a:ln w="19050">
-            <a:solidFill>
-              <a:srgbClr val="7030A0"/>
-            </a:solidFill>
-          </a:ln>
-          <a:effectLst/>
-        </p:spPr>
-        <p:style>
-          <a:lnRef idx="1">
-            <a:schemeClr val="accent4"/>
-          </a:lnRef>
-          <a:fillRef idx="2">
-            <a:schemeClr val="accent4"/>
-          </a:fillRef>
-          <a:effectRef idx="1">
-            <a:schemeClr val="accent4"/>
-          </a:effectRef>
-          <a:fontRef idx="minor">
-            <a:schemeClr val="dk1"/>
-          </a:fontRef>
-        </p:style>
-        <p:txBody>
-          <a:bodyPr rtlCol="0" anchor="ctr"/>
-          <a:lstStyle/>
-          <a:p>
-            <a:pPr algn="ctr"/>
-            <a:endParaRPr lang="en-SG" sz="1050" b="1">
-              <a:solidFill>
-                <a:srgbClr val="92D050"/>
-              </a:solidFill>
-            </a:endParaRPr>
-          </a:p>
-        </p:txBody>
-      </p:sp>
-      <p:cxnSp>
-        <p:nvCxnSpPr>
-          <p:cNvPr id="113" name="Elbow Connector 63">
-            <a:extLst>
-              <a:ext uri="{FF2B5EF4-FFF2-40B4-BE49-F238E27FC236}">
-                <a16:creationId xmlns:a16="http://schemas.microsoft.com/office/drawing/2014/main" id="{A1485418-2743-47D1-BC42-2E0545F2FBE5}"/>
-              </a:ext>
-            </a:extLst>
-          </p:cNvPr>
-          <p:cNvCxnSpPr>
-            <a:cxnSpLocks/>
-            <a:stCxn id="115" idx="3"/>
-            <a:endCxn id="49" idx="1"/>
-          </p:cNvCxnSpPr>
-          <p:nvPr/>
-        </p:nvCxnSpPr>
-        <p:spPr>
-          <a:xfrm flipV="1">
-            <a:off x="3978565" y="1965848"/>
-            <a:ext cx="851097" cy="1293605"/>
-          </a:xfrm>
-          <a:prstGeom prst="bentConnector3">
-            <a:avLst>
-              <a:gd name="adj1" fmla="val 50000"/>
-            </a:avLst>
-          </a:prstGeom>
-          <a:ln w="19050">
-            <a:solidFill>
-              <a:srgbClr val="7030A0"/>
-            </a:solidFill>
-            <a:prstDash val="sysDot"/>
-            <a:headEnd type="none" w="med" len="med"/>
-            <a:tailEnd type="none" w="med" len="med"/>
-          </a:ln>
-          <a:effectLst/>
-        </p:spPr>
-        <p:style>
-          <a:lnRef idx="1">
-            <a:schemeClr val="accent2"/>
-          </a:lnRef>
-          <a:fillRef idx="2">
-            <a:schemeClr val="accent2"/>
-          </a:fillRef>
-          <a:effectRef idx="1">
-            <a:schemeClr val="accent2"/>
-          </a:effectRef>
-          <a:fontRef idx="minor">
-            <a:schemeClr val="dk1"/>
-          </a:fontRef>
-        </p:style>
-      </p:cxnSp>
-      <p:sp>
-        <p:nvSpPr>
-          <p:cNvPr id="115" name="Isosceles Triangle 102">
-            <a:extLst>
-              <a:ext uri="{FF2B5EF4-FFF2-40B4-BE49-F238E27FC236}">
-                <a16:creationId xmlns:a16="http://schemas.microsoft.com/office/drawing/2014/main" id="{CEC3CD33-62F4-457F-B391-47EC0406E552}"/>
-              </a:ext>
-            </a:extLst>
-          </p:cNvPr>
-          <p:cNvSpPr/>
-          <p:nvPr/>
-        </p:nvSpPr>
-        <p:spPr>
-          <a:xfrm rot="5400000" flipV="1">
-            <a:off x="3755551" y="3171691"/>
-            <a:ext cx="270504" cy="175523"/>
-          </a:xfrm>
-          <a:prstGeom prst="triangle">
-            <a:avLst/>
-          </a:prstGeom>
-          <a:ln w="19050">
-            <a:solidFill>
-              <a:srgbClr val="7030A0"/>
-            </a:solidFill>
-          </a:ln>
-          <a:effectLst/>
-        </p:spPr>
-        <p:style>
-          <a:lnRef idx="1">
-            <a:schemeClr val="accent4"/>
-          </a:lnRef>
-          <a:fillRef idx="2">
-            <a:schemeClr val="accent4"/>
-          </a:fillRef>
-          <a:effectRef idx="1">
-            <a:schemeClr val="accent4"/>
-          </a:effectRef>
-          <a:fontRef idx="minor">
-            <a:schemeClr val="dk1"/>
-          </a:fontRef>
-        </p:style>
-        <p:txBody>
-          <a:bodyPr rtlCol="0" anchor="ctr"/>
-          <a:lstStyle/>
-          <a:p>
-            <a:pPr algn="ctr"/>
-            <a:endParaRPr lang="en-SG" sz="1050" b="1">
-              <a:solidFill>
-                <a:srgbClr val="92D050"/>
-              </a:solidFill>
-            </a:endParaRPr>
-          </a:p>
-        </p:txBody>
-      </p:sp>
-      <p:cxnSp>
-        <p:nvCxnSpPr>
-          <p:cNvPr id="136" name="Elbow Connector 63">
-            <a:extLst>
-              <a:ext uri="{FF2B5EF4-FFF2-40B4-BE49-F238E27FC236}">
-                <a16:creationId xmlns:a16="http://schemas.microsoft.com/office/drawing/2014/main" id="{E1328738-EFAE-49FD-A3F1-1DB3F8A12A40}"/>
-              </a:ext>
-            </a:extLst>
-          </p:cNvPr>
-          <p:cNvCxnSpPr>
-            <a:cxnSpLocks/>
-            <a:stCxn id="115" idx="3"/>
-            <a:endCxn id="84" idx="1"/>
-          </p:cNvCxnSpPr>
-          <p:nvPr/>
-        </p:nvCxnSpPr>
-        <p:spPr>
-          <a:xfrm flipV="1">
-            <a:off x="3978565" y="2545155"/>
-            <a:ext cx="846863" cy="714298"/>
-          </a:xfrm>
-          <a:prstGeom prst="bentConnector3">
-            <a:avLst>
-              <a:gd name="adj1" fmla="val 50000"/>
-            </a:avLst>
-          </a:prstGeom>
-          <a:ln w="19050">
-            <a:solidFill>
-              <a:srgbClr val="7030A0"/>
-            </a:solidFill>
-            <a:prstDash val="sysDot"/>
-            <a:headEnd type="none" w="med" len="med"/>
-            <a:tailEnd type="none" w="med" len="med"/>
-          </a:ln>
-          <a:effectLst/>
-        </p:spPr>
-        <p:style>
-          <a:lnRef idx="1">
-            <a:schemeClr val="accent2"/>
-          </a:lnRef>
-          <a:fillRef idx="2">
-            <a:schemeClr val="accent2"/>
-          </a:fillRef>
-          <a:effectRef idx="1">
-            <a:schemeClr val="accent2"/>
-          </a:effectRef>
-          <a:fontRef idx="minor">
-            <a:schemeClr val="dk1"/>
-          </a:fontRef>
-        </p:style>
-      </p:cxnSp>
-      <p:cxnSp>
-        <p:nvCxnSpPr>
-          <p:cNvPr id="141" name="Elbow Connector 63">
-            <a:extLst>
-              <a:ext uri="{FF2B5EF4-FFF2-40B4-BE49-F238E27FC236}">
-                <a16:creationId xmlns:a16="http://schemas.microsoft.com/office/drawing/2014/main" id="{4B86615C-E534-4DC6-9AD1-FC396A0A1ADB}"/>
-              </a:ext>
-            </a:extLst>
-          </p:cNvPr>
-          <p:cNvCxnSpPr>
-            <a:cxnSpLocks/>
-            <a:stCxn id="115" idx="3"/>
-          </p:cNvCxnSpPr>
-          <p:nvPr/>
-        </p:nvCxnSpPr>
-        <p:spPr>
-          <a:xfrm flipV="1">
-            <a:off x="3978565" y="3255550"/>
-            <a:ext cx="836608" cy="3903"/>
-          </a:xfrm>
-          <a:prstGeom prst="bentConnector3">
-            <a:avLst>
-              <a:gd name="adj1" fmla="val 50000"/>
-            </a:avLst>
-          </a:prstGeom>
-          <a:ln w="19050">
-            <a:solidFill>
-              <a:srgbClr val="7030A0"/>
-            </a:solidFill>
-            <a:prstDash val="sysDot"/>
-            <a:headEnd type="none" w="med" len="med"/>
-            <a:tailEnd type="none" w="med" len="med"/>
-          </a:ln>
-          <a:effectLst/>
-        </p:spPr>
-        <p:style>
-          <a:lnRef idx="1">
-            <a:schemeClr val="accent2"/>
-          </a:lnRef>
-          <a:fillRef idx="2">
-            <a:schemeClr val="accent2"/>
-          </a:fillRef>
-          <a:effectRef idx="1">
-            <a:schemeClr val="accent2"/>
-          </a:effectRef>
-          <a:fontRef idx="minor">
-            <a:schemeClr val="dk1"/>
-          </a:fontRef>
-        </p:style>
-      </p:cxnSp>
-      <p:cxnSp>
-        <p:nvCxnSpPr>
-          <p:cNvPr id="123" name="Elbow Connector 63">
-            <a:extLst>
-              <a:ext uri="{FF2B5EF4-FFF2-40B4-BE49-F238E27FC236}">
-                <a16:creationId xmlns:a16="http://schemas.microsoft.com/office/drawing/2014/main" id="{0E5833F7-A1A8-48FF-A1CC-D6EC18139449}"/>
-              </a:ext>
-            </a:extLst>
-          </p:cNvPr>
-          <p:cNvCxnSpPr>
-            <a:cxnSpLocks/>
-            <a:stCxn id="111" idx="3"/>
-            <a:endCxn id="77" idx="0"/>
-          </p:cNvCxnSpPr>
-          <p:nvPr/>
-        </p:nvCxnSpPr>
-        <p:spPr>
-          <a:xfrm>
-            <a:off x="4117193" y="3865221"/>
-            <a:ext cx="2483928" cy="570323"/>
-          </a:xfrm>
-          <a:prstGeom prst="bentConnector2">
-            <a:avLst/>
-          </a:prstGeom>
-          <a:ln w="19050">
-            <a:solidFill>
-              <a:srgbClr val="7030A0"/>
-            </a:solidFill>
-            <a:prstDash val="sysDot"/>
-            <a:headEnd type="none" w="med" len="med"/>
-            <a:tailEnd type="none" w="med" len="med"/>
-          </a:ln>
-          <a:effectLst/>
-        </p:spPr>
-        <p:style>
-          <a:lnRef idx="1">
-            <a:schemeClr val="accent2"/>
-          </a:lnRef>
-          <a:fillRef idx="2">
-            <a:schemeClr val="accent2"/>
-          </a:fillRef>
-          <a:effectRef idx="1">
-            <a:schemeClr val="accent2"/>
-          </a:effectRef>
-          <a:fontRef idx="minor">
-            <a:schemeClr val="dk1"/>
-          </a:fontRef>
-        </p:style>
-      </p:cxnSp>
-      <p:cxnSp>
-        <p:nvCxnSpPr>
-          <p:cNvPr id="126" name="Elbow Connector 63">
-            <a:extLst>
-              <a:ext uri="{FF2B5EF4-FFF2-40B4-BE49-F238E27FC236}">
-                <a16:creationId xmlns:a16="http://schemas.microsoft.com/office/drawing/2014/main" id="{AF37180F-9947-4FD9-80D2-62462566E4CC}"/>
-              </a:ext>
-            </a:extLst>
-          </p:cNvPr>
-          <p:cNvCxnSpPr>
-            <a:cxnSpLocks/>
-            <a:stCxn id="111" idx="3"/>
-            <a:endCxn id="87" idx="0"/>
-          </p:cNvCxnSpPr>
-          <p:nvPr/>
-        </p:nvCxnSpPr>
-        <p:spPr>
-          <a:xfrm>
-            <a:off x="4117193" y="3865221"/>
-            <a:ext cx="3150937" cy="954396"/>
-          </a:xfrm>
-          <a:prstGeom prst="bentConnector2">
-            <a:avLst/>
-          </a:prstGeom>
-          <a:ln w="19050">
-            <a:solidFill>
-              <a:srgbClr val="7030A0"/>
-            </a:solidFill>
-            <a:prstDash val="sysDot"/>
-            <a:headEnd type="none" w="med" len="med"/>
-            <a:tailEnd type="none" w="med" len="med"/>
-          </a:ln>
-          <a:effectLst/>
-        </p:spPr>
-        <p:style>
-          <a:lnRef idx="1">
-            <a:schemeClr val="accent2"/>
-          </a:lnRef>
-          <a:fillRef idx="2">
-            <a:schemeClr val="accent2"/>
-          </a:fillRef>
-          <a:effectRef idx="1">
-            <a:schemeClr val="accent2"/>
-          </a:effectRef>
-          <a:fontRef idx="minor">
-            <a:schemeClr val="dk1"/>
-          </a:fontRef>
-        </p:style>
-      </p:cxnSp>
+            <a:endParaRPr lang="en-SG" sz="1050"/>
+          </a:p>
+        </p:txBody>
+      </p:sp>
     </p:spTree>
     <p:extLst>
       <p:ext uri="{BB962C8B-B14F-4D97-AF65-F5344CB8AC3E}">
-        <p14:creationId xmlns:p14="http://schemas.microsoft.com/office/powerpoint/2010/main" val="3073666159"/>
+        <p14:creationId xmlns:p14="http://schemas.microsoft.com/office/powerpoint/2010/main" val="1794726962"/>
       </p:ext>
     </p:extLst>
   </p:cSld>

</xml_diff>

<commit_message>
Further modify Model class diagram.
</commit_message>
<xml_diff>
--- a/docs/diagrams/ModelComponentClassDiagram.pptx
+++ b/docs/diagrams/ModelComponentClassDiagram.pptx
@@ -10010,7 +10010,6 @@
           <p:cNvPr id="53" name="Elbow Connector 63"/>
           <p:cNvCxnSpPr>
             <a:cxnSpLocks/>
-            <a:stCxn id="111" idx="3"/>
             <a:endCxn id="82" idx="0"/>
           </p:cNvCxnSpPr>
           <p:nvPr/>
@@ -13320,60 +13319,6 @@
           </a:p>
         </p:txBody>
       </p:sp>
-      <p:sp>
-        <p:nvSpPr>
-          <p:cNvPr id="111" name="Isosceles Triangle 102">
-            <a:extLst>
-              <a:ext uri="{FF2B5EF4-FFF2-40B4-BE49-F238E27FC236}">
-                <a16:creationId xmlns:a16="http://schemas.microsoft.com/office/drawing/2014/main" id="{A106F481-8113-48BD-B065-34D89F65F0AB}"/>
-              </a:ext>
-            </a:extLst>
-          </p:cNvPr>
-          <p:cNvSpPr/>
-          <p:nvPr/>
-        </p:nvSpPr>
-        <p:spPr>
-          <a:xfrm rot="5400000" flipV="1">
-            <a:off x="3894179" y="4691859"/>
-            <a:ext cx="270504" cy="175523"/>
-          </a:xfrm>
-          <a:prstGeom prst="triangle">
-            <a:avLst/>
-          </a:prstGeom>
-          <a:ln w="19050">
-            <a:solidFill>
-              <a:srgbClr val="7030A0"/>
-            </a:solidFill>
-          </a:ln>
-          <a:effectLst/>
-        </p:spPr>
-        <p:style>
-          <a:lnRef idx="1">
-            <a:schemeClr val="accent4"/>
-          </a:lnRef>
-          <a:fillRef idx="2">
-            <a:schemeClr val="accent4"/>
-          </a:fillRef>
-          <a:effectRef idx="1">
-            <a:schemeClr val="accent4"/>
-          </a:effectRef>
-          <a:fontRef idx="minor">
-            <a:schemeClr val="dk1"/>
-          </a:fontRef>
-        </p:style>
-        <p:txBody>
-          <a:bodyPr rtlCol="0" anchor="ctr"/>
-          <a:lstStyle/>
-          <a:p>
-            <a:pPr algn="ctr"/>
-            <a:endParaRPr lang="en-SG" sz="1050" b="1">
-              <a:solidFill>
-                <a:srgbClr val="92D050"/>
-              </a:solidFill>
-            </a:endParaRPr>
-          </a:p>
-        </p:txBody>
-      </p:sp>
       <p:cxnSp>
         <p:nvCxnSpPr>
           <p:cNvPr id="113" name="Elbow Connector 63">
@@ -13403,7 +13348,7 @@
             <a:solidFill>
               <a:srgbClr val="7030A0"/>
             </a:solidFill>
-            <a:prstDash val="sysDot"/>
+            <a:prstDash val="solid"/>
             <a:headEnd type="none" w="med" len="med"/>
             <a:tailEnd type="none" w="med" len="med"/>
           </a:ln>
@@ -13453,7 +13398,7 @@
             <a:solidFill>
               <a:srgbClr val="7030A0"/>
             </a:solidFill>
-            <a:prstDash val="sysDot"/>
+            <a:prstDash val="solid"/>
             <a:headEnd type="none" w="med" len="med"/>
             <a:tailEnd type="none" w="med" len="med"/>
           </a:ln>
@@ -13491,7 +13436,7 @@
         <p:spPr>
           <a:xfrm>
             <a:off x="3978565" y="2878453"/>
-            <a:ext cx="827933" cy="897"/>
+            <a:ext cx="851097" cy="1177"/>
           </a:xfrm>
           <a:prstGeom prst="bentConnector3">
             <a:avLst>
@@ -13502,7 +13447,7 @@
             <a:solidFill>
               <a:srgbClr val="7030A0"/>
             </a:solidFill>
-            <a:prstDash val="sysDot"/>
+            <a:prstDash val="solid"/>
             <a:headEnd type="none" w="med" len="med"/>
             <a:tailEnd type="none" w="med" len="med"/>
           </a:ln>
@@ -14010,8 +13955,8 @@
         </p:nvCxnSpPr>
         <p:spPr>
           <a:xfrm>
-            <a:off x="3978565" y="2878453"/>
-            <a:ext cx="836608" cy="533616"/>
+            <a:off x="3963174" y="2876211"/>
+            <a:ext cx="851999" cy="535858"/>
           </a:xfrm>
           <a:prstGeom prst="bentConnector3">
             <a:avLst>
@@ -14022,7 +13967,7 @@
             <a:solidFill>
               <a:srgbClr val="7030A0"/>
             </a:solidFill>
-            <a:prstDash val="sysDot"/>
+            <a:prstDash val="solid"/>
             <a:headEnd type="none" w="med" len="med"/>
             <a:tailEnd type="none" w="med" len="med"/>
           </a:ln>
@@ -14067,7 +14012,7 @@
             <a:solidFill>
               <a:srgbClr val="7030A0"/>
             </a:solidFill>
-            <a:prstDash val="sysDot"/>
+            <a:prstDash val="solid"/>
           </a:ln>
         </p:spPr>
         <p:style>
@@ -14109,7 +14054,7 @@
             <a:solidFill>
               <a:srgbClr val="7030A0"/>
             </a:solidFill>
-            <a:prstDash val="sysDot"/>
+            <a:prstDash val="solid"/>
           </a:ln>
         </p:spPr>
         <p:style>
@@ -14151,7 +14096,7 @@
             <a:solidFill>
               <a:srgbClr val="7030A0"/>
             </a:solidFill>
-            <a:prstDash val="sysDot"/>
+            <a:prstDash val="solid"/>
           </a:ln>
         </p:spPr>
         <p:style>
@@ -14180,7 +14125,6 @@
           </p:cNvPr>
           <p:cNvCxnSpPr>
             <a:cxnSpLocks/>
-            <a:stCxn id="111" idx="3"/>
             <a:endCxn id="77" idx="0"/>
           </p:cNvCxnSpPr>
           <p:nvPr/>
@@ -14229,15 +14173,15 @@
           </p:cNvPr>
           <p:cNvCxnSpPr>
             <a:cxnSpLocks/>
-            <a:stCxn id="111" idx="3"/>
+            <a:stCxn id="115" idx="3"/>
             <a:endCxn id="87" idx="0"/>
           </p:cNvCxnSpPr>
           <p:nvPr/>
         </p:nvCxnSpPr>
         <p:spPr>
           <a:xfrm>
-            <a:off x="4117193" y="4779621"/>
-            <a:ext cx="3150937" cy="954396"/>
+            <a:off x="4111054" y="4779619"/>
+            <a:ext cx="3157076" cy="954398"/>
           </a:xfrm>
           <a:prstGeom prst="bentConnector2">
             <a:avLst/>
@@ -14732,59 +14676,6 @@
       </p:sp>
       <p:sp>
         <p:nvSpPr>
-          <p:cNvPr id="137" name="Isosceles Triangle 102">
-            <a:extLst>
-              <a:ext uri="{FF2B5EF4-FFF2-40B4-BE49-F238E27FC236}">
-                <a16:creationId xmlns:a16="http://schemas.microsoft.com/office/drawing/2014/main" id="{8F93B057-65CC-413B-A689-722BA03E4E00}"/>
-              </a:ext>
-            </a:extLst>
-          </p:cNvPr>
-          <p:cNvSpPr/>
-          <p:nvPr/>
-        </p:nvSpPr>
-        <p:spPr>
-          <a:xfrm rot="16200000">
-            <a:off x="3740160" y="2788449"/>
-            <a:ext cx="270504" cy="175523"/>
-          </a:xfrm>
-          <a:prstGeom prst="triangle">
-            <a:avLst/>
-          </a:prstGeom>
-          <a:solidFill>
-            <a:srgbClr val="7030A0"/>
-          </a:solidFill>
-          <a:ln w="19050">
-            <a:solidFill>
-              <a:srgbClr val="7030A0"/>
-            </a:solidFill>
-          </a:ln>
-          <a:effectLst/>
-        </p:spPr>
-        <p:style>
-          <a:lnRef idx="1">
-            <a:schemeClr val="accent6"/>
-          </a:lnRef>
-          <a:fillRef idx="2">
-            <a:schemeClr val="accent6"/>
-          </a:fillRef>
-          <a:effectRef idx="1">
-            <a:schemeClr val="accent6"/>
-          </a:effectRef>
-          <a:fontRef idx="minor">
-            <a:schemeClr val="dk1"/>
-          </a:fontRef>
-        </p:style>
-        <p:txBody>
-          <a:bodyPr rtlCol="0" anchor="ctr"/>
-          <a:lstStyle/>
-          <a:p>
-            <a:pPr algn="ctr"/>
-            <a:endParaRPr lang="en-SG" sz="1050"/>
-          </a:p>
-        </p:txBody>
-      </p:sp>
-      <p:sp>
-        <p:nvSpPr>
           <p:cNvPr id="138" name="Isosceles Triangle 102">
             <a:extLst>
               <a:ext uri="{FF2B5EF4-FFF2-40B4-BE49-F238E27FC236}">
@@ -14833,6 +14724,113 @@
           <a:p>
             <a:pPr algn="ctr"/>
             <a:endParaRPr lang="en-SG" sz="1050"/>
+          </a:p>
+        </p:txBody>
+      </p:sp>
+      <p:sp>
+        <p:nvSpPr>
+          <p:cNvPr id="115" name="Isosceles Triangle 102">
+            <a:extLst>
+              <a:ext uri="{FF2B5EF4-FFF2-40B4-BE49-F238E27FC236}">
+                <a16:creationId xmlns:a16="http://schemas.microsoft.com/office/drawing/2014/main" id="{E503DD09-E729-4510-AC1D-BB2C3C1A7DEA}"/>
+              </a:ext>
+            </a:extLst>
+          </p:cNvPr>
+          <p:cNvSpPr/>
+          <p:nvPr/>
+        </p:nvSpPr>
+        <p:spPr>
+          <a:xfrm rot="16200000">
+            <a:off x="3888040" y="4691857"/>
+            <a:ext cx="270504" cy="175523"/>
+          </a:xfrm>
+          <a:prstGeom prst="triangle">
+            <a:avLst/>
+          </a:prstGeom>
+          <a:solidFill>
+            <a:srgbClr val="7030A0"/>
+          </a:solidFill>
+          <a:ln w="19050">
+            <a:solidFill>
+              <a:srgbClr val="7030A0"/>
+            </a:solidFill>
+          </a:ln>
+          <a:effectLst/>
+        </p:spPr>
+        <p:style>
+          <a:lnRef idx="1">
+            <a:schemeClr val="accent6"/>
+          </a:lnRef>
+          <a:fillRef idx="2">
+            <a:schemeClr val="accent6"/>
+          </a:fillRef>
+          <a:effectRef idx="1">
+            <a:schemeClr val="accent6"/>
+          </a:effectRef>
+          <a:fontRef idx="minor">
+            <a:schemeClr val="dk1"/>
+          </a:fontRef>
+        </p:style>
+        <p:txBody>
+          <a:bodyPr rtlCol="0" anchor="ctr"/>
+          <a:lstStyle/>
+          <a:p>
+            <a:pPr algn="ctr"/>
+            <a:endParaRPr lang="en-SG" sz="1050"/>
+          </a:p>
+        </p:txBody>
+      </p:sp>
+      <p:sp>
+        <p:nvSpPr>
+          <p:cNvPr id="139" name="Isosceles Triangle 102">
+            <a:extLst>
+              <a:ext uri="{FF2B5EF4-FFF2-40B4-BE49-F238E27FC236}">
+                <a16:creationId xmlns:a16="http://schemas.microsoft.com/office/drawing/2014/main" id="{7EB10A3D-1FBF-428D-96DB-009E1EC6B9BB}"/>
+              </a:ext>
+            </a:extLst>
+          </p:cNvPr>
+          <p:cNvSpPr/>
+          <p:nvPr/>
+        </p:nvSpPr>
+        <p:spPr>
+          <a:xfrm rot="5400000" flipV="1">
+            <a:off x="3745192" y="2787905"/>
+            <a:ext cx="270504" cy="175523"/>
+          </a:xfrm>
+          <a:prstGeom prst="triangle">
+            <a:avLst/>
+          </a:prstGeom>
+          <a:ln w="19050">
+            <a:solidFill>
+              <a:srgbClr val="7030A0"/>
+            </a:solidFill>
+          </a:ln>
+          <a:effectLst/>
+        </p:spPr>
+        <p:style>
+          <a:lnRef idx="1">
+            <a:schemeClr val="accent4"/>
+          </a:lnRef>
+          <a:fillRef idx="2">
+            <a:schemeClr val="accent4"/>
+          </a:fillRef>
+          <a:effectRef idx="1">
+            <a:schemeClr val="accent4"/>
+          </a:effectRef>
+          <a:fontRef idx="minor">
+            <a:schemeClr val="dk1"/>
+          </a:fontRef>
+        </p:style>
+        <p:txBody>
+          <a:bodyPr rtlCol="0" anchor="ctr"/>
+          <a:lstStyle/>
+          <a:p>
+            <a:pPr algn="ctr"/>
+            <a:endParaRPr lang="en-SG" sz="1050" b="1">
+              <a:solidFill>
+                <a:srgbClr val="92D050"/>
+              </a:solidFill>
+            </a:endParaRPr>
           </a:p>
         </p:txBody>
       </p:sp>

</xml_diff>

<commit_message>
Correct Model class diagram.
</commit_message>
<xml_diff>
--- a/docs/diagrams/ModelComponentClassDiagram.pptx
+++ b/docs/diagrams/ModelComponentClassDiagram.pptx
@@ -5,11 +5,12 @@
     <p:sldMasterId id="2147483648" r:id="rId1"/>
   </p:sldMasterIdLst>
   <p:notesMasterIdLst>
-    <p:notesMasterId r:id="rId4"/>
+    <p:notesMasterId r:id="rId5"/>
   </p:notesMasterIdLst>
   <p:sldIdLst>
     <p:sldId id="265" r:id="rId2"/>
     <p:sldId id="268" r:id="rId3"/>
+    <p:sldId id="269" r:id="rId4"/>
   </p:sldIdLst>
   <p:sldSz cx="9144000" cy="6858000" type="screen4x3"/>
   <p:notesSz cx="6858000" cy="9144000"/>
@@ -10612,6 +10613,4522 @@
     <p:extLst>
       <p:ext uri="{BB962C8B-B14F-4D97-AF65-F5344CB8AC3E}">
         <p14:creationId xmlns:p14="http://schemas.microsoft.com/office/powerpoint/2010/main" val="1567827878"/>
+      </p:ext>
+    </p:extLst>
+  </p:cSld>
+  <p:clrMapOvr>
+    <a:masterClrMapping/>
+  </p:clrMapOvr>
+</p:sld>
+</file>
+
+<file path=ppt/slides/slide3.xml><?xml version="1.0" encoding="utf-8"?>
+<p:sld xmlns:a="http://schemas.openxmlformats.org/drawingml/2006/main" xmlns:r="http://schemas.openxmlformats.org/officeDocument/2006/relationships" xmlns:p="http://schemas.openxmlformats.org/presentationml/2006/main">
+  <p:cSld>
+    <p:spTree>
+      <p:nvGrpSpPr>
+        <p:cNvPr id="1" name=""/>
+        <p:cNvGrpSpPr/>
+        <p:nvPr/>
+      </p:nvGrpSpPr>
+      <p:grpSpPr>
+        <a:xfrm>
+          <a:off x="0" y="0"/>
+          <a:ext cx="0" cy="0"/>
+          <a:chOff x="0" y="0"/>
+          <a:chExt cx="0" cy="0"/>
+        </a:xfrm>
+      </p:grpSpPr>
+      <p:sp>
+        <p:nvSpPr>
+          <p:cNvPr id="118" name="Rectangle 65"/>
+          <p:cNvSpPr/>
+          <p:nvPr/>
+        </p:nvSpPr>
+        <p:spPr>
+          <a:xfrm>
+            <a:off x="990600" y="457200"/>
+            <a:ext cx="7239000" cy="5867400"/>
+          </a:xfrm>
+          <a:prstGeom prst="roundRect">
+            <a:avLst>
+              <a:gd name="adj" fmla="val 3484"/>
+            </a:avLst>
+          </a:prstGeom>
+          <a:solidFill>
+            <a:schemeClr val="accent4">
+              <a:lumMod val="20000"/>
+              <a:lumOff val="80000"/>
+            </a:schemeClr>
+          </a:solidFill>
+          <a:ln w="19050">
+            <a:noFill/>
+          </a:ln>
+          <a:effectLst/>
+        </p:spPr>
+        <p:style>
+          <a:lnRef idx="1">
+            <a:schemeClr val="accent2"/>
+          </a:lnRef>
+          <a:fillRef idx="2">
+            <a:schemeClr val="accent2"/>
+          </a:fillRef>
+          <a:effectRef idx="1">
+            <a:schemeClr val="accent2"/>
+          </a:effectRef>
+          <a:fontRef idx="minor">
+            <a:schemeClr val="dk1"/>
+          </a:fontRef>
+        </p:style>
+        <p:txBody>
+          <a:bodyPr rtlCol="0" anchor="t"/>
+          <a:lstStyle/>
+          <a:p>
+            <a:r>
+              <a:rPr lang="en-US" sz="1200" b="1" dirty="0">
+                <a:solidFill>
+                  <a:srgbClr val="7030A0"/>
+                </a:solidFill>
+              </a:rPr>
+              <a:t>Model</a:t>
+            </a:r>
+            <a:endParaRPr lang="en-SG" sz="1200" b="1" dirty="0">
+              <a:solidFill>
+                <a:srgbClr val="7030A0"/>
+              </a:solidFill>
+            </a:endParaRPr>
+          </a:p>
+        </p:txBody>
+      </p:sp>
+      <p:sp>
+        <p:nvSpPr>
+          <p:cNvPr id="2" name="Rectangle 8"/>
+          <p:cNvSpPr/>
+          <p:nvPr/>
+        </p:nvSpPr>
+        <p:spPr>
+          <a:xfrm>
+            <a:off x="2806563" y="2423676"/>
+            <a:ext cx="1093635" cy="346760"/>
+          </a:xfrm>
+          <a:prstGeom prst="rect">
+            <a:avLst/>
+          </a:prstGeom>
+          <a:solidFill>
+            <a:srgbClr val="7030A0"/>
+          </a:solidFill>
+          <a:ln w="19050">
+            <a:solidFill>
+              <a:srgbClr val="7030A0"/>
+            </a:solidFill>
+          </a:ln>
+          <a:effectLst/>
+        </p:spPr>
+        <p:style>
+          <a:lnRef idx="1">
+            <a:schemeClr val="accent2"/>
+          </a:lnRef>
+          <a:fillRef idx="2">
+            <a:schemeClr val="accent2"/>
+          </a:fillRef>
+          <a:effectRef idx="1">
+            <a:schemeClr val="accent2"/>
+          </a:effectRef>
+          <a:fontRef idx="minor">
+            <a:schemeClr val="dk1"/>
+          </a:fontRef>
+        </p:style>
+        <p:txBody>
+          <a:bodyPr rtlCol="0" anchor="ctr"/>
+          <a:lstStyle/>
+          <a:p>
+            <a:pPr algn="ctr"/>
+            <a:r>
+              <a:rPr lang="en-US" sz="1050" dirty="0" err="1">
+                <a:solidFill>
+                  <a:schemeClr val="bg1"/>
+                </a:solidFill>
+              </a:rPr>
+              <a:t>UserPref</a:t>
+            </a:r>
+            <a:endParaRPr lang="en-SG" sz="1050" dirty="0">
+              <a:solidFill>
+                <a:schemeClr val="bg1"/>
+              </a:solidFill>
+            </a:endParaRPr>
+          </a:p>
+        </p:txBody>
+      </p:sp>
+      <p:sp>
+        <p:nvSpPr>
+          <p:cNvPr id="9" name="Rectangle 62"/>
+          <p:cNvSpPr/>
+          <p:nvPr/>
+        </p:nvSpPr>
+        <p:spPr>
+          <a:xfrm rot="16200000">
+            <a:off x="1666826" y="2133923"/>
+            <a:ext cx="1093635" cy="346760"/>
+          </a:xfrm>
+          <a:prstGeom prst="rect">
+            <a:avLst/>
+          </a:prstGeom>
+          <a:solidFill>
+            <a:srgbClr val="7030A0"/>
+          </a:solidFill>
+          <a:ln w="19050">
+            <a:solidFill>
+              <a:srgbClr val="7030A0"/>
+            </a:solidFill>
+          </a:ln>
+          <a:effectLst/>
+        </p:spPr>
+        <p:style>
+          <a:lnRef idx="1">
+            <a:schemeClr val="accent2"/>
+          </a:lnRef>
+          <a:fillRef idx="2">
+            <a:schemeClr val="accent2"/>
+          </a:fillRef>
+          <a:effectRef idx="1">
+            <a:schemeClr val="accent2"/>
+          </a:effectRef>
+          <a:fontRef idx="minor">
+            <a:schemeClr val="dk1"/>
+          </a:fontRef>
+        </p:style>
+        <p:txBody>
+          <a:bodyPr rtlCol="0" anchor="ctr"/>
+          <a:lstStyle/>
+          <a:p>
+            <a:pPr algn="ctr"/>
+            <a:r>
+              <a:rPr lang="en-US" sz="1050" dirty="0" err="1">
+                <a:solidFill>
+                  <a:schemeClr val="bg1"/>
+                </a:solidFill>
+              </a:rPr>
+              <a:t>ModelManager</a:t>
+            </a:r>
+            <a:endParaRPr lang="en-SG" sz="1050" dirty="0">
+              <a:solidFill>
+                <a:schemeClr val="bg1"/>
+              </a:solidFill>
+            </a:endParaRPr>
+          </a:p>
+        </p:txBody>
+      </p:sp>
+      <p:cxnSp>
+        <p:nvCxnSpPr>
+          <p:cNvPr id="107" name="Elbow Connector 106"/>
+          <p:cNvCxnSpPr>
+            <a:cxnSpLocks/>
+            <a:stCxn id="9" idx="1"/>
+            <a:endCxn id="126" idx="0"/>
+          </p:cNvCxnSpPr>
+          <p:nvPr/>
+        </p:nvCxnSpPr>
+        <p:spPr>
+          <a:xfrm rot="5400000">
+            <a:off x="1661508" y="3406257"/>
+            <a:ext cx="1104273" cy="1"/>
+          </a:xfrm>
+          <a:prstGeom prst="bentConnector3">
+            <a:avLst>
+              <a:gd name="adj1" fmla="val 50000"/>
+            </a:avLst>
+          </a:prstGeom>
+          <a:ln w="19050">
+            <a:solidFill>
+              <a:srgbClr val="7030A0"/>
+            </a:solidFill>
+            <a:prstDash val="solid"/>
+            <a:headEnd type="none" w="med" len="med"/>
+            <a:tailEnd type="arrow" w="med" len="med"/>
+          </a:ln>
+          <a:effectLst/>
+        </p:spPr>
+        <p:style>
+          <a:lnRef idx="1">
+            <a:schemeClr val="accent2"/>
+          </a:lnRef>
+          <a:fillRef idx="2">
+            <a:schemeClr val="accent2"/>
+          </a:fillRef>
+          <a:effectRef idx="1">
+            <a:schemeClr val="accent2"/>
+          </a:effectRef>
+          <a:fontRef idx="minor">
+            <a:schemeClr val="dk1"/>
+          </a:fontRef>
+        </p:style>
+      </p:cxnSp>
+      <p:sp>
+        <p:nvSpPr>
+          <p:cNvPr id="119" name="Rectangle 62"/>
+          <p:cNvSpPr/>
+          <p:nvPr/>
+        </p:nvSpPr>
+        <p:spPr>
+          <a:xfrm rot="16200000">
+            <a:off x="939065" y="2126438"/>
+            <a:ext cx="1093635" cy="346760"/>
+          </a:xfrm>
+          <a:prstGeom prst="rect">
+            <a:avLst/>
+          </a:prstGeom>
+          <a:solidFill>
+            <a:srgbClr val="7030A0"/>
+          </a:solidFill>
+          <a:ln w="19050">
+            <a:solidFill>
+              <a:srgbClr val="7030A0"/>
+            </a:solidFill>
+          </a:ln>
+          <a:effectLst/>
+        </p:spPr>
+        <p:style>
+          <a:lnRef idx="1">
+            <a:schemeClr val="accent2"/>
+          </a:lnRef>
+          <a:fillRef idx="2">
+            <a:schemeClr val="accent2"/>
+          </a:fillRef>
+          <a:effectRef idx="1">
+            <a:schemeClr val="accent2"/>
+          </a:effectRef>
+          <a:fontRef idx="minor">
+            <a:schemeClr val="dk1"/>
+          </a:fontRef>
+        </p:style>
+        <p:txBody>
+          <a:bodyPr rtlCol="0" anchor="ctr"/>
+          <a:lstStyle/>
+          <a:p>
+            <a:pPr algn="ctr"/>
+            <a:r>
+              <a:rPr lang="en-US" sz="1050" dirty="0">
+                <a:solidFill>
+                  <a:schemeClr val="bg1"/>
+                </a:solidFill>
+              </a:rPr>
+              <a:t>&lt;&lt;interface&gt;&gt;</a:t>
+            </a:r>
+          </a:p>
+          <a:p>
+            <a:pPr algn="ctr"/>
+            <a:r>
+              <a:rPr lang="en-US" sz="1050" dirty="0">
+                <a:solidFill>
+                  <a:schemeClr val="bg1"/>
+                </a:solidFill>
+              </a:rPr>
+              <a:t>Model</a:t>
+            </a:r>
+            <a:endParaRPr lang="en-SG" sz="1050" dirty="0">
+              <a:solidFill>
+                <a:schemeClr val="bg1"/>
+              </a:solidFill>
+            </a:endParaRPr>
+          </a:p>
+        </p:txBody>
+      </p:sp>
+      <p:sp>
+        <p:nvSpPr>
+          <p:cNvPr id="120" name="Isosceles Triangle 102"/>
+          <p:cNvSpPr/>
+          <p:nvPr/>
+        </p:nvSpPr>
+        <p:spPr>
+          <a:xfrm rot="16200000">
+            <a:off x="1609773" y="2217527"/>
+            <a:ext cx="270504" cy="175523"/>
+          </a:xfrm>
+          <a:prstGeom prst="triangle">
+            <a:avLst/>
+          </a:prstGeom>
+          <a:solidFill>
+            <a:srgbClr val="7030A0"/>
+          </a:solidFill>
+          <a:ln w="19050">
+            <a:solidFill>
+              <a:srgbClr val="7030A0"/>
+            </a:solidFill>
+          </a:ln>
+          <a:effectLst/>
+        </p:spPr>
+        <p:style>
+          <a:lnRef idx="1">
+            <a:schemeClr val="accent6"/>
+          </a:lnRef>
+          <a:fillRef idx="2">
+            <a:schemeClr val="accent6"/>
+          </a:fillRef>
+          <a:effectRef idx="1">
+            <a:schemeClr val="accent6"/>
+          </a:effectRef>
+          <a:fontRef idx="minor">
+            <a:schemeClr val="dk1"/>
+          </a:fontRef>
+        </p:style>
+        <p:txBody>
+          <a:bodyPr rtlCol="0" anchor="ctr"/>
+          <a:lstStyle/>
+          <a:p>
+            <a:pPr algn="ctr"/>
+            <a:endParaRPr lang="en-SG" sz="1050"/>
+          </a:p>
+        </p:txBody>
+      </p:sp>
+      <p:cxnSp>
+        <p:nvCxnSpPr>
+          <p:cNvPr id="58" name="Straight Arrow Connector 57"/>
+          <p:cNvCxnSpPr>
+            <a:stCxn id="42" idx="3"/>
+            <a:endCxn id="2" idx="1"/>
+          </p:cNvCxnSpPr>
+          <p:nvPr/>
+        </p:nvCxnSpPr>
+        <p:spPr>
+          <a:xfrm>
+            <a:off x="2639233" y="2591772"/>
+            <a:ext cx="167330" cy="5284"/>
+          </a:xfrm>
+          <a:prstGeom prst="straightConnector1">
+            <a:avLst/>
+          </a:prstGeom>
+          <a:ln w="19050">
+            <a:solidFill>
+              <a:srgbClr val="7030A0"/>
+            </a:solidFill>
+            <a:headEnd type="none" w="med" len="med"/>
+            <a:tailEnd type="arrow" w="med" len="med"/>
+          </a:ln>
+          <a:effectLst/>
+        </p:spPr>
+        <p:style>
+          <a:lnRef idx="1">
+            <a:schemeClr val="accent2"/>
+          </a:lnRef>
+          <a:fillRef idx="2">
+            <a:schemeClr val="accent2"/>
+          </a:fillRef>
+          <a:effectRef idx="1">
+            <a:schemeClr val="accent2"/>
+          </a:effectRef>
+          <a:fontRef idx="minor">
+            <a:schemeClr val="dk1"/>
+          </a:fontRef>
+        </p:style>
+      </p:cxnSp>
+      <p:cxnSp>
+        <p:nvCxnSpPr>
+          <p:cNvPr id="75" name="Elbow Connector 122"/>
+          <p:cNvCxnSpPr>
+            <a:cxnSpLocks/>
+          </p:cNvCxnSpPr>
+          <p:nvPr/>
+        </p:nvCxnSpPr>
+        <p:spPr>
+          <a:xfrm>
+            <a:off x="1038789" y="2307303"/>
+            <a:ext cx="273713" cy="846"/>
+          </a:xfrm>
+          <a:prstGeom prst="bentConnector3">
+            <a:avLst>
+              <a:gd name="adj1" fmla="val 50000"/>
+            </a:avLst>
+          </a:prstGeom>
+          <a:ln w="19050">
+            <a:solidFill>
+              <a:schemeClr val="bg1">
+                <a:lumMod val="75000"/>
+              </a:schemeClr>
+            </a:solidFill>
+            <a:prstDash val="sysDot"/>
+            <a:headEnd type="none" w="med" len="med"/>
+            <a:tailEnd type="arrow" w="med" len="med"/>
+          </a:ln>
+          <a:effectLst/>
+        </p:spPr>
+        <p:style>
+          <a:lnRef idx="1">
+            <a:schemeClr val="accent2"/>
+          </a:lnRef>
+          <a:fillRef idx="2">
+            <a:schemeClr val="accent2"/>
+          </a:fillRef>
+          <a:effectRef idx="1">
+            <a:schemeClr val="accent2"/>
+          </a:effectRef>
+          <a:fontRef idx="minor">
+            <a:schemeClr val="dk1"/>
+          </a:fontRef>
+        </p:style>
+      </p:cxnSp>
+      <p:cxnSp>
+        <p:nvCxnSpPr>
+          <p:cNvPr id="21" name="Straight Connector 20"/>
+          <p:cNvCxnSpPr>
+            <a:stCxn id="120" idx="3"/>
+          </p:cNvCxnSpPr>
+          <p:nvPr/>
+        </p:nvCxnSpPr>
+        <p:spPr>
+          <a:xfrm flipV="1">
+            <a:off x="1832787" y="2305288"/>
+            <a:ext cx="216105" cy="1"/>
+          </a:xfrm>
+          <a:prstGeom prst="line">
+            <a:avLst/>
+          </a:prstGeom>
+          <a:ln w="19050">
+            <a:solidFill>
+              <a:srgbClr val="7030A0"/>
+            </a:solidFill>
+            <a:prstDash val="sysDot"/>
+            <a:headEnd type="none" w="med" len="med"/>
+            <a:tailEnd type="none" w="med" len="med"/>
+          </a:ln>
+          <a:effectLst/>
+        </p:spPr>
+        <p:style>
+          <a:lnRef idx="1">
+            <a:schemeClr val="accent2"/>
+          </a:lnRef>
+          <a:fillRef idx="2">
+            <a:schemeClr val="accent2"/>
+          </a:fillRef>
+          <a:effectRef idx="1">
+            <a:schemeClr val="accent2"/>
+          </a:effectRef>
+          <a:fontRef idx="minor">
+            <a:schemeClr val="dk1"/>
+          </a:fontRef>
+        </p:style>
+      </p:cxnSp>
+      <p:sp>
+        <p:nvSpPr>
+          <p:cNvPr id="42" name="Flowchart: Decision 96"/>
+          <p:cNvSpPr/>
+          <p:nvPr/>
+        </p:nvSpPr>
+        <p:spPr>
+          <a:xfrm>
+            <a:off x="2403185" y="2505082"/>
+            <a:ext cx="236048" cy="173380"/>
+          </a:xfrm>
+          <a:prstGeom prst="flowChartDecision">
+            <a:avLst/>
+          </a:prstGeom>
+          <a:noFill/>
+          <a:ln w="19050">
+            <a:solidFill>
+              <a:srgbClr val="7030A0"/>
+            </a:solidFill>
+          </a:ln>
+          <a:effectLst/>
+        </p:spPr>
+        <p:style>
+          <a:lnRef idx="1">
+            <a:schemeClr val="accent6"/>
+          </a:lnRef>
+          <a:fillRef idx="2">
+            <a:schemeClr val="accent6"/>
+          </a:fillRef>
+          <a:effectRef idx="1">
+            <a:schemeClr val="accent6"/>
+          </a:effectRef>
+          <a:fontRef idx="minor">
+            <a:schemeClr val="dk1"/>
+          </a:fontRef>
+        </p:style>
+        <p:txBody>
+          <a:bodyPr rtlCol="0" anchor="ctr"/>
+          <a:lstStyle/>
+          <a:p>
+            <a:pPr algn="ctr"/>
+            <a:endParaRPr lang="en-US" sz="1050"/>
+          </a:p>
+        </p:txBody>
+      </p:sp>
+      <p:sp>
+        <p:nvSpPr>
+          <p:cNvPr id="46" name="Rectangle 8"/>
+          <p:cNvSpPr/>
+          <p:nvPr/>
+        </p:nvSpPr>
+        <p:spPr>
+          <a:xfrm>
+            <a:off x="2808873" y="1892656"/>
+            <a:ext cx="1093635" cy="346760"/>
+          </a:xfrm>
+          <a:prstGeom prst="rect">
+            <a:avLst/>
+          </a:prstGeom>
+          <a:ln w="19050">
+            <a:solidFill>
+              <a:srgbClr val="7030A0"/>
+            </a:solidFill>
+          </a:ln>
+          <a:effectLst/>
+        </p:spPr>
+        <p:style>
+          <a:lnRef idx="1">
+            <a:schemeClr val="accent4"/>
+          </a:lnRef>
+          <a:fillRef idx="2">
+            <a:schemeClr val="accent4"/>
+          </a:fillRef>
+          <a:effectRef idx="1">
+            <a:schemeClr val="accent4"/>
+          </a:effectRef>
+          <a:fontRef idx="minor">
+            <a:schemeClr val="dk1"/>
+          </a:fontRef>
+        </p:style>
+        <p:txBody>
+          <a:bodyPr rtlCol="0" anchor="ctr"/>
+          <a:lstStyle/>
+          <a:p>
+            <a:pPr algn="ctr"/>
+            <a:r>
+              <a:rPr lang="en-US" sz="1050" dirty="0" err="1">
+                <a:solidFill>
+                  <a:srgbClr val="7030A0"/>
+                </a:solidFill>
+              </a:rPr>
+              <a:t>EntryBook</a:t>
+            </a:r>
+            <a:endParaRPr lang="en-SG" sz="1050" dirty="0">
+              <a:solidFill>
+                <a:srgbClr val="7030A0"/>
+              </a:solidFill>
+            </a:endParaRPr>
+          </a:p>
+        </p:txBody>
+      </p:sp>
+      <p:cxnSp>
+        <p:nvCxnSpPr>
+          <p:cNvPr id="47" name="Straight Arrow Connector 46"/>
+          <p:cNvCxnSpPr>
+            <a:stCxn id="48" idx="3"/>
+            <a:endCxn id="46" idx="1"/>
+          </p:cNvCxnSpPr>
+          <p:nvPr/>
+        </p:nvCxnSpPr>
+        <p:spPr>
+          <a:xfrm>
+            <a:off x="2641543" y="2060752"/>
+            <a:ext cx="167330" cy="5284"/>
+          </a:xfrm>
+          <a:prstGeom prst="straightConnector1">
+            <a:avLst/>
+          </a:prstGeom>
+          <a:ln w="19050">
+            <a:solidFill>
+              <a:srgbClr val="7030A0"/>
+            </a:solidFill>
+            <a:headEnd type="none" w="med" len="med"/>
+            <a:tailEnd type="arrow" w="med" len="med"/>
+          </a:ln>
+          <a:effectLst/>
+        </p:spPr>
+        <p:style>
+          <a:lnRef idx="1">
+            <a:schemeClr val="accent2"/>
+          </a:lnRef>
+          <a:fillRef idx="2">
+            <a:schemeClr val="accent2"/>
+          </a:fillRef>
+          <a:effectRef idx="1">
+            <a:schemeClr val="accent2"/>
+          </a:effectRef>
+          <a:fontRef idx="minor">
+            <a:schemeClr val="dk1"/>
+          </a:fontRef>
+        </p:style>
+      </p:cxnSp>
+      <p:sp>
+        <p:nvSpPr>
+          <p:cNvPr id="48" name="Flowchart: Decision 96"/>
+          <p:cNvSpPr/>
+          <p:nvPr/>
+        </p:nvSpPr>
+        <p:spPr>
+          <a:xfrm>
+            <a:off x="2405495" y="1974062"/>
+            <a:ext cx="236048" cy="173380"/>
+          </a:xfrm>
+          <a:prstGeom prst="flowChartDecision">
+            <a:avLst/>
+          </a:prstGeom>
+          <a:noFill/>
+          <a:ln w="19050">
+            <a:solidFill>
+              <a:srgbClr val="7030A0"/>
+            </a:solidFill>
+          </a:ln>
+          <a:effectLst/>
+        </p:spPr>
+        <p:style>
+          <a:lnRef idx="1">
+            <a:schemeClr val="accent6"/>
+          </a:lnRef>
+          <a:fillRef idx="2">
+            <a:schemeClr val="accent6"/>
+          </a:fillRef>
+          <a:effectRef idx="1">
+            <a:schemeClr val="accent6"/>
+          </a:effectRef>
+          <a:fontRef idx="minor">
+            <a:schemeClr val="dk1"/>
+          </a:fontRef>
+        </p:style>
+        <p:txBody>
+          <a:bodyPr rtlCol="0" anchor="ctr"/>
+          <a:lstStyle/>
+          <a:p>
+            <a:pPr algn="ctr"/>
+            <a:endParaRPr lang="en-US" sz="1050"/>
+          </a:p>
+        </p:txBody>
+      </p:sp>
+      <p:sp>
+        <p:nvSpPr>
+          <p:cNvPr id="49" name="Rectangle 8"/>
+          <p:cNvSpPr/>
+          <p:nvPr/>
+        </p:nvSpPr>
+        <p:spPr>
+          <a:xfrm>
+            <a:off x="4829662" y="1631853"/>
+            <a:ext cx="1156969" cy="515590"/>
+          </a:xfrm>
+          <a:prstGeom prst="rect">
+            <a:avLst/>
+          </a:prstGeom>
+          <a:ln w="19050">
+            <a:solidFill>
+              <a:srgbClr val="7030A0"/>
+            </a:solidFill>
+          </a:ln>
+          <a:effectLst/>
+        </p:spPr>
+        <p:style>
+          <a:lnRef idx="1">
+            <a:schemeClr val="accent4"/>
+          </a:lnRef>
+          <a:fillRef idx="2">
+            <a:schemeClr val="accent4"/>
+          </a:fillRef>
+          <a:effectRef idx="1">
+            <a:schemeClr val="accent4"/>
+          </a:effectRef>
+          <a:fontRef idx="minor">
+            <a:schemeClr val="dk1"/>
+          </a:fontRef>
+        </p:style>
+        <p:txBody>
+          <a:bodyPr rtlCol="0" anchor="ctr"/>
+          <a:lstStyle/>
+          <a:p>
+            <a:pPr algn="ctr"/>
+            <a:r>
+              <a:rPr lang="en-US" sz="1050" dirty="0" err="1">
+                <a:solidFill>
+                  <a:srgbClr val="7030A0"/>
+                </a:solidFill>
+              </a:rPr>
+              <a:t>MiscEntryList</a:t>
+            </a:r>
+            <a:endParaRPr lang="en-SG" sz="1050" dirty="0">
+              <a:solidFill>
+                <a:srgbClr val="7030A0"/>
+              </a:solidFill>
+            </a:endParaRPr>
+          </a:p>
+        </p:txBody>
+      </p:sp>
+      <p:sp>
+        <p:nvSpPr>
+          <p:cNvPr id="51" name="Flowchart: Decision 96"/>
+          <p:cNvSpPr/>
+          <p:nvPr/>
+        </p:nvSpPr>
+        <p:spPr>
+          <a:xfrm>
+            <a:off x="3917173" y="1994582"/>
+            <a:ext cx="236048" cy="173380"/>
+          </a:xfrm>
+          <a:prstGeom prst="flowChartDecision">
+            <a:avLst/>
+          </a:prstGeom>
+          <a:solidFill>
+            <a:srgbClr val="7030A0"/>
+          </a:solidFill>
+          <a:ln w="19050">
+            <a:solidFill>
+              <a:srgbClr val="7030A0"/>
+            </a:solidFill>
+          </a:ln>
+          <a:effectLst/>
+        </p:spPr>
+        <p:style>
+          <a:lnRef idx="1">
+            <a:schemeClr val="accent6"/>
+          </a:lnRef>
+          <a:fillRef idx="2">
+            <a:schemeClr val="accent6"/>
+          </a:fillRef>
+          <a:effectRef idx="1">
+            <a:schemeClr val="accent6"/>
+          </a:effectRef>
+          <a:fontRef idx="minor">
+            <a:schemeClr val="dk1"/>
+          </a:fontRef>
+        </p:style>
+        <p:txBody>
+          <a:bodyPr rtlCol="0" anchor="ctr"/>
+          <a:lstStyle/>
+          <a:p>
+            <a:pPr algn="ctr"/>
+            <a:endParaRPr lang="en-US" sz="1050"/>
+          </a:p>
+        </p:txBody>
+      </p:sp>
+      <p:cxnSp>
+        <p:nvCxnSpPr>
+          <p:cNvPr id="30" name="Elbow Connector 29"/>
+          <p:cNvCxnSpPr>
+            <a:cxnSpLocks/>
+            <a:stCxn id="51" idx="3"/>
+          </p:cNvCxnSpPr>
+          <p:nvPr/>
+        </p:nvCxnSpPr>
+        <p:spPr>
+          <a:xfrm flipV="1">
+            <a:off x="4153221" y="1739273"/>
+            <a:ext cx="678824" cy="341999"/>
+          </a:xfrm>
+          <a:prstGeom prst="bentConnector3">
+            <a:avLst/>
+          </a:prstGeom>
+          <a:ln w="19050">
+            <a:solidFill>
+              <a:srgbClr val="7030A0"/>
+            </a:solidFill>
+            <a:headEnd type="none" w="med" len="med"/>
+            <a:tailEnd type="arrow" w="med" len="med"/>
+          </a:ln>
+          <a:effectLst/>
+        </p:spPr>
+        <p:style>
+          <a:lnRef idx="1">
+            <a:schemeClr val="accent2"/>
+          </a:lnRef>
+          <a:fillRef idx="2">
+            <a:schemeClr val="accent2"/>
+          </a:fillRef>
+          <a:effectRef idx="1">
+            <a:schemeClr val="accent2"/>
+          </a:effectRef>
+          <a:fontRef idx="minor">
+            <a:schemeClr val="dk1"/>
+          </a:fontRef>
+        </p:style>
+      </p:cxnSp>
+      <p:sp>
+        <p:nvSpPr>
+          <p:cNvPr id="57" name="Rectangle 8"/>
+          <p:cNvSpPr/>
+          <p:nvPr/>
+        </p:nvSpPr>
+        <p:spPr>
+          <a:xfrm>
+            <a:off x="4832045" y="1191764"/>
+            <a:ext cx="1156969" cy="346760"/>
+          </a:xfrm>
+          <a:prstGeom prst="rect">
+            <a:avLst/>
+          </a:prstGeom>
+          <a:ln w="19050">
+            <a:solidFill>
+              <a:srgbClr val="7030A0"/>
+            </a:solidFill>
+          </a:ln>
+          <a:effectLst/>
+        </p:spPr>
+        <p:style>
+          <a:lnRef idx="1">
+            <a:schemeClr val="accent4"/>
+          </a:lnRef>
+          <a:fillRef idx="2">
+            <a:schemeClr val="accent4"/>
+          </a:fillRef>
+          <a:effectRef idx="1">
+            <a:schemeClr val="accent4"/>
+          </a:effectRef>
+          <a:fontRef idx="minor">
+            <a:schemeClr val="dk1"/>
+          </a:fontRef>
+        </p:style>
+        <p:txBody>
+          <a:bodyPr rtlCol="0" anchor="ctr"/>
+          <a:lstStyle/>
+          <a:p>
+            <a:pPr algn="ctr"/>
+            <a:r>
+              <a:rPr lang="en-US" sz="1050" dirty="0" err="1">
+                <a:solidFill>
+                  <a:srgbClr val="7030A0"/>
+                </a:solidFill>
+              </a:rPr>
+              <a:t>UniqueTagList</a:t>
+            </a:r>
+            <a:endParaRPr lang="en-SG" sz="1050" dirty="0">
+              <a:solidFill>
+                <a:srgbClr val="7030A0"/>
+              </a:solidFill>
+            </a:endParaRPr>
+          </a:p>
+        </p:txBody>
+      </p:sp>
+      <p:cxnSp>
+        <p:nvCxnSpPr>
+          <p:cNvPr id="59" name="Elbow Connector 58"/>
+          <p:cNvCxnSpPr>
+            <a:cxnSpLocks/>
+            <a:stCxn id="51" idx="3"/>
+            <a:endCxn id="57" idx="1"/>
+          </p:cNvCxnSpPr>
+          <p:nvPr/>
+        </p:nvCxnSpPr>
+        <p:spPr>
+          <a:xfrm flipV="1">
+            <a:off x="4153221" y="1365144"/>
+            <a:ext cx="678824" cy="716128"/>
+          </a:xfrm>
+          <a:prstGeom prst="bentConnector3">
+            <a:avLst>
+              <a:gd name="adj1" fmla="val 50000"/>
+            </a:avLst>
+          </a:prstGeom>
+          <a:ln w="19050">
+            <a:solidFill>
+              <a:srgbClr val="7030A0"/>
+            </a:solidFill>
+            <a:headEnd type="none" w="med" len="med"/>
+            <a:tailEnd type="arrow" w="med" len="med"/>
+          </a:ln>
+          <a:effectLst/>
+        </p:spPr>
+        <p:style>
+          <a:lnRef idx="1">
+            <a:schemeClr val="accent2"/>
+          </a:lnRef>
+          <a:fillRef idx="2">
+            <a:schemeClr val="accent2"/>
+          </a:fillRef>
+          <a:effectRef idx="1">
+            <a:schemeClr val="accent2"/>
+          </a:effectRef>
+          <a:fontRef idx="minor">
+            <a:schemeClr val="dk1"/>
+          </a:fontRef>
+        </p:style>
+      </p:cxnSp>
+      <p:sp>
+        <p:nvSpPr>
+          <p:cNvPr id="62" name="Rectangle 8"/>
+          <p:cNvSpPr/>
+          <p:nvPr/>
+        </p:nvSpPr>
+        <p:spPr>
+          <a:xfrm>
+            <a:off x="6529170" y="1981767"/>
+            <a:ext cx="951336" cy="346761"/>
+          </a:xfrm>
+          <a:prstGeom prst="rect">
+            <a:avLst/>
+          </a:prstGeom>
+          <a:ln w="19050">
+            <a:solidFill>
+              <a:srgbClr val="7030A0"/>
+            </a:solidFill>
+          </a:ln>
+          <a:effectLst/>
+        </p:spPr>
+        <p:style>
+          <a:lnRef idx="1">
+            <a:schemeClr val="accent4"/>
+          </a:lnRef>
+          <a:fillRef idx="2">
+            <a:schemeClr val="accent4"/>
+          </a:fillRef>
+          <a:effectRef idx="1">
+            <a:schemeClr val="accent4"/>
+          </a:effectRef>
+          <a:fontRef idx="minor">
+            <a:schemeClr val="dk1"/>
+          </a:fontRef>
+        </p:style>
+        <p:txBody>
+          <a:bodyPr rtlCol="0" anchor="ctr"/>
+          <a:lstStyle/>
+          <a:p>
+            <a:pPr algn="ctr"/>
+            <a:r>
+              <a:rPr lang="en-SG" sz="1050" dirty="0">
+                <a:solidFill>
+                  <a:srgbClr val="7030A0"/>
+                </a:solidFill>
+              </a:rPr>
+              <a:t>{abstract}</a:t>
+            </a:r>
+          </a:p>
+          <a:p>
+            <a:pPr algn="ctr"/>
+            <a:r>
+              <a:rPr lang="en-SG" sz="1050" dirty="0">
+                <a:solidFill>
+                  <a:srgbClr val="7030A0"/>
+                </a:solidFill>
+              </a:rPr>
+              <a:t>Entry</a:t>
+            </a:r>
+          </a:p>
+        </p:txBody>
+      </p:sp>
+      <p:sp>
+        <p:nvSpPr>
+          <p:cNvPr id="63" name="Flowchart: Decision 96"/>
+          <p:cNvSpPr/>
+          <p:nvPr/>
+        </p:nvSpPr>
+        <p:spPr>
+          <a:xfrm>
+            <a:off x="5994896" y="1829225"/>
+            <a:ext cx="236048" cy="173380"/>
+          </a:xfrm>
+          <a:prstGeom prst="flowChartDecision">
+            <a:avLst/>
+          </a:prstGeom>
+          <a:noFill/>
+          <a:ln w="19050">
+            <a:solidFill>
+              <a:srgbClr val="7030A0"/>
+            </a:solidFill>
+          </a:ln>
+          <a:effectLst/>
+        </p:spPr>
+        <p:style>
+          <a:lnRef idx="1">
+            <a:schemeClr val="accent6"/>
+          </a:lnRef>
+          <a:fillRef idx="2">
+            <a:schemeClr val="accent6"/>
+          </a:fillRef>
+          <a:effectRef idx="1">
+            <a:schemeClr val="accent6"/>
+          </a:effectRef>
+          <a:fontRef idx="minor">
+            <a:schemeClr val="dk1"/>
+          </a:fontRef>
+        </p:style>
+        <p:txBody>
+          <a:bodyPr rtlCol="0" anchor="ctr"/>
+          <a:lstStyle/>
+          <a:p>
+            <a:pPr algn="ctr"/>
+            <a:endParaRPr lang="en-US" sz="1050"/>
+          </a:p>
+        </p:txBody>
+      </p:sp>
+      <p:cxnSp>
+        <p:nvCxnSpPr>
+          <p:cNvPr id="64" name="Elbow Connector 63"/>
+          <p:cNvCxnSpPr>
+            <a:cxnSpLocks/>
+            <a:stCxn id="63" idx="3"/>
+            <a:endCxn id="62" idx="1"/>
+          </p:cNvCxnSpPr>
+          <p:nvPr/>
+        </p:nvCxnSpPr>
+        <p:spPr>
+          <a:xfrm>
+            <a:off x="6230944" y="1915915"/>
+            <a:ext cx="298226" cy="239233"/>
+          </a:xfrm>
+          <a:prstGeom prst="bentConnector3">
+            <a:avLst/>
+          </a:prstGeom>
+          <a:ln w="19050">
+            <a:solidFill>
+              <a:srgbClr val="7030A0"/>
+            </a:solidFill>
+            <a:headEnd type="none" w="med" len="med"/>
+            <a:tailEnd type="arrow" w="med" len="med"/>
+          </a:ln>
+          <a:effectLst/>
+        </p:spPr>
+        <p:style>
+          <a:lnRef idx="1">
+            <a:schemeClr val="accent2"/>
+          </a:lnRef>
+          <a:fillRef idx="2">
+            <a:schemeClr val="accent2"/>
+          </a:fillRef>
+          <a:effectRef idx="1">
+            <a:schemeClr val="accent2"/>
+          </a:effectRef>
+          <a:fontRef idx="minor">
+            <a:schemeClr val="dk1"/>
+          </a:fontRef>
+        </p:style>
+      </p:cxnSp>
+      <p:sp>
+        <p:nvSpPr>
+          <p:cNvPr id="67" name="Rectangle 8"/>
+          <p:cNvSpPr/>
+          <p:nvPr/>
+        </p:nvSpPr>
+        <p:spPr>
+          <a:xfrm>
+            <a:off x="5705589" y="720527"/>
+            <a:ext cx="483700" cy="346760"/>
+          </a:xfrm>
+          <a:prstGeom prst="rect">
+            <a:avLst/>
+          </a:prstGeom>
+          <a:ln w="19050">
+            <a:solidFill>
+              <a:srgbClr val="7030A0"/>
+            </a:solidFill>
+          </a:ln>
+          <a:effectLst/>
+        </p:spPr>
+        <p:style>
+          <a:lnRef idx="1">
+            <a:schemeClr val="accent4"/>
+          </a:lnRef>
+          <a:fillRef idx="2">
+            <a:schemeClr val="accent4"/>
+          </a:fillRef>
+          <a:effectRef idx="1">
+            <a:schemeClr val="accent4"/>
+          </a:effectRef>
+          <a:fontRef idx="minor">
+            <a:schemeClr val="dk1"/>
+          </a:fontRef>
+        </p:style>
+        <p:txBody>
+          <a:bodyPr rtlCol="0" anchor="ctr"/>
+          <a:lstStyle/>
+          <a:p>
+            <a:pPr algn="ctr"/>
+            <a:r>
+              <a:rPr lang="en-US" sz="1050" dirty="0">
+                <a:solidFill>
+                  <a:srgbClr val="7030A0"/>
+                </a:solidFill>
+              </a:rPr>
+              <a:t>Tag</a:t>
+            </a:r>
+            <a:endParaRPr lang="en-SG" sz="1050" dirty="0">
+              <a:solidFill>
+                <a:srgbClr val="7030A0"/>
+              </a:solidFill>
+            </a:endParaRPr>
+          </a:p>
+        </p:txBody>
+      </p:sp>
+      <p:sp>
+        <p:nvSpPr>
+          <p:cNvPr id="68" name="Flowchart: Decision 96"/>
+          <p:cNvSpPr/>
+          <p:nvPr/>
+        </p:nvSpPr>
+        <p:spPr>
+          <a:xfrm rot="16200000">
+            <a:off x="5291150" y="977735"/>
+            <a:ext cx="236048" cy="173380"/>
+          </a:xfrm>
+          <a:prstGeom prst="flowChartDecision">
+            <a:avLst/>
+          </a:prstGeom>
+          <a:noFill/>
+          <a:ln w="19050">
+            <a:solidFill>
+              <a:srgbClr val="7030A0"/>
+            </a:solidFill>
+          </a:ln>
+          <a:effectLst/>
+        </p:spPr>
+        <p:style>
+          <a:lnRef idx="1">
+            <a:schemeClr val="accent6"/>
+          </a:lnRef>
+          <a:fillRef idx="2">
+            <a:schemeClr val="accent6"/>
+          </a:fillRef>
+          <a:effectRef idx="1">
+            <a:schemeClr val="accent6"/>
+          </a:effectRef>
+          <a:fontRef idx="minor">
+            <a:schemeClr val="dk1"/>
+          </a:fontRef>
+        </p:style>
+        <p:txBody>
+          <a:bodyPr rtlCol="0" anchor="ctr"/>
+          <a:lstStyle/>
+          <a:p>
+            <a:pPr algn="ctr"/>
+            <a:endParaRPr lang="en-US" sz="1050"/>
+          </a:p>
+        </p:txBody>
+      </p:sp>
+      <p:cxnSp>
+        <p:nvCxnSpPr>
+          <p:cNvPr id="69" name="Elbow Connector 68"/>
+          <p:cNvCxnSpPr>
+            <a:stCxn id="68" idx="3"/>
+            <a:endCxn id="67" idx="1"/>
+          </p:cNvCxnSpPr>
+          <p:nvPr/>
+        </p:nvCxnSpPr>
+        <p:spPr>
+          <a:xfrm rot="5400000" flipH="1" flipV="1">
+            <a:off x="5531134" y="771947"/>
+            <a:ext cx="52494" cy="296415"/>
+          </a:xfrm>
+          <a:prstGeom prst="bentConnector2">
+            <a:avLst/>
+          </a:prstGeom>
+          <a:ln w="19050">
+            <a:solidFill>
+              <a:srgbClr val="7030A0"/>
+            </a:solidFill>
+            <a:headEnd type="none" w="med" len="med"/>
+            <a:tailEnd type="arrow" w="med" len="med"/>
+          </a:ln>
+          <a:effectLst/>
+        </p:spPr>
+        <p:style>
+          <a:lnRef idx="1">
+            <a:schemeClr val="accent2"/>
+          </a:lnRef>
+          <a:fillRef idx="2">
+            <a:schemeClr val="accent2"/>
+          </a:fillRef>
+          <a:effectRef idx="1">
+            <a:schemeClr val="accent2"/>
+          </a:effectRef>
+          <a:fontRef idx="minor">
+            <a:schemeClr val="dk1"/>
+          </a:fontRef>
+        </p:style>
+      </p:cxnSp>
+      <p:sp>
+        <p:nvSpPr>
+          <p:cNvPr id="72" name="Rectangle 8"/>
+          <p:cNvSpPr/>
+          <p:nvPr/>
+        </p:nvSpPr>
+        <p:spPr>
+          <a:xfrm>
+            <a:off x="3683360" y="4052900"/>
+            <a:ext cx="1045383" cy="346760"/>
+          </a:xfrm>
+          <a:prstGeom prst="rect">
+            <a:avLst/>
+          </a:prstGeom>
+          <a:ln w="19050">
+            <a:solidFill>
+              <a:srgbClr val="7030A0"/>
+            </a:solidFill>
+          </a:ln>
+          <a:effectLst/>
+        </p:spPr>
+        <p:style>
+          <a:lnRef idx="1">
+            <a:schemeClr val="accent4"/>
+          </a:lnRef>
+          <a:fillRef idx="2">
+            <a:schemeClr val="accent4"/>
+          </a:fillRef>
+          <a:effectRef idx="1">
+            <a:schemeClr val="accent4"/>
+          </a:effectRef>
+          <a:fontRef idx="minor">
+            <a:schemeClr val="dk1"/>
+          </a:fontRef>
+        </p:style>
+        <p:txBody>
+          <a:bodyPr rtlCol="0" anchor="ctr"/>
+          <a:lstStyle/>
+          <a:p>
+            <a:pPr algn="ctr"/>
+            <a:r>
+              <a:rPr lang="en-US" sz="1050" dirty="0">
+                <a:solidFill>
+                  <a:srgbClr val="7030A0"/>
+                </a:solidFill>
+              </a:rPr>
+              <a:t>&lt;&lt;interface&gt;&gt;</a:t>
+            </a:r>
+            <a:br>
+              <a:rPr lang="en-US" sz="1050" dirty="0">
+                <a:solidFill>
+                  <a:srgbClr val="7030A0"/>
+                </a:solidFill>
+              </a:rPr>
+            </a:br>
+            <a:r>
+              <a:rPr lang="en-US" sz="1050" dirty="0" err="1">
+                <a:solidFill>
+                  <a:srgbClr val="7030A0"/>
+                </a:solidFill>
+              </a:rPr>
+              <a:t>ReadOnlyEntry</a:t>
+            </a:r>
+            <a:endParaRPr lang="en-SG" sz="1050" dirty="0">
+              <a:solidFill>
+                <a:srgbClr val="7030A0"/>
+              </a:solidFill>
+            </a:endParaRPr>
+          </a:p>
+        </p:txBody>
+      </p:sp>
+      <p:sp>
+        <p:nvSpPr>
+          <p:cNvPr id="76" name="Rectangle 8"/>
+          <p:cNvSpPr/>
+          <p:nvPr/>
+        </p:nvSpPr>
+        <p:spPr>
+          <a:xfrm>
+            <a:off x="6641977" y="762000"/>
+            <a:ext cx="708186" cy="285783"/>
+          </a:xfrm>
+          <a:prstGeom prst="rect">
+            <a:avLst/>
+          </a:prstGeom>
+          <a:ln w="19050">
+            <a:solidFill>
+              <a:srgbClr val="7030A0"/>
+            </a:solidFill>
+          </a:ln>
+          <a:effectLst/>
+        </p:spPr>
+        <p:style>
+          <a:lnRef idx="1">
+            <a:schemeClr val="accent4"/>
+          </a:lnRef>
+          <a:fillRef idx="2">
+            <a:schemeClr val="accent4"/>
+          </a:fillRef>
+          <a:effectRef idx="1">
+            <a:schemeClr val="accent4"/>
+          </a:effectRef>
+          <a:fontRef idx="minor">
+            <a:schemeClr val="dk1"/>
+          </a:fontRef>
+        </p:style>
+        <p:txBody>
+          <a:bodyPr rtlCol="0" anchor="ctr"/>
+          <a:lstStyle/>
+          <a:p>
+            <a:pPr algn="ctr"/>
+            <a:r>
+              <a:rPr lang="en-US" sz="1050">
+                <a:solidFill>
+                  <a:srgbClr val="7030A0"/>
+                </a:solidFill>
+              </a:rPr>
+              <a:t>Name</a:t>
+            </a:r>
+            <a:endParaRPr lang="en-SG" sz="1050" dirty="0">
+              <a:solidFill>
+                <a:srgbClr val="7030A0"/>
+              </a:solidFill>
+            </a:endParaRPr>
+          </a:p>
+        </p:txBody>
+      </p:sp>
+      <p:sp>
+        <p:nvSpPr>
+          <p:cNvPr id="78" name="Flowchart: Decision 96"/>
+          <p:cNvSpPr/>
+          <p:nvPr/>
+        </p:nvSpPr>
+        <p:spPr>
+          <a:xfrm rot="16200000">
+            <a:off x="6878045" y="1756975"/>
+            <a:ext cx="236048" cy="173380"/>
+          </a:xfrm>
+          <a:prstGeom prst="flowChartDecision">
+            <a:avLst/>
+          </a:prstGeom>
+          <a:solidFill>
+            <a:srgbClr val="7030A0"/>
+          </a:solidFill>
+          <a:ln w="19050">
+            <a:solidFill>
+              <a:srgbClr val="7030A0"/>
+            </a:solidFill>
+          </a:ln>
+          <a:effectLst/>
+        </p:spPr>
+        <p:style>
+          <a:lnRef idx="1">
+            <a:schemeClr val="accent6"/>
+          </a:lnRef>
+          <a:fillRef idx="2">
+            <a:schemeClr val="accent6"/>
+          </a:fillRef>
+          <a:effectRef idx="1">
+            <a:schemeClr val="accent6"/>
+          </a:effectRef>
+          <a:fontRef idx="minor">
+            <a:schemeClr val="dk1"/>
+          </a:fontRef>
+        </p:style>
+        <p:txBody>
+          <a:bodyPr rtlCol="0" anchor="ctr"/>
+          <a:lstStyle/>
+          <a:p>
+            <a:pPr algn="ctr"/>
+            <a:endParaRPr lang="en-US" sz="1050"/>
+          </a:p>
+        </p:txBody>
+      </p:sp>
+      <p:cxnSp>
+        <p:nvCxnSpPr>
+          <p:cNvPr id="79" name="Elbow Connector 78"/>
+          <p:cNvCxnSpPr>
+            <a:cxnSpLocks/>
+            <a:stCxn id="78" idx="3"/>
+            <a:endCxn id="76" idx="2"/>
+          </p:cNvCxnSpPr>
+          <p:nvPr/>
+        </p:nvCxnSpPr>
+        <p:spPr>
+          <a:xfrm rot="5400000" flipH="1" flipV="1">
+            <a:off x="6657140" y="1386712"/>
+            <a:ext cx="677858" cy="1"/>
+          </a:xfrm>
+          <a:prstGeom prst="bentConnector3">
+            <a:avLst>
+              <a:gd name="adj1" fmla="val 50000"/>
+            </a:avLst>
+          </a:prstGeom>
+          <a:ln w="19050">
+            <a:solidFill>
+              <a:srgbClr val="7030A0"/>
+            </a:solidFill>
+            <a:headEnd type="none" w="med" len="med"/>
+            <a:tailEnd type="arrow" w="med" len="med"/>
+          </a:ln>
+          <a:effectLst/>
+        </p:spPr>
+        <p:style>
+          <a:lnRef idx="1">
+            <a:schemeClr val="accent2"/>
+          </a:lnRef>
+          <a:fillRef idx="2">
+            <a:schemeClr val="accent2"/>
+          </a:fillRef>
+          <a:effectRef idx="1">
+            <a:schemeClr val="accent2"/>
+          </a:effectRef>
+          <a:fontRef idx="minor">
+            <a:schemeClr val="dk1"/>
+          </a:fontRef>
+        </p:style>
+      </p:cxnSp>
+      <p:cxnSp>
+        <p:nvCxnSpPr>
+          <p:cNvPr id="97" name="Elbow Connector 63"/>
+          <p:cNvCxnSpPr>
+            <a:cxnSpLocks/>
+            <a:stCxn id="138" idx="3"/>
+            <a:endCxn id="46" idx="0"/>
+          </p:cNvCxnSpPr>
+          <p:nvPr/>
+        </p:nvCxnSpPr>
+        <p:spPr>
+          <a:xfrm rot="16200000" flipH="1">
+            <a:off x="3297348" y="1834313"/>
+            <a:ext cx="114374" cy="2311"/>
+          </a:xfrm>
+          <a:prstGeom prst="bentConnector3">
+            <a:avLst>
+              <a:gd name="adj1" fmla="val 50000"/>
+            </a:avLst>
+          </a:prstGeom>
+          <a:ln w="19050">
+            <a:solidFill>
+              <a:srgbClr val="7030A0"/>
+            </a:solidFill>
+            <a:prstDash val="sysDot"/>
+            <a:headEnd type="none" w="med" len="med"/>
+            <a:tailEnd type="none" w="med" len="med"/>
+          </a:ln>
+          <a:effectLst/>
+        </p:spPr>
+        <p:style>
+          <a:lnRef idx="1">
+            <a:schemeClr val="accent2"/>
+          </a:lnRef>
+          <a:fillRef idx="2">
+            <a:schemeClr val="accent2"/>
+          </a:fillRef>
+          <a:effectRef idx="1">
+            <a:schemeClr val="accent2"/>
+          </a:effectRef>
+          <a:fontRef idx="minor">
+            <a:schemeClr val="dk1"/>
+          </a:fontRef>
+        </p:style>
+      </p:cxnSp>
+      <p:sp>
+        <p:nvSpPr>
+          <p:cNvPr id="100" name="Rectangle 8"/>
+          <p:cNvSpPr/>
+          <p:nvPr/>
+        </p:nvSpPr>
+        <p:spPr>
+          <a:xfrm>
+            <a:off x="2589686" y="1253440"/>
+            <a:ext cx="1539926" cy="346760"/>
+          </a:xfrm>
+          <a:prstGeom prst="rect">
+            <a:avLst/>
+          </a:prstGeom>
+          <a:ln w="19050">
+            <a:solidFill>
+              <a:srgbClr val="7030A0"/>
+            </a:solidFill>
+          </a:ln>
+          <a:effectLst/>
+        </p:spPr>
+        <p:style>
+          <a:lnRef idx="1">
+            <a:schemeClr val="accent4"/>
+          </a:lnRef>
+          <a:fillRef idx="2">
+            <a:schemeClr val="accent4"/>
+          </a:fillRef>
+          <a:effectRef idx="1">
+            <a:schemeClr val="accent4"/>
+          </a:effectRef>
+          <a:fontRef idx="minor">
+            <a:schemeClr val="dk1"/>
+          </a:fontRef>
+        </p:style>
+        <p:txBody>
+          <a:bodyPr rtlCol="0" anchor="ctr"/>
+          <a:lstStyle/>
+          <a:p>
+            <a:pPr algn="ctr"/>
+            <a:r>
+              <a:rPr lang="en-US" sz="1050" dirty="0">
+                <a:solidFill>
+                  <a:srgbClr val="7030A0"/>
+                </a:solidFill>
+              </a:rPr>
+              <a:t>&lt;&lt;interface&gt;&gt;</a:t>
+            </a:r>
+            <a:br>
+              <a:rPr lang="en-US" sz="1050" dirty="0">
+                <a:solidFill>
+                  <a:srgbClr val="7030A0"/>
+                </a:solidFill>
+              </a:rPr>
+            </a:br>
+            <a:r>
+              <a:rPr lang="en-US" sz="1050" dirty="0" err="1">
+                <a:solidFill>
+                  <a:srgbClr val="7030A0"/>
+                </a:solidFill>
+              </a:rPr>
+              <a:t>ReadOnlyEntryBook</a:t>
+            </a:r>
+            <a:endParaRPr lang="en-SG" sz="1050" dirty="0">
+              <a:solidFill>
+                <a:srgbClr val="7030A0"/>
+              </a:solidFill>
+            </a:endParaRPr>
+          </a:p>
+        </p:txBody>
+      </p:sp>
+      <p:sp>
+        <p:nvSpPr>
+          <p:cNvPr id="122" name="Rectangle 8"/>
+          <p:cNvSpPr/>
+          <p:nvPr/>
+        </p:nvSpPr>
+        <p:spPr>
+          <a:xfrm>
+            <a:off x="2343612" y="783895"/>
+            <a:ext cx="1775949" cy="346760"/>
+          </a:xfrm>
+          <a:prstGeom prst="rect">
+            <a:avLst/>
+          </a:prstGeom>
+          <a:ln w="19050">
+            <a:solidFill>
+              <a:srgbClr val="7030A0"/>
+            </a:solidFill>
+          </a:ln>
+          <a:effectLst/>
+        </p:spPr>
+        <p:style>
+          <a:lnRef idx="1">
+            <a:schemeClr val="accent4"/>
+          </a:lnRef>
+          <a:fillRef idx="2">
+            <a:schemeClr val="accent4"/>
+          </a:fillRef>
+          <a:effectRef idx="1">
+            <a:schemeClr val="accent4"/>
+          </a:effectRef>
+          <a:fontRef idx="minor">
+            <a:schemeClr val="dk1"/>
+          </a:fontRef>
+        </p:style>
+        <p:txBody>
+          <a:bodyPr rtlCol="0" anchor="ctr"/>
+          <a:lstStyle/>
+          <a:p>
+            <a:pPr algn="ctr"/>
+            <a:r>
+              <a:rPr lang="en-US" sz="1050" dirty="0">
+                <a:solidFill>
+                  <a:srgbClr val="7030A0"/>
+                </a:solidFill>
+              </a:rPr>
+              <a:t>&lt;&lt;interface&gt;&gt;</a:t>
+            </a:r>
+            <a:br>
+              <a:rPr lang="en-US" sz="1050" dirty="0">
+                <a:solidFill>
+                  <a:srgbClr val="7030A0"/>
+                </a:solidFill>
+              </a:rPr>
+            </a:br>
+            <a:r>
+              <a:rPr lang="en-US" sz="1050" dirty="0" err="1">
+                <a:solidFill>
+                  <a:srgbClr val="7030A0"/>
+                </a:solidFill>
+              </a:rPr>
+              <a:t>UnmodifiableObservableList</a:t>
+            </a:r>
+            <a:endParaRPr lang="en-SG" sz="1050" dirty="0">
+              <a:solidFill>
+                <a:srgbClr val="7030A0"/>
+              </a:solidFill>
+            </a:endParaRPr>
+          </a:p>
+        </p:txBody>
+      </p:sp>
+      <p:cxnSp>
+        <p:nvCxnSpPr>
+          <p:cNvPr id="124" name="Elbow Connector 122"/>
+          <p:cNvCxnSpPr>
+            <a:cxnSpLocks/>
+            <a:stCxn id="119" idx="3"/>
+            <a:endCxn id="122" idx="1"/>
+          </p:cNvCxnSpPr>
+          <p:nvPr/>
+        </p:nvCxnSpPr>
+        <p:spPr>
+          <a:xfrm rot="5400000" flipH="1" flipV="1">
+            <a:off x="1516884" y="926273"/>
+            <a:ext cx="795726" cy="857730"/>
+          </a:xfrm>
+          <a:prstGeom prst="bentConnector2">
+            <a:avLst/>
+          </a:prstGeom>
+          <a:ln w="19050">
+            <a:solidFill>
+              <a:srgbClr val="7030A0"/>
+            </a:solidFill>
+            <a:prstDash val="sysDot"/>
+            <a:headEnd type="none" w="med" len="med"/>
+            <a:tailEnd type="arrow" w="med" len="med"/>
+          </a:ln>
+          <a:effectLst/>
+        </p:spPr>
+        <p:style>
+          <a:lnRef idx="1">
+            <a:schemeClr val="accent2"/>
+          </a:lnRef>
+          <a:fillRef idx="2">
+            <a:schemeClr val="accent2"/>
+          </a:fillRef>
+          <a:effectRef idx="1">
+            <a:schemeClr val="accent2"/>
+          </a:effectRef>
+          <a:fontRef idx="minor">
+            <a:schemeClr val="dk1"/>
+          </a:fontRef>
+        </p:style>
+      </p:cxnSp>
+      <p:cxnSp>
+        <p:nvCxnSpPr>
+          <p:cNvPr id="50" name="Elbow Connector 49"/>
+          <p:cNvCxnSpPr>
+            <a:cxnSpLocks/>
+            <a:stCxn id="78" idx="3"/>
+            <a:endCxn id="57" idx="3"/>
+          </p:cNvCxnSpPr>
+          <p:nvPr/>
+        </p:nvCxnSpPr>
+        <p:spPr>
+          <a:xfrm rot="16200000" flipV="1">
+            <a:off x="6312294" y="1041865"/>
+            <a:ext cx="360497" cy="1007055"/>
+          </a:xfrm>
+          <a:prstGeom prst="bentConnector2">
+            <a:avLst/>
+          </a:prstGeom>
+          <a:ln w="19050">
+            <a:solidFill>
+              <a:srgbClr val="7030A0"/>
+            </a:solidFill>
+            <a:headEnd type="none" w="med" len="med"/>
+            <a:tailEnd type="arrow" w="med" len="med"/>
+          </a:ln>
+          <a:effectLst/>
+        </p:spPr>
+        <p:style>
+          <a:lnRef idx="1">
+            <a:schemeClr val="accent2"/>
+          </a:lnRef>
+          <a:fillRef idx="2">
+            <a:schemeClr val="accent2"/>
+          </a:fillRef>
+          <a:effectRef idx="1">
+            <a:schemeClr val="accent2"/>
+          </a:effectRef>
+          <a:fontRef idx="minor">
+            <a:schemeClr val="dk1"/>
+          </a:fontRef>
+        </p:style>
+      </p:cxnSp>
+      <p:sp>
+        <p:nvSpPr>
+          <p:cNvPr id="11" name="TextBox 10"/>
+          <p:cNvSpPr txBox="1"/>
+          <p:nvPr/>
+        </p:nvSpPr>
+        <p:spPr>
+          <a:xfrm>
+            <a:off x="4564394" y="1148042"/>
+            <a:ext cx="189257" cy="178683"/>
+          </a:xfrm>
+          <a:prstGeom prst="rect">
+            <a:avLst/>
+          </a:prstGeom>
+          <a:noFill/>
+        </p:spPr>
+        <p:txBody>
+          <a:bodyPr wrap="square" lIns="0" tIns="0" rIns="0" bIns="0" rtlCol="0">
+            <a:noAutofit/>
+          </a:bodyPr>
+          <a:lstStyle/>
+          <a:p>
+            <a:pPr algn="ctr"/>
+            <a:r>
+              <a:rPr lang="en-US" sz="1100" dirty="0">
+                <a:solidFill>
+                  <a:srgbClr val="7030A0"/>
+                </a:solidFill>
+              </a:rPr>
+              <a:t>1</a:t>
+            </a:r>
+            <a:endParaRPr lang="en-SG" sz="1100" dirty="0">
+              <a:solidFill>
+                <a:srgbClr val="7030A0"/>
+              </a:solidFill>
+            </a:endParaRPr>
+          </a:p>
+        </p:txBody>
+      </p:sp>
+      <p:sp>
+        <p:nvSpPr>
+          <p:cNvPr id="54" name="TextBox 53"/>
+          <p:cNvSpPr txBox="1"/>
+          <p:nvPr/>
+        </p:nvSpPr>
+        <p:spPr>
+          <a:xfrm>
+            <a:off x="4573055" y="1548514"/>
+            <a:ext cx="189257" cy="178683"/>
+          </a:xfrm>
+          <a:prstGeom prst="rect">
+            <a:avLst/>
+          </a:prstGeom>
+          <a:noFill/>
+        </p:spPr>
+        <p:txBody>
+          <a:bodyPr wrap="square" lIns="0" tIns="0" rIns="0" bIns="0" rtlCol="0">
+            <a:noAutofit/>
+          </a:bodyPr>
+          <a:lstStyle/>
+          <a:p>
+            <a:pPr algn="ctr"/>
+            <a:r>
+              <a:rPr lang="en-SG" sz="1100" dirty="0">
+                <a:solidFill>
+                  <a:srgbClr val="7030A0"/>
+                </a:solidFill>
+              </a:rPr>
+              <a:t>1</a:t>
+            </a:r>
+          </a:p>
+        </p:txBody>
+      </p:sp>
+      <p:sp>
+        <p:nvSpPr>
+          <p:cNvPr id="56" name="TextBox 55"/>
+          <p:cNvSpPr txBox="1"/>
+          <p:nvPr/>
+        </p:nvSpPr>
+        <p:spPr>
+          <a:xfrm>
+            <a:off x="6059245" y="1406608"/>
+            <a:ext cx="189257" cy="178683"/>
+          </a:xfrm>
+          <a:prstGeom prst="rect">
+            <a:avLst/>
+          </a:prstGeom>
+          <a:noFill/>
+        </p:spPr>
+        <p:txBody>
+          <a:bodyPr wrap="square" lIns="0" tIns="0" rIns="0" bIns="0" rtlCol="0">
+            <a:noAutofit/>
+          </a:bodyPr>
+          <a:lstStyle/>
+          <a:p>
+            <a:pPr algn="ctr"/>
+            <a:r>
+              <a:rPr lang="en-US" sz="1100" dirty="0">
+                <a:solidFill>
+                  <a:srgbClr val="7030A0"/>
+                </a:solidFill>
+              </a:rPr>
+              <a:t>1</a:t>
+            </a:r>
+            <a:endParaRPr lang="en-SG" sz="1100" dirty="0">
+              <a:solidFill>
+                <a:srgbClr val="7030A0"/>
+              </a:solidFill>
+            </a:endParaRPr>
+          </a:p>
+        </p:txBody>
+      </p:sp>
+      <p:sp>
+        <p:nvSpPr>
+          <p:cNvPr id="60" name="TextBox 59"/>
+          <p:cNvSpPr txBox="1"/>
+          <p:nvPr/>
+        </p:nvSpPr>
+        <p:spPr>
+          <a:xfrm>
+            <a:off x="5506098" y="693336"/>
+            <a:ext cx="189257" cy="178683"/>
+          </a:xfrm>
+          <a:prstGeom prst="rect">
+            <a:avLst/>
+          </a:prstGeom>
+          <a:noFill/>
+        </p:spPr>
+        <p:txBody>
+          <a:bodyPr wrap="square" lIns="0" tIns="0" rIns="0" bIns="0" rtlCol="0">
+            <a:noAutofit/>
+          </a:bodyPr>
+          <a:lstStyle/>
+          <a:p>
+            <a:pPr algn="ctr"/>
+            <a:r>
+              <a:rPr lang="en-US" sz="1100" dirty="0">
+                <a:solidFill>
+                  <a:srgbClr val="7030A0"/>
+                </a:solidFill>
+              </a:rPr>
+              <a:t>*</a:t>
+            </a:r>
+            <a:endParaRPr lang="en-SG" sz="1100" dirty="0">
+              <a:solidFill>
+                <a:srgbClr val="7030A0"/>
+              </a:solidFill>
+            </a:endParaRPr>
+          </a:p>
+        </p:txBody>
+      </p:sp>
+      <p:sp>
+        <p:nvSpPr>
+          <p:cNvPr id="61" name="TextBox 60"/>
+          <p:cNvSpPr txBox="1"/>
+          <p:nvPr/>
+        </p:nvSpPr>
+        <p:spPr>
+          <a:xfrm>
+            <a:off x="6357509" y="1967411"/>
+            <a:ext cx="189257" cy="178683"/>
+          </a:xfrm>
+          <a:prstGeom prst="rect">
+            <a:avLst/>
+          </a:prstGeom>
+          <a:noFill/>
+        </p:spPr>
+        <p:txBody>
+          <a:bodyPr wrap="square" lIns="0" tIns="0" rIns="0" bIns="0" rtlCol="0">
+            <a:noAutofit/>
+          </a:bodyPr>
+          <a:lstStyle/>
+          <a:p>
+            <a:pPr algn="ctr"/>
+            <a:r>
+              <a:rPr lang="en-US" sz="1100" dirty="0">
+                <a:solidFill>
+                  <a:srgbClr val="7030A0"/>
+                </a:solidFill>
+              </a:rPr>
+              <a:t>*</a:t>
+            </a:r>
+            <a:endParaRPr lang="en-SG" sz="1100" dirty="0">
+              <a:solidFill>
+                <a:srgbClr val="7030A0"/>
+              </a:solidFill>
+            </a:endParaRPr>
+          </a:p>
+        </p:txBody>
+      </p:sp>
+      <p:sp>
+        <p:nvSpPr>
+          <p:cNvPr id="65" name="TextBox 64"/>
+          <p:cNvSpPr txBox="1"/>
+          <p:nvPr/>
+        </p:nvSpPr>
+        <p:spPr>
+          <a:xfrm>
+            <a:off x="2617306" y="1829474"/>
+            <a:ext cx="189257" cy="178683"/>
+          </a:xfrm>
+          <a:prstGeom prst="rect">
+            <a:avLst/>
+          </a:prstGeom>
+          <a:noFill/>
+        </p:spPr>
+        <p:txBody>
+          <a:bodyPr wrap="square" lIns="0" tIns="0" rIns="0" bIns="0" rtlCol="0">
+            <a:noAutofit/>
+          </a:bodyPr>
+          <a:lstStyle/>
+          <a:p>
+            <a:pPr algn="ctr"/>
+            <a:r>
+              <a:rPr lang="en-US" sz="1100" dirty="0">
+                <a:solidFill>
+                  <a:srgbClr val="7030A0"/>
+                </a:solidFill>
+              </a:rPr>
+              <a:t>1</a:t>
+            </a:r>
+            <a:endParaRPr lang="en-SG" sz="1100" dirty="0">
+              <a:solidFill>
+                <a:srgbClr val="7030A0"/>
+              </a:solidFill>
+            </a:endParaRPr>
+          </a:p>
+        </p:txBody>
+      </p:sp>
+      <p:sp>
+        <p:nvSpPr>
+          <p:cNvPr id="66" name="TextBox 65"/>
+          <p:cNvSpPr txBox="1"/>
+          <p:nvPr/>
+        </p:nvSpPr>
+        <p:spPr>
+          <a:xfrm>
+            <a:off x="2585753" y="2651286"/>
+            <a:ext cx="189257" cy="178683"/>
+          </a:xfrm>
+          <a:prstGeom prst="rect">
+            <a:avLst/>
+          </a:prstGeom>
+          <a:noFill/>
+        </p:spPr>
+        <p:txBody>
+          <a:bodyPr wrap="square" lIns="0" tIns="0" rIns="0" bIns="0" rtlCol="0">
+            <a:noAutofit/>
+          </a:bodyPr>
+          <a:lstStyle/>
+          <a:p>
+            <a:pPr algn="ctr"/>
+            <a:r>
+              <a:rPr lang="en-US" sz="1100" dirty="0">
+                <a:solidFill>
+                  <a:srgbClr val="7030A0"/>
+                </a:solidFill>
+              </a:rPr>
+              <a:t>1</a:t>
+            </a:r>
+            <a:endParaRPr lang="en-SG" sz="1100" dirty="0">
+              <a:solidFill>
+                <a:srgbClr val="7030A0"/>
+              </a:solidFill>
+            </a:endParaRPr>
+          </a:p>
+        </p:txBody>
+      </p:sp>
+      <p:cxnSp>
+        <p:nvCxnSpPr>
+          <p:cNvPr id="73" name="Elbow Connector 122">
+            <a:extLst>
+              <a:ext uri="{FF2B5EF4-FFF2-40B4-BE49-F238E27FC236}">
+                <a16:creationId xmlns:a16="http://schemas.microsoft.com/office/drawing/2014/main" id="{6C194B6E-AD6B-4C34-821F-85FC683926D2}"/>
+              </a:ext>
+            </a:extLst>
+          </p:cNvPr>
+          <p:cNvCxnSpPr>
+            <a:cxnSpLocks/>
+            <a:stCxn id="119" idx="3"/>
+            <a:endCxn id="100" idx="1"/>
+          </p:cNvCxnSpPr>
+          <p:nvPr/>
+        </p:nvCxnSpPr>
+        <p:spPr>
+          <a:xfrm rot="5400000" flipH="1" flipV="1">
+            <a:off x="1874694" y="1038009"/>
+            <a:ext cx="326181" cy="1103804"/>
+          </a:xfrm>
+          <a:prstGeom prst="bentConnector2">
+            <a:avLst/>
+          </a:prstGeom>
+          <a:ln w="19050">
+            <a:solidFill>
+              <a:srgbClr val="7030A0"/>
+            </a:solidFill>
+            <a:prstDash val="sysDot"/>
+            <a:headEnd type="none" w="med" len="med"/>
+            <a:tailEnd type="arrow" w="med" len="med"/>
+          </a:ln>
+          <a:effectLst/>
+        </p:spPr>
+        <p:style>
+          <a:lnRef idx="1">
+            <a:schemeClr val="accent2"/>
+          </a:lnRef>
+          <a:fillRef idx="2">
+            <a:schemeClr val="accent2"/>
+          </a:fillRef>
+          <a:effectRef idx="1">
+            <a:schemeClr val="accent2"/>
+          </a:effectRef>
+          <a:fontRef idx="minor">
+            <a:schemeClr val="dk1"/>
+          </a:fontRef>
+        </p:style>
+      </p:cxnSp>
+      <p:cxnSp>
+        <p:nvCxnSpPr>
+          <p:cNvPr id="74" name="Elbow Connector 85">
+            <a:extLst>
+              <a:ext uri="{FF2B5EF4-FFF2-40B4-BE49-F238E27FC236}">
+                <a16:creationId xmlns:a16="http://schemas.microsoft.com/office/drawing/2014/main" id="{0BF0A13B-B2CA-43C0-A84A-D92BEE5134B9}"/>
+              </a:ext>
+            </a:extLst>
+          </p:cNvPr>
+          <p:cNvCxnSpPr>
+            <a:cxnSpLocks/>
+            <a:stCxn id="77" idx="3"/>
+            <a:endCxn id="117" idx="3"/>
+          </p:cNvCxnSpPr>
+          <p:nvPr/>
+        </p:nvCxnSpPr>
+        <p:spPr>
+          <a:xfrm flipV="1">
+            <a:off x="6952991" y="2144297"/>
+            <a:ext cx="703039" cy="2904970"/>
+          </a:xfrm>
+          <a:prstGeom prst="bentConnector3">
+            <a:avLst>
+              <a:gd name="adj1" fmla="val 139271"/>
+            </a:avLst>
+          </a:prstGeom>
+          <a:ln w="19050">
+            <a:solidFill>
+              <a:srgbClr val="7030A0"/>
+            </a:solidFill>
+            <a:headEnd type="none" w="med" len="med"/>
+            <a:tailEnd type="none" w="med" len="med"/>
+          </a:ln>
+          <a:effectLst/>
+        </p:spPr>
+        <p:style>
+          <a:lnRef idx="1">
+            <a:schemeClr val="accent2"/>
+          </a:lnRef>
+          <a:fillRef idx="2">
+            <a:schemeClr val="accent2"/>
+          </a:fillRef>
+          <a:effectRef idx="1">
+            <a:schemeClr val="accent2"/>
+          </a:effectRef>
+          <a:fontRef idx="minor">
+            <a:schemeClr val="dk1"/>
+          </a:fontRef>
+        </p:style>
+      </p:cxnSp>
+      <p:sp>
+        <p:nvSpPr>
+          <p:cNvPr id="77" name="Rectangle 8">
+            <a:extLst>
+              <a:ext uri="{FF2B5EF4-FFF2-40B4-BE49-F238E27FC236}">
+                <a16:creationId xmlns:a16="http://schemas.microsoft.com/office/drawing/2014/main" id="{0385A838-EEB2-4922-9B4E-2B6ECA006CD4}"/>
+              </a:ext>
+            </a:extLst>
+          </p:cNvPr>
+          <p:cNvSpPr/>
+          <p:nvPr/>
+        </p:nvSpPr>
+        <p:spPr>
+          <a:xfrm>
+            <a:off x="6249251" y="4906375"/>
+            <a:ext cx="703740" cy="285783"/>
+          </a:xfrm>
+          <a:prstGeom prst="rect">
+            <a:avLst/>
+          </a:prstGeom>
+          <a:ln w="19050">
+            <a:solidFill>
+              <a:srgbClr val="7030A0"/>
+            </a:solidFill>
+          </a:ln>
+          <a:effectLst/>
+        </p:spPr>
+        <p:style>
+          <a:lnRef idx="1">
+            <a:schemeClr val="accent4"/>
+          </a:lnRef>
+          <a:fillRef idx="2">
+            <a:schemeClr val="accent4"/>
+          </a:fillRef>
+          <a:effectRef idx="1">
+            <a:schemeClr val="accent4"/>
+          </a:effectRef>
+          <a:fontRef idx="minor">
+            <a:schemeClr val="dk1"/>
+          </a:fontRef>
+        </p:style>
+        <p:txBody>
+          <a:bodyPr rtlCol="0" anchor="ctr"/>
+          <a:lstStyle/>
+          <a:p>
+            <a:pPr algn="ctr"/>
+            <a:r>
+              <a:rPr lang="en-US" sz="1050">
+                <a:solidFill>
+                  <a:srgbClr val="7030A0"/>
+                </a:solidFill>
+              </a:rPr>
+              <a:t>Event</a:t>
+            </a:r>
+            <a:endParaRPr lang="en-SG" sz="1050" dirty="0">
+              <a:solidFill>
+                <a:srgbClr val="7030A0"/>
+              </a:solidFill>
+            </a:endParaRPr>
+          </a:p>
+        </p:txBody>
+      </p:sp>
+      <p:sp>
+        <p:nvSpPr>
+          <p:cNvPr id="82" name="Rectangle 8">
+            <a:extLst>
+              <a:ext uri="{FF2B5EF4-FFF2-40B4-BE49-F238E27FC236}">
+                <a16:creationId xmlns:a16="http://schemas.microsoft.com/office/drawing/2014/main" id="{B018534C-9921-4CC3-8436-96798BAD80C9}"/>
+              </a:ext>
+            </a:extLst>
+          </p:cNvPr>
+          <p:cNvSpPr/>
+          <p:nvPr/>
+        </p:nvSpPr>
+        <p:spPr>
+          <a:xfrm>
+            <a:off x="5411051" y="4495800"/>
+            <a:ext cx="881679" cy="285783"/>
+          </a:xfrm>
+          <a:prstGeom prst="rect">
+            <a:avLst/>
+          </a:prstGeom>
+          <a:ln w="19050">
+            <a:solidFill>
+              <a:srgbClr val="7030A0"/>
+            </a:solidFill>
+          </a:ln>
+          <a:effectLst/>
+        </p:spPr>
+        <p:style>
+          <a:lnRef idx="1">
+            <a:schemeClr val="accent4"/>
+          </a:lnRef>
+          <a:fillRef idx="2">
+            <a:schemeClr val="accent4"/>
+          </a:fillRef>
+          <a:effectRef idx="1">
+            <a:schemeClr val="accent4"/>
+          </a:effectRef>
+          <a:fontRef idx="minor">
+            <a:schemeClr val="dk1"/>
+          </a:fontRef>
+        </p:style>
+        <p:txBody>
+          <a:bodyPr rtlCol="0" anchor="ctr"/>
+          <a:lstStyle/>
+          <a:p>
+            <a:pPr algn="ctr"/>
+            <a:r>
+              <a:rPr lang="en-US" sz="1050" dirty="0" err="1">
+                <a:solidFill>
+                  <a:srgbClr val="7030A0"/>
+                </a:solidFill>
+              </a:rPr>
+              <a:t>FloatingTask</a:t>
+            </a:r>
+            <a:endParaRPr lang="en-US" sz="1050" dirty="0">
+              <a:solidFill>
+                <a:srgbClr val="7030A0"/>
+              </a:solidFill>
+            </a:endParaRPr>
+          </a:p>
+        </p:txBody>
+      </p:sp>
+      <p:sp>
+        <p:nvSpPr>
+          <p:cNvPr id="87" name="Rectangle 8">
+            <a:extLst>
+              <a:ext uri="{FF2B5EF4-FFF2-40B4-BE49-F238E27FC236}">
+                <a16:creationId xmlns:a16="http://schemas.microsoft.com/office/drawing/2014/main" id="{FD92DEDE-8CCC-4D5A-A87C-6D4AD8C4B580}"/>
+              </a:ext>
+            </a:extLst>
+          </p:cNvPr>
+          <p:cNvSpPr/>
+          <p:nvPr/>
+        </p:nvSpPr>
+        <p:spPr>
+          <a:xfrm>
+            <a:off x="6916260" y="5290448"/>
+            <a:ext cx="703740" cy="285783"/>
+          </a:xfrm>
+          <a:prstGeom prst="rect">
+            <a:avLst/>
+          </a:prstGeom>
+          <a:ln w="19050">
+            <a:solidFill>
+              <a:srgbClr val="7030A0"/>
+            </a:solidFill>
+          </a:ln>
+          <a:effectLst/>
+        </p:spPr>
+        <p:style>
+          <a:lnRef idx="1">
+            <a:schemeClr val="accent4"/>
+          </a:lnRef>
+          <a:fillRef idx="2">
+            <a:schemeClr val="accent4"/>
+          </a:fillRef>
+          <a:effectRef idx="1">
+            <a:schemeClr val="accent4"/>
+          </a:effectRef>
+          <a:fontRef idx="minor">
+            <a:schemeClr val="dk1"/>
+          </a:fontRef>
+        </p:style>
+        <p:txBody>
+          <a:bodyPr rtlCol="0" anchor="ctr"/>
+          <a:lstStyle/>
+          <a:p>
+            <a:pPr algn="ctr"/>
+            <a:r>
+              <a:rPr lang="en-US" sz="1050" dirty="0">
+                <a:solidFill>
+                  <a:srgbClr val="7030A0"/>
+                </a:solidFill>
+              </a:rPr>
+              <a:t>Deadline</a:t>
+            </a:r>
+            <a:endParaRPr lang="en-SG" sz="1050" dirty="0">
+              <a:solidFill>
+                <a:srgbClr val="7030A0"/>
+              </a:solidFill>
+            </a:endParaRPr>
+          </a:p>
+        </p:txBody>
+      </p:sp>
+      <p:cxnSp>
+        <p:nvCxnSpPr>
+          <p:cNvPr id="94" name="Elbow Connector 85">
+            <a:extLst>
+              <a:ext uri="{FF2B5EF4-FFF2-40B4-BE49-F238E27FC236}">
+                <a16:creationId xmlns:a16="http://schemas.microsoft.com/office/drawing/2014/main" id="{ED2F0B51-3478-4720-BDF8-DD7B29CB36C3}"/>
+              </a:ext>
+            </a:extLst>
+          </p:cNvPr>
+          <p:cNvCxnSpPr>
+            <a:cxnSpLocks/>
+            <a:stCxn id="87" idx="3"/>
+            <a:endCxn id="117" idx="3"/>
+          </p:cNvCxnSpPr>
+          <p:nvPr/>
+        </p:nvCxnSpPr>
+        <p:spPr>
+          <a:xfrm flipV="1">
+            <a:off x="7620000" y="2144297"/>
+            <a:ext cx="36030" cy="3289043"/>
+          </a:xfrm>
+          <a:prstGeom prst="bentConnector3">
+            <a:avLst>
+              <a:gd name="adj1" fmla="val 866278"/>
+            </a:avLst>
+          </a:prstGeom>
+          <a:ln w="19050">
+            <a:solidFill>
+              <a:srgbClr val="7030A0"/>
+            </a:solidFill>
+            <a:headEnd type="none" w="med" len="med"/>
+            <a:tailEnd type="none" w="med" len="med"/>
+          </a:ln>
+          <a:effectLst/>
+        </p:spPr>
+        <p:style>
+          <a:lnRef idx="1">
+            <a:schemeClr val="accent2"/>
+          </a:lnRef>
+          <a:fillRef idx="2">
+            <a:schemeClr val="accent2"/>
+          </a:fillRef>
+          <a:effectRef idx="1">
+            <a:schemeClr val="accent2"/>
+          </a:effectRef>
+          <a:fontRef idx="minor">
+            <a:schemeClr val="dk1"/>
+          </a:fontRef>
+        </p:style>
+      </p:cxnSp>
+      <p:cxnSp>
+        <p:nvCxnSpPr>
+          <p:cNvPr id="98" name="Elbow Connector 85">
+            <a:extLst>
+              <a:ext uri="{FF2B5EF4-FFF2-40B4-BE49-F238E27FC236}">
+                <a16:creationId xmlns:a16="http://schemas.microsoft.com/office/drawing/2014/main" id="{77D93BAA-6F83-4157-8F77-043E3F11FB25}"/>
+              </a:ext>
+            </a:extLst>
+          </p:cNvPr>
+          <p:cNvCxnSpPr>
+            <a:cxnSpLocks/>
+            <a:stCxn id="82" idx="3"/>
+            <a:endCxn id="117" idx="3"/>
+          </p:cNvCxnSpPr>
+          <p:nvPr/>
+        </p:nvCxnSpPr>
+        <p:spPr>
+          <a:xfrm flipV="1">
+            <a:off x="6292730" y="2144297"/>
+            <a:ext cx="1363300" cy="2494395"/>
+          </a:xfrm>
+          <a:prstGeom prst="bentConnector3">
+            <a:avLst>
+              <a:gd name="adj1" fmla="val 120252"/>
+            </a:avLst>
+          </a:prstGeom>
+          <a:ln w="19050">
+            <a:solidFill>
+              <a:srgbClr val="7030A0"/>
+            </a:solidFill>
+            <a:headEnd type="none" w="med" len="med"/>
+            <a:tailEnd type="none" w="med" len="med"/>
+          </a:ln>
+          <a:effectLst/>
+        </p:spPr>
+        <p:style>
+          <a:lnRef idx="1">
+            <a:schemeClr val="accent2"/>
+          </a:lnRef>
+          <a:fillRef idx="2">
+            <a:schemeClr val="accent2"/>
+          </a:fillRef>
+          <a:effectRef idx="1">
+            <a:schemeClr val="accent2"/>
+          </a:effectRef>
+          <a:fontRef idx="minor">
+            <a:schemeClr val="dk1"/>
+          </a:fontRef>
+        </p:style>
+      </p:cxnSp>
+      <p:sp>
+        <p:nvSpPr>
+          <p:cNvPr id="153" name="TextBox 152">
+            <a:extLst>
+              <a:ext uri="{FF2B5EF4-FFF2-40B4-BE49-F238E27FC236}">
+                <a16:creationId xmlns:a16="http://schemas.microsoft.com/office/drawing/2014/main" id="{88FBB9DB-E26B-428F-AA6E-B20634747BE4}"/>
+              </a:ext>
+            </a:extLst>
+          </p:cNvPr>
+          <p:cNvSpPr txBox="1"/>
+          <p:nvPr/>
+        </p:nvSpPr>
+        <p:spPr>
+          <a:xfrm>
+            <a:off x="7052588" y="1062265"/>
+            <a:ext cx="189257" cy="178683"/>
+          </a:xfrm>
+          <a:prstGeom prst="rect">
+            <a:avLst/>
+          </a:prstGeom>
+          <a:noFill/>
+        </p:spPr>
+        <p:txBody>
+          <a:bodyPr wrap="square" lIns="0" tIns="0" rIns="0" bIns="0" rtlCol="0">
+            <a:noAutofit/>
+          </a:bodyPr>
+          <a:lstStyle/>
+          <a:p>
+            <a:pPr algn="ctr"/>
+            <a:r>
+              <a:rPr lang="en-US" sz="1100">
+                <a:solidFill>
+                  <a:srgbClr val="7030A0"/>
+                </a:solidFill>
+              </a:rPr>
+              <a:t>1</a:t>
+            </a:r>
+            <a:endParaRPr lang="en-SG" sz="1100" dirty="0">
+              <a:solidFill>
+                <a:srgbClr val="7030A0"/>
+              </a:solidFill>
+            </a:endParaRPr>
+          </a:p>
+        </p:txBody>
+      </p:sp>
+      <p:cxnSp>
+        <p:nvCxnSpPr>
+          <p:cNvPr id="268" name="Elbow Connector 58">
+            <a:extLst>
+              <a:ext uri="{FF2B5EF4-FFF2-40B4-BE49-F238E27FC236}">
+                <a16:creationId xmlns:a16="http://schemas.microsoft.com/office/drawing/2014/main" id="{A9D37834-AD78-452C-A0E4-1F0B40A9DA72}"/>
+              </a:ext>
+            </a:extLst>
+          </p:cNvPr>
+          <p:cNvCxnSpPr>
+            <a:cxnSpLocks/>
+            <a:stCxn id="93" idx="1"/>
+            <a:endCxn id="80" idx="3"/>
+          </p:cNvCxnSpPr>
+          <p:nvPr/>
+        </p:nvCxnSpPr>
+        <p:spPr>
+          <a:xfrm rot="10800000" flipV="1">
+            <a:off x="5138196" y="5040941"/>
+            <a:ext cx="874156" cy="1262"/>
+          </a:xfrm>
+          <a:prstGeom prst="bentConnector3">
+            <a:avLst>
+              <a:gd name="adj1" fmla="val 50000"/>
+            </a:avLst>
+          </a:prstGeom>
+          <a:ln w="19050">
+            <a:solidFill>
+              <a:srgbClr val="7030A0"/>
+            </a:solidFill>
+            <a:headEnd type="none" w="med" len="med"/>
+            <a:tailEnd type="arrow" w="med" len="med"/>
+          </a:ln>
+          <a:effectLst/>
+        </p:spPr>
+        <p:style>
+          <a:lnRef idx="1">
+            <a:schemeClr val="accent2"/>
+          </a:lnRef>
+          <a:fillRef idx="2">
+            <a:schemeClr val="accent2"/>
+          </a:fillRef>
+          <a:effectRef idx="1">
+            <a:schemeClr val="accent2"/>
+          </a:effectRef>
+          <a:fontRef idx="minor">
+            <a:schemeClr val="dk1"/>
+          </a:fontRef>
+        </p:style>
+      </p:cxnSp>
+      <p:cxnSp>
+        <p:nvCxnSpPr>
+          <p:cNvPr id="317" name="Elbow Connector 58">
+            <a:extLst>
+              <a:ext uri="{FF2B5EF4-FFF2-40B4-BE49-F238E27FC236}">
+                <a16:creationId xmlns:a16="http://schemas.microsoft.com/office/drawing/2014/main" id="{C3093632-1500-432F-A9DB-7AB4773E006E}"/>
+              </a:ext>
+            </a:extLst>
+          </p:cNvPr>
+          <p:cNvCxnSpPr>
+            <a:cxnSpLocks/>
+            <a:stCxn id="112" idx="1"/>
+            <a:endCxn id="80" idx="2"/>
+          </p:cNvCxnSpPr>
+          <p:nvPr/>
+        </p:nvCxnSpPr>
+        <p:spPr>
+          <a:xfrm rot="10800000">
+            <a:off x="4508047" y="5178031"/>
+            <a:ext cx="2170344" cy="255308"/>
+          </a:xfrm>
+          <a:prstGeom prst="bentConnector2">
+            <a:avLst/>
+          </a:prstGeom>
+          <a:ln w="19050">
+            <a:solidFill>
+              <a:srgbClr val="7030A0"/>
+            </a:solidFill>
+            <a:headEnd type="none" w="med" len="med"/>
+            <a:tailEnd type="arrow" w="med" len="med"/>
+          </a:ln>
+          <a:effectLst/>
+        </p:spPr>
+        <p:style>
+          <a:lnRef idx="1">
+            <a:schemeClr val="accent2"/>
+          </a:lnRef>
+          <a:fillRef idx="2">
+            <a:schemeClr val="accent2"/>
+          </a:fillRef>
+          <a:effectRef idx="1">
+            <a:schemeClr val="accent2"/>
+          </a:effectRef>
+          <a:fontRef idx="minor">
+            <a:schemeClr val="dk1"/>
+          </a:fontRef>
+        </p:style>
+      </p:cxnSp>
+      <p:sp>
+        <p:nvSpPr>
+          <p:cNvPr id="80" name="Rectangle 8">
+            <a:extLst>
+              <a:ext uri="{FF2B5EF4-FFF2-40B4-BE49-F238E27FC236}">
+                <a16:creationId xmlns:a16="http://schemas.microsoft.com/office/drawing/2014/main" id="{38053985-49C0-46E7-9DCF-1E8B04211018}"/>
+              </a:ext>
+            </a:extLst>
+          </p:cNvPr>
+          <p:cNvSpPr/>
+          <p:nvPr/>
+        </p:nvSpPr>
+        <p:spPr>
+          <a:xfrm>
+            <a:off x="3877898" y="4906375"/>
+            <a:ext cx="1260298" cy="271656"/>
+          </a:xfrm>
+          <a:prstGeom prst="rect">
+            <a:avLst/>
+          </a:prstGeom>
+          <a:ln w="19050">
+            <a:solidFill>
+              <a:srgbClr val="7030A0"/>
+            </a:solidFill>
+          </a:ln>
+          <a:effectLst/>
+        </p:spPr>
+        <p:style>
+          <a:lnRef idx="1">
+            <a:schemeClr val="accent4"/>
+          </a:lnRef>
+          <a:fillRef idx="2">
+            <a:schemeClr val="accent4"/>
+          </a:fillRef>
+          <a:effectRef idx="1">
+            <a:schemeClr val="accent4"/>
+          </a:effectRef>
+          <a:fontRef idx="minor">
+            <a:schemeClr val="dk1"/>
+          </a:fontRef>
+        </p:style>
+        <p:txBody>
+          <a:bodyPr rtlCol="0" anchor="ctr"/>
+          <a:lstStyle/>
+          <a:p>
+            <a:pPr algn="ctr"/>
+            <a:r>
+              <a:rPr lang="en-SG" sz="1050" dirty="0" err="1">
+                <a:solidFill>
+                  <a:srgbClr val="7030A0"/>
+                </a:solidFill>
+              </a:rPr>
+              <a:t>java.util.Calendar</a:t>
+            </a:r>
+            <a:endParaRPr lang="en-SG" sz="1050" dirty="0">
+              <a:solidFill>
+                <a:srgbClr val="7030A0"/>
+              </a:solidFill>
+            </a:endParaRPr>
+          </a:p>
+        </p:txBody>
+      </p:sp>
+      <p:sp>
+        <p:nvSpPr>
+          <p:cNvPr id="93" name="Flowchart: Decision 96">
+            <a:extLst>
+              <a:ext uri="{FF2B5EF4-FFF2-40B4-BE49-F238E27FC236}">
+                <a16:creationId xmlns:a16="http://schemas.microsoft.com/office/drawing/2014/main" id="{7E42058C-7FC1-48B6-B0A0-82326A89238D}"/>
+              </a:ext>
+            </a:extLst>
+          </p:cNvPr>
+          <p:cNvSpPr/>
+          <p:nvPr/>
+        </p:nvSpPr>
+        <p:spPr>
+          <a:xfrm>
+            <a:off x="6012352" y="4954251"/>
+            <a:ext cx="236048" cy="173380"/>
+          </a:xfrm>
+          <a:prstGeom prst="flowChartDecision">
+            <a:avLst/>
+          </a:prstGeom>
+          <a:solidFill>
+            <a:srgbClr val="7030A0"/>
+          </a:solidFill>
+          <a:ln w="19050">
+            <a:solidFill>
+              <a:srgbClr val="7030A0"/>
+            </a:solidFill>
+          </a:ln>
+          <a:effectLst/>
+        </p:spPr>
+        <p:style>
+          <a:lnRef idx="1">
+            <a:schemeClr val="accent6"/>
+          </a:lnRef>
+          <a:fillRef idx="2">
+            <a:schemeClr val="accent6"/>
+          </a:fillRef>
+          <a:effectRef idx="1">
+            <a:schemeClr val="accent6"/>
+          </a:effectRef>
+          <a:fontRef idx="minor">
+            <a:schemeClr val="dk1"/>
+          </a:fontRef>
+        </p:style>
+        <p:txBody>
+          <a:bodyPr rtlCol="0" anchor="ctr"/>
+          <a:lstStyle/>
+          <a:p>
+            <a:pPr algn="ctr"/>
+            <a:endParaRPr lang="en-US" sz="1050"/>
+          </a:p>
+        </p:txBody>
+      </p:sp>
+      <p:sp>
+        <p:nvSpPr>
+          <p:cNvPr id="104" name="TextBox 103">
+            <a:extLst>
+              <a:ext uri="{FF2B5EF4-FFF2-40B4-BE49-F238E27FC236}">
+                <a16:creationId xmlns:a16="http://schemas.microsoft.com/office/drawing/2014/main" id="{7955D861-12E8-467E-A832-0CD2DE6AF70E}"/>
+              </a:ext>
+            </a:extLst>
+          </p:cNvPr>
+          <p:cNvSpPr txBox="1"/>
+          <p:nvPr/>
+        </p:nvSpPr>
+        <p:spPr>
+          <a:xfrm>
+            <a:off x="4270437" y="5262157"/>
+            <a:ext cx="189257" cy="178683"/>
+          </a:xfrm>
+          <a:prstGeom prst="rect">
+            <a:avLst/>
+          </a:prstGeom>
+          <a:noFill/>
+        </p:spPr>
+        <p:txBody>
+          <a:bodyPr wrap="square" lIns="0" tIns="0" rIns="0" bIns="0" rtlCol="0">
+            <a:noAutofit/>
+          </a:bodyPr>
+          <a:lstStyle/>
+          <a:p>
+            <a:pPr algn="ctr"/>
+            <a:r>
+              <a:rPr lang="en-US" sz="1100" dirty="0">
+                <a:solidFill>
+                  <a:srgbClr val="7030A0"/>
+                </a:solidFill>
+              </a:rPr>
+              <a:t>1</a:t>
+            </a:r>
+            <a:endParaRPr lang="en-SG" sz="1100" dirty="0">
+              <a:solidFill>
+                <a:srgbClr val="7030A0"/>
+              </a:solidFill>
+            </a:endParaRPr>
+          </a:p>
+        </p:txBody>
+      </p:sp>
+      <p:sp>
+        <p:nvSpPr>
+          <p:cNvPr id="105" name="TextBox 104">
+            <a:extLst>
+              <a:ext uri="{FF2B5EF4-FFF2-40B4-BE49-F238E27FC236}">
+                <a16:creationId xmlns:a16="http://schemas.microsoft.com/office/drawing/2014/main" id="{26655E42-5836-4693-B2F5-1B27CF911181}"/>
+              </a:ext>
+            </a:extLst>
+          </p:cNvPr>
+          <p:cNvSpPr txBox="1"/>
+          <p:nvPr/>
+        </p:nvSpPr>
+        <p:spPr>
+          <a:xfrm>
+            <a:off x="5220943" y="4837058"/>
+            <a:ext cx="189257" cy="178683"/>
+          </a:xfrm>
+          <a:prstGeom prst="rect">
+            <a:avLst/>
+          </a:prstGeom>
+          <a:noFill/>
+        </p:spPr>
+        <p:txBody>
+          <a:bodyPr wrap="square" lIns="0" tIns="0" rIns="0" bIns="0" rtlCol="0">
+            <a:noAutofit/>
+          </a:bodyPr>
+          <a:lstStyle/>
+          <a:p>
+            <a:pPr algn="ctr"/>
+            <a:r>
+              <a:rPr lang="en-US" sz="1100" dirty="0">
+                <a:solidFill>
+                  <a:srgbClr val="7030A0"/>
+                </a:solidFill>
+              </a:rPr>
+              <a:t>2</a:t>
+            </a:r>
+            <a:endParaRPr lang="en-SG" sz="1100" dirty="0">
+              <a:solidFill>
+                <a:srgbClr val="7030A0"/>
+              </a:solidFill>
+            </a:endParaRPr>
+          </a:p>
+        </p:txBody>
+      </p:sp>
+      <p:sp>
+        <p:nvSpPr>
+          <p:cNvPr id="112" name="Flowchart: Decision 96">
+            <a:extLst>
+              <a:ext uri="{FF2B5EF4-FFF2-40B4-BE49-F238E27FC236}">
+                <a16:creationId xmlns:a16="http://schemas.microsoft.com/office/drawing/2014/main" id="{293ECA54-CC18-4A53-ABFD-453088B10C9C}"/>
+              </a:ext>
+            </a:extLst>
+          </p:cNvPr>
+          <p:cNvSpPr/>
+          <p:nvPr/>
+        </p:nvSpPr>
+        <p:spPr>
+          <a:xfrm>
+            <a:off x="6678391" y="5346649"/>
+            <a:ext cx="236048" cy="173380"/>
+          </a:xfrm>
+          <a:prstGeom prst="flowChartDecision">
+            <a:avLst/>
+          </a:prstGeom>
+          <a:solidFill>
+            <a:srgbClr val="7030A0"/>
+          </a:solidFill>
+          <a:ln w="19050">
+            <a:solidFill>
+              <a:srgbClr val="7030A0"/>
+            </a:solidFill>
+          </a:ln>
+          <a:effectLst/>
+        </p:spPr>
+        <p:style>
+          <a:lnRef idx="1">
+            <a:schemeClr val="accent6"/>
+          </a:lnRef>
+          <a:fillRef idx="2">
+            <a:schemeClr val="accent6"/>
+          </a:fillRef>
+          <a:effectRef idx="1">
+            <a:schemeClr val="accent6"/>
+          </a:effectRef>
+          <a:fontRef idx="minor">
+            <a:schemeClr val="dk1"/>
+          </a:fontRef>
+        </p:style>
+        <p:txBody>
+          <a:bodyPr rtlCol="0" anchor="ctr"/>
+          <a:lstStyle/>
+          <a:p>
+            <a:pPr algn="ctr"/>
+            <a:endParaRPr lang="en-US" sz="1050"/>
+          </a:p>
+        </p:txBody>
+      </p:sp>
+      <p:sp>
+        <p:nvSpPr>
+          <p:cNvPr id="117" name="Isosceles Triangle 102">
+            <a:extLst>
+              <a:ext uri="{FF2B5EF4-FFF2-40B4-BE49-F238E27FC236}">
+                <a16:creationId xmlns:a16="http://schemas.microsoft.com/office/drawing/2014/main" id="{7AB74330-96D4-4F9A-BFF6-5D372946A3A3}"/>
+              </a:ext>
+            </a:extLst>
+          </p:cNvPr>
+          <p:cNvSpPr/>
+          <p:nvPr/>
+        </p:nvSpPr>
+        <p:spPr>
+          <a:xfrm rot="5400000" flipV="1">
+            <a:off x="7433016" y="2056535"/>
+            <a:ext cx="270504" cy="175523"/>
+          </a:xfrm>
+          <a:prstGeom prst="triangle">
+            <a:avLst/>
+          </a:prstGeom>
+          <a:ln w="19050">
+            <a:solidFill>
+              <a:srgbClr val="7030A0"/>
+            </a:solidFill>
+          </a:ln>
+          <a:effectLst/>
+        </p:spPr>
+        <p:style>
+          <a:lnRef idx="1">
+            <a:schemeClr val="accent4"/>
+          </a:lnRef>
+          <a:fillRef idx="2">
+            <a:schemeClr val="accent4"/>
+          </a:fillRef>
+          <a:effectRef idx="1">
+            <a:schemeClr val="accent4"/>
+          </a:effectRef>
+          <a:fontRef idx="minor">
+            <a:schemeClr val="dk1"/>
+          </a:fontRef>
+        </p:style>
+        <p:txBody>
+          <a:bodyPr rtlCol="0" anchor="ctr"/>
+          <a:lstStyle/>
+          <a:p>
+            <a:pPr algn="ctr"/>
+            <a:endParaRPr lang="en-SG" sz="1050" b="1">
+              <a:solidFill>
+                <a:srgbClr val="92D050"/>
+              </a:solidFill>
+            </a:endParaRPr>
+          </a:p>
+        </p:txBody>
+      </p:sp>
+      <p:sp>
+        <p:nvSpPr>
+          <p:cNvPr id="81" name="Rectangle 8">
+            <a:extLst>
+              <a:ext uri="{FF2B5EF4-FFF2-40B4-BE49-F238E27FC236}">
+                <a16:creationId xmlns:a16="http://schemas.microsoft.com/office/drawing/2014/main" id="{7A38C179-FD0A-4AFF-9DAD-D2B114E689D6}"/>
+              </a:ext>
+            </a:extLst>
+          </p:cNvPr>
+          <p:cNvSpPr/>
+          <p:nvPr/>
+        </p:nvSpPr>
+        <p:spPr>
+          <a:xfrm>
+            <a:off x="2680736" y="3009920"/>
+            <a:ext cx="1099150" cy="377140"/>
+          </a:xfrm>
+          <a:prstGeom prst="rect">
+            <a:avLst/>
+          </a:prstGeom>
+          <a:ln w="19050">
+            <a:solidFill>
+              <a:srgbClr val="7030A0"/>
+            </a:solidFill>
+          </a:ln>
+          <a:effectLst/>
+        </p:spPr>
+        <p:style>
+          <a:lnRef idx="1">
+            <a:schemeClr val="accent4"/>
+          </a:lnRef>
+          <a:fillRef idx="2">
+            <a:schemeClr val="accent4"/>
+          </a:fillRef>
+          <a:effectRef idx="1">
+            <a:schemeClr val="accent4"/>
+          </a:effectRef>
+          <a:fontRef idx="minor">
+            <a:schemeClr val="dk1"/>
+          </a:fontRef>
+        </p:style>
+        <p:txBody>
+          <a:bodyPr rtlCol="0" anchor="ctr"/>
+          <a:lstStyle/>
+          <a:p>
+            <a:pPr algn="ctr"/>
+            <a:r>
+              <a:rPr lang="en-US" sz="1050" dirty="0">
+                <a:solidFill>
+                  <a:srgbClr val="7030A0"/>
+                </a:solidFill>
+              </a:rPr>
+              <a:t>{abstract}</a:t>
+            </a:r>
+            <a:br>
+              <a:rPr lang="en-US" sz="1050" dirty="0">
+                <a:solidFill>
+                  <a:srgbClr val="7030A0"/>
+                </a:solidFill>
+              </a:rPr>
+            </a:br>
+            <a:r>
+              <a:rPr lang="en-US" sz="1050" dirty="0" err="1">
+                <a:solidFill>
+                  <a:srgbClr val="7030A0"/>
+                </a:solidFill>
+              </a:rPr>
+              <a:t>EntryList</a:t>
+            </a:r>
+            <a:endParaRPr lang="en-SG" sz="1050" dirty="0">
+              <a:solidFill>
+                <a:srgbClr val="7030A0"/>
+              </a:solidFill>
+            </a:endParaRPr>
+          </a:p>
+        </p:txBody>
+      </p:sp>
+      <p:sp>
+        <p:nvSpPr>
+          <p:cNvPr id="83" name="TextBox 82">
+            <a:extLst>
+              <a:ext uri="{FF2B5EF4-FFF2-40B4-BE49-F238E27FC236}">
+                <a16:creationId xmlns:a16="http://schemas.microsoft.com/office/drawing/2014/main" id="{B0746313-7EAE-4FD7-BA26-B0CF426E0CE1}"/>
+              </a:ext>
+            </a:extLst>
+          </p:cNvPr>
+          <p:cNvSpPr txBox="1"/>
+          <p:nvPr/>
+        </p:nvSpPr>
+        <p:spPr>
+          <a:xfrm>
+            <a:off x="1969588" y="3742108"/>
+            <a:ext cx="189257" cy="178683"/>
+          </a:xfrm>
+          <a:prstGeom prst="rect">
+            <a:avLst/>
+          </a:prstGeom>
+          <a:noFill/>
+        </p:spPr>
+        <p:txBody>
+          <a:bodyPr wrap="square" lIns="0" tIns="0" rIns="0" bIns="0" rtlCol="0">
+            <a:noAutofit/>
+          </a:bodyPr>
+          <a:lstStyle/>
+          <a:p>
+            <a:pPr algn="ctr"/>
+            <a:r>
+              <a:rPr lang="en-SG" sz="1100" dirty="0">
+                <a:solidFill>
+                  <a:srgbClr val="7030A0"/>
+                </a:solidFill>
+              </a:rPr>
+              <a:t>3</a:t>
+            </a:r>
+          </a:p>
+        </p:txBody>
+      </p:sp>
+      <p:cxnSp>
+        <p:nvCxnSpPr>
+          <p:cNvPr id="113" name="Elbow Connector 63">
+            <a:extLst>
+              <a:ext uri="{FF2B5EF4-FFF2-40B4-BE49-F238E27FC236}">
+                <a16:creationId xmlns:a16="http://schemas.microsoft.com/office/drawing/2014/main" id="{A1485418-2743-47D1-BC42-2E0545F2FBE5}"/>
+              </a:ext>
+            </a:extLst>
+          </p:cNvPr>
+          <p:cNvCxnSpPr>
+            <a:cxnSpLocks/>
+            <a:stCxn id="139" idx="3"/>
+            <a:endCxn id="49" idx="1"/>
+          </p:cNvCxnSpPr>
+          <p:nvPr/>
+        </p:nvCxnSpPr>
+        <p:spPr>
+          <a:xfrm flipV="1">
+            <a:off x="3968206" y="1889648"/>
+            <a:ext cx="861456" cy="1290819"/>
+          </a:xfrm>
+          <a:prstGeom prst="bentConnector3">
+            <a:avLst>
+              <a:gd name="adj1" fmla="val 50000"/>
+            </a:avLst>
+          </a:prstGeom>
+          <a:ln w="19050">
+            <a:solidFill>
+              <a:srgbClr val="7030A0"/>
+            </a:solidFill>
+            <a:prstDash val="solid"/>
+            <a:headEnd type="none" w="med" len="med"/>
+            <a:tailEnd type="none" w="med" len="med"/>
+          </a:ln>
+          <a:effectLst/>
+        </p:spPr>
+        <p:style>
+          <a:lnRef idx="1">
+            <a:schemeClr val="accent2"/>
+          </a:lnRef>
+          <a:fillRef idx="2">
+            <a:schemeClr val="accent2"/>
+          </a:fillRef>
+          <a:effectRef idx="1">
+            <a:schemeClr val="accent2"/>
+          </a:effectRef>
+          <a:fontRef idx="minor">
+            <a:schemeClr val="dk1"/>
+          </a:fontRef>
+        </p:style>
+      </p:cxnSp>
+      <p:sp>
+        <p:nvSpPr>
+          <p:cNvPr id="101" name="Rectangle 8">
+            <a:extLst>
+              <a:ext uri="{FF2B5EF4-FFF2-40B4-BE49-F238E27FC236}">
+                <a16:creationId xmlns:a16="http://schemas.microsoft.com/office/drawing/2014/main" id="{3A8DF1E8-19BD-4490-BC77-A609B6FD5639}"/>
+              </a:ext>
+            </a:extLst>
+          </p:cNvPr>
+          <p:cNvSpPr/>
+          <p:nvPr/>
+        </p:nvSpPr>
+        <p:spPr>
+          <a:xfrm>
+            <a:off x="4827831" y="2285979"/>
+            <a:ext cx="1156969" cy="476049"/>
+          </a:xfrm>
+          <a:prstGeom prst="rect">
+            <a:avLst/>
+          </a:prstGeom>
+          <a:ln w="19050">
+            <a:solidFill>
+              <a:srgbClr val="7030A0"/>
+            </a:solidFill>
+          </a:ln>
+          <a:effectLst/>
+        </p:spPr>
+        <p:style>
+          <a:lnRef idx="1">
+            <a:schemeClr val="accent4"/>
+          </a:lnRef>
+          <a:fillRef idx="2">
+            <a:schemeClr val="accent4"/>
+          </a:fillRef>
+          <a:effectRef idx="1">
+            <a:schemeClr val="accent4"/>
+          </a:effectRef>
+          <a:fontRef idx="minor">
+            <a:schemeClr val="dk1"/>
+          </a:fontRef>
+        </p:style>
+        <p:txBody>
+          <a:bodyPr rtlCol="0" anchor="ctr"/>
+          <a:lstStyle/>
+          <a:p>
+            <a:pPr algn="ctr"/>
+            <a:r>
+              <a:rPr lang="en-SG" sz="1050" dirty="0" err="1">
+                <a:solidFill>
+                  <a:srgbClr val="7030A0"/>
+                </a:solidFill>
+              </a:rPr>
+              <a:t>EventList</a:t>
+            </a:r>
+            <a:endParaRPr lang="en-SG" sz="1050" dirty="0">
+              <a:solidFill>
+                <a:srgbClr val="7030A0"/>
+              </a:solidFill>
+            </a:endParaRPr>
+          </a:p>
+        </p:txBody>
+      </p:sp>
+      <p:sp>
+        <p:nvSpPr>
+          <p:cNvPr id="102" name="Rectangle 8">
+            <a:extLst>
+              <a:ext uri="{FF2B5EF4-FFF2-40B4-BE49-F238E27FC236}">
+                <a16:creationId xmlns:a16="http://schemas.microsoft.com/office/drawing/2014/main" id="{4A845856-BC9D-446D-B86B-5856280A727B}"/>
+              </a:ext>
+            </a:extLst>
+          </p:cNvPr>
+          <p:cNvSpPr/>
+          <p:nvPr/>
+        </p:nvSpPr>
+        <p:spPr>
+          <a:xfrm>
+            <a:off x="4836905" y="2847146"/>
+            <a:ext cx="1156969" cy="476049"/>
+          </a:xfrm>
+          <a:prstGeom prst="rect">
+            <a:avLst/>
+          </a:prstGeom>
+          <a:ln w="19050">
+            <a:solidFill>
+              <a:srgbClr val="7030A0"/>
+            </a:solidFill>
+          </a:ln>
+          <a:effectLst/>
+        </p:spPr>
+        <p:style>
+          <a:lnRef idx="1">
+            <a:schemeClr val="accent4"/>
+          </a:lnRef>
+          <a:fillRef idx="2">
+            <a:schemeClr val="accent4"/>
+          </a:fillRef>
+          <a:effectRef idx="1">
+            <a:schemeClr val="accent4"/>
+          </a:effectRef>
+          <a:fontRef idx="minor">
+            <a:schemeClr val="dk1"/>
+          </a:fontRef>
+        </p:style>
+        <p:txBody>
+          <a:bodyPr rtlCol="0" anchor="ctr"/>
+          <a:lstStyle/>
+          <a:p>
+            <a:pPr algn="ctr"/>
+            <a:r>
+              <a:rPr lang="en-SG" sz="1050" dirty="0" err="1">
+                <a:solidFill>
+                  <a:srgbClr val="7030A0"/>
+                </a:solidFill>
+              </a:rPr>
+              <a:t>DeadlineList</a:t>
+            </a:r>
+            <a:endParaRPr lang="en-SG" sz="1050" dirty="0">
+              <a:solidFill>
+                <a:srgbClr val="7030A0"/>
+              </a:solidFill>
+            </a:endParaRPr>
+          </a:p>
+        </p:txBody>
+      </p:sp>
+      <p:sp>
+        <p:nvSpPr>
+          <p:cNvPr id="103" name="Rectangle 8">
+            <a:extLst>
+              <a:ext uri="{FF2B5EF4-FFF2-40B4-BE49-F238E27FC236}">
+                <a16:creationId xmlns:a16="http://schemas.microsoft.com/office/drawing/2014/main" id="{4A8F1CE5-EF77-4895-9413-B5BFC4CC6FF0}"/>
+              </a:ext>
+            </a:extLst>
+          </p:cNvPr>
+          <p:cNvSpPr/>
+          <p:nvPr/>
+        </p:nvSpPr>
+        <p:spPr>
+          <a:xfrm>
+            <a:off x="4836905" y="3410151"/>
+            <a:ext cx="1156969" cy="476049"/>
+          </a:xfrm>
+          <a:prstGeom prst="rect">
+            <a:avLst/>
+          </a:prstGeom>
+          <a:ln w="19050">
+            <a:solidFill>
+              <a:srgbClr val="7030A0"/>
+            </a:solidFill>
+          </a:ln>
+          <a:effectLst/>
+        </p:spPr>
+        <p:style>
+          <a:lnRef idx="1">
+            <a:schemeClr val="accent4"/>
+          </a:lnRef>
+          <a:fillRef idx="2">
+            <a:schemeClr val="accent4"/>
+          </a:fillRef>
+          <a:effectRef idx="1">
+            <a:schemeClr val="accent4"/>
+          </a:effectRef>
+          <a:fontRef idx="minor">
+            <a:schemeClr val="dk1"/>
+          </a:fontRef>
+        </p:style>
+        <p:txBody>
+          <a:bodyPr rtlCol="0" anchor="ctr"/>
+          <a:lstStyle/>
+          <a:p>
+            <a:pPr algn="ctr"/>
+            <a:r>
+              <a:rPr lang="en-SG" sz="1050" dirty="0" err="1">
+                <a:solidFill>
+                  <a:srgbClr val="7030A0"/>
+                </a:solidFill>
+              </a:rPr>
+              <a:t>FloatingTaskList</a:t>
+            </a:r>
+            <a:endParaRPr lang="en-SG" sz="1050" dirty="0">
+              <a:solidFill>
+                <a:srgbClr val="7030A0"/>
+              </a:solidFill>
+            </a:endParaRPr>
+          </a:p>
+        </p:txBody>
+      </p:sp>
+      <p:cxnSp>
+        <p:nvCxnSpPr>
+          <p:cNvPr id="106" name="Elbow Connector 29">
+            <a:extLst>
+              <a:ext uri="{FF2B5EF4-FFF2-40B4-BE49-F238E27FC236}">
+                <a16:creationId xmlns:a16="http://schemas.microsoft.com/office/drawing/2014/main" id="{014CD831-8474-45B5-A953-0E87A8D1BFCA}"/>
+              </a:ext>
+            </a:extLst>
+          </p:cNvPr>
+          <p:cNvCxnSpPr>
+            <a:cxnSpLocks/>
+            <a:stCxn id="51" idx="3"/>
+            <a:endCxn id="103" idx="1"/>
+          </p:cNvCxnSpPr>
+          <p:nvPr/>
+        </p:nvCxnSpPr>
+        <p:spPr>
+          <a:xfrm>
+            <a:off x="4153221" y="2081272"/>
+            <a:ext cx="683684" cy="1566904"/>
+          </a:xfrm>
+          <a:prstGeom prst="bentConnector3">
+            <a:avLst>
+              <a:gd name="adj1" fmla="val 50000"/>
+            </a:avLst>
+          </a:prstGeom>
+          <a:ln w="19050">
+            <a:solidFill>
+              <a:srgbClr val="7030A0"/>
+            </a:solidFill>
+            <a:headEnd type="none" w="med" len="med"/>
+            <a:tailEnd type="arrow" w="med" len="med"/>
+          </a:ln>
+          <a:effectLst/>
+        </p:spPr>
+        <p:style>
+          <a:lnRef idx="1">
+            <a:schemeClr val="accent2"/>
+          </a:lnRef>
+          <a:fillRef idx="2">
+            <a:schemeClr val="accent2"/>
+          </a:fillRef>
+          <a:effectRef idx="1">
+            <a:schemeClr val="accent2"/>
+          </a:effectRef>
+          <a:fontRef idx="minor">
+            <a:schemeClr val="dk1"/>
+          </a:fontRef>
+        </p:style>
+      </p:cxnSp>
+      <p:cxnSp>
+        <p:nvCxnSpPr>
+          <p:cNvPr id="108" name="Elbow Connector 29">
+            <a:extLst>
+              <a:ext uri="{FF2B5EF4-FFF2-40B4-BE49-F238E27FC236}">
+                <a16:creationId xmlns:a16="http://schemas.microsoft.com/office/drawing/2014/main" id="{FF0147D8-05B1-43A2-91FD-96D842923B11}"/>
+              </a:ext>
+            </a:extLst>
+          </p:cNvPr>
+          <p:cNvCxnSpPr>
+            <a:cxnSpLocks/>
+            <a:stCxn id="51" idx="3"/>
+            <a:endCxn id="102" idx="1"/>
+          </p:cNvCxnSpPr>
+          <p:nvPr/>
+        </p:nvCxnSpPr>
+        <p:spPr>
+          <a:xfrm>
+            <a:off x="4153221" y="2081272"/>
+            <a:ext cx="683684" cy="1003899"/>
+          </a:xfrm>
+          <a:prstGeom prst="bentConnector3">
+            <a:avLst>
+              <a:gd name="adj1" fmla="val 50000"/>
+            </a:avLst>
+          </a:prstGeom>
+          <a:ln w="19050">
+            <a:solidFill>
+              <a:srgbClr val="7030A0"/>
+            </a:solidFill>
+            <a:headEnd type="none" w="med" len="med"/>
+            <a:tailEnd type="arrow" w="med" len="med"/>
+          </a:ln>
+          <a:effectLst/>
+        </p:spPr>
+        <p:style>
+          <a:lnRef idx="1">
+            <a:schemeClr val="accent2"/>
+          </a:lnRef>
+          <a:fillRef idx="2">
+            <a:schemeClr val="accent2"/>
+          </a:fillRef>
+          <a:effectRef idx="1">
+            <a:schemeClr val="accent2"/>
+          </a:effectRef>
+          <a:fontRef idx="minor">
+            <a:schemeClr val="dk1"/>
+          </a:fontRef>
+        </p:style>
+      </p:cxnSp>
+      <p:cxnSp>
+        <p:nvCxnSpPr>
+          <p:cNvPr id="109" name="Elbow Connector 29">
+            <a:extLst>
+              <a:ext uri="{FF2B5EF4-FFF2-40B4-BE49-F238E27FC236}">
+                <a16:creationId xmlns:a16="http://schemas.microsoft.com/office/drawing/2014/main" id="{8D0A22F4-57A2-4BAC-8BD2-4A1F476185C4}"/>
+              </a:ext>
+            </a:extLst>
+          </p:cNvPr>
+          <p:cNvCxnSpPr>
+            <a:cxnSpLocks/>
+            <a:stCxn id="51" idx="3"/>
+          </p:cNvCxnSpPr>
+          <p:nvPr/>
+        </p:nvCxnSpPr>
+        <p:spPr>
+          <a:xfrm>
+            <a:off x="4153221" y="2081272"/>
+            <a:ext cx="687855" cy="322151"/>
+          </a:xfrm>
+          <a:prstGeom prst="bentConnector3">
+            <a:avLst>
+              <a:gd name="adj1" fmla="val 50000"/>
+            </a:avLst>
+          </a:prstGeom>
+          <a:ln w="19050">
+            <a:solidFill>
+              <a:srgbClr val="7030A0"/>
+            </a:solidFill>
+            <a:headEnd type="none" w="med" len="med"/>
+            <a:tailEnd type="arrow" w="med" len="med"/>
+          </a:ln>
+          <a:effectLst/>
+        </p:spPr>
+        <p:style>
+          <a:lnRef idx="1">
+            <a:schemeClr val="accent2"/>
+          </a:lnRef>
+          <a:fillRef idx="2">
+            <a:schemeClr val="accent2"/>
+          </a:fillRef>
+          <a:effectRef idx="1">
+            <a:schemeClr val="accent2"/>
+          </a:effectRef>
+          <a:fontRef idx="minor">
+            <a:schemeClr val="dk1"/>
+          </a:fontRef>
+        </p:style>
+      </p:cxnSp>
+      <p:sp>
+        <p:nvSpPr>
+          <p:cNvPr id="110" name="TextBox 109">
+            <a:extLst>
+              <a:ext uri="{FF2B5EF4-FFF2-40B4-BE49-F238E27FC236}">
+                <a16:creationId xmlns:a16="http://schemas.microsoft.com/office/drawing/2014/main" id="{14E0032F-C669-4A6F-B13A-1CD078CFD018}"/>
+              </a:ext>
+            </a:extLst>
+          </p:cNvPr>
+          <p:cNvSpPr txBox="1"/>
+          <p:nvPr/>
+        </p:nvSpPr>
+        <p:spPr>
+          <a:xfrm>
+            <a:off x="4582923" y="2183517"/>
+            <a:ext cx="189257" cy="178683"/>
+          </a:xfrm>
+          <a:prstGeom prst="rect">
+            <a:avLst/>
+          </a:prstGeom>
+          <a:noFill/>
+        </p:spPr>
+        <p:txBody>
+          <a:bodyPr wrap="square" lIns="0" tIns="0" rIns="0" bIns="0" rtlCol="0">
+            <a:noAutofit/>
+          </a:bodyPr>
+          <a:lstStyle/>
+          <a:p>
+            <a:pPr algn="ctr"/>
+            <a:r>
+              <a:rPr lang="en-US" sz="1100" dirty="0">
+                <a:solidFill>
+                  <a:srgbClr val="7030A0"/>
+                </a:solidFill>
+              </a:rPr>
+              <a:t>1</a:t>
+            </a:r>
+            <a:endParaRPr lang="en-SG" sz="1100" dirty="0">
+              <a:solidFill>
+                <a:srgbClr val="7030A0"/>
+              </a:solidFill>
+            </a:endParaRPr>
+          </a:p>
+        </p:txBody>
+      </p:sp>
+      <p:sp>
+        <p:nvSpPr>
+          <p:cNvPr id="116" name="TextBox 115">
+            <a:extLst>
+              <a:ext uri="{FF2B5EF4-FFF2-40B4-BE49-F238E27FC236}">
+                <a16:creationId xmlns:a16="http://schemas.microsoft.com/office/drawing/2014/main" id="{9D6D18B1-494C-430F-B3B3-D7939FAC6C97}"/>
+              </a:ext>
+            </a:extLst>
+          </p:cNvPr>
+          <p:cNvSpPr txBox="1"/>
+          <p:nvPr/>
+        </p:nvSpPr>
+        <p:spPr>
+          <a:xfrm>
+            <a:off x="4582922" y="2891640"/>
+            <a:ext cx="189257" cy="178683"/>
+          </a:xfrm>
+          <a:prstGeom prst="rect">
+            <a:avLst/>
+          </a:prstGeom>
+          <a:noFill/>
+        </p:spPr>
+        <p:txBody>
+          <a:bodyPr wrap="square" lIns="0" tIns="0" rIns="0" bIns="0" rtlCol="0">
+            <a:noAutofit/>
+          </a:bodyPr>
+          <a:lstStyle/>
+          <a:p>
+            <a:pPr algn="ctr"/>
+            <a:r>
+              <a:rPr lang="en-US" sz="1100" dirty="0">
+                <a:solidFill>
+                  <a:srgbClr val="7030A0"/>
+                </a:solidFill>
+              </a:rPr>
+              <a:t>1</a:t>
+            </a:r>
+            <a:endParaRPr lang="en-SG" sz="1100" dirty="0">
+              <a:solidFill>
+                <a:srgbClr val="7030A0"/>
+              </a:solidFill>
+            </a:endParaRPr>
+          </a:p>
+        </p:txBody>
+      </p:sp>
+      <p:sp>
+        <p:nvSpPr>
+          <p:cNvPr id="121" name="TextBox 120">
+            <a:extLst>
+              <a:ext uri="{FF2B5EF4-FFF2-40B4-BE49-F238E27FC236}">
+                <a16:creationId xmlns:a16="http://schemas.microsoft.com/office/drawing/2014/main" id="{1205EF0B-72A3-4D39-8DFB-C0D4112A9F87}"/>
+              </a:ext>
+            </a:extLst>
+          </p:cNvPr>
+          <p:cNvSpPr txBox="1"/>
+          <p:nvPr/>
+        </p:nvSpPr>
+        <p:spPr>
+          <a:xfrm>
+            <a:off x="4575940" y="3422425"/>
+            <a:ext cx="189257" cy="178683"/>
+          </a:xfrm>
+          <a:prstGeom prst="rect">
+            <a:avLst/>
+          </a:prstGeom>
+          <a:noFill/>
+        </p:spPr>
+        <p:txBody>
+          <a:bodyPr wrap="square" lIns="0" tIns="0" rIns="0" bIns="0" rtlCol="0">
+            <a:noAutofit/>
+          </a:bodyPr>
+          <a:lstStyle/>
+          <a:p>
+            <a:pPr algn="ctr"/>
+            <a:r>
+              <a:rPr lang="en-US" sz="1100" dirty="0">
+                <a:solidFill>
+                  <a:srgbClr val="7030A0"/>
+                </a:solidFill>
+              </a:rPr>
+              <a:t>1</a:t>
+            </a:r>
+            <a:endParaRPr lang="en-SG" sz="1100" dirty="0">
+              <a:solidFill>
+                <a:srgbClr val="7030A0"/>
+              </a:solidFill>
+            </a:endParaRPr>
+          </a:p>
+        </p:txBody>
+      </p:sp>
+      <p:cxnSp>
+        <p:nvCxnSpPr>
+          <p:cNvPr id="125" name="Elbow Connector 63">
+            <a:extLst>
+              <a:ext uri="{FF2B5EF4-FFF2-40B4-BE49-F238E27FC236}">
+                <a16:creationId xmlns:a16="http://schemas.microsoft.com/office/drawing/2014/main" id="{E4272A99-3839-46E7-A606-42180039EDED}"/>
+              </a:ext>
+            </a:extLst>
+          </p:cNvPr>
+          <p:cNvCxnSpPr>
+            <a:cxnSpLocks/>
+          </p:cNvCxnSpPr>
+          <p:nvPr/>
+        </p:nvCxnSpPr>
+        <p:spPr>
+          <a:xfrm>
+            <a:off x="3963174" y="3181011"/>
+            <a:ext cx="864657" cy="561097"/>
+          </a:xfrm>
+          <a:prstGeom prst="bentConnector3">
+            <a:avLst>
+              <a:gd name="adj1" fmla="val 50000"/>
+            </a:avLst>
+          </a:prstGeom>
+          <a:ln w="19050">
+            <a:solidFill>
+              <a:srgbClr val="7030A0"/>
+            </a:solidFill>
+            <a:prstDash val="solid"/>
+            <a:headEnd type="none" w="med" len="med"/>
+            <a:tailEnd type="none" w="med" len="med"/>
+          </a:ln>
+          <a:effectLst/>
+        </p:spPr>
+        <p:style>
+          <a:lnRef idx="1">
+            <a:schemeClr val="accent2"/>
+          </a:lnRef>
+          <a:fillRef idx="2">
+            <a:schemeClr val="accent2"/>
+          </a:fillRef>
+          <a:effectRef idx="1">
+            <a:schemeClr val="accent2"/>
+          </a:effectRef>
+          <a:fontRef idx="minor">
+            <a:schemeClr val="dk1"/>
+          </a:fontRef>
+        </p:style>
+      </p:cxnSp>
+      <p:sp>
+        <p:nvSpPr>
+          <p:cNvPr id="127" name="Flowchart: Decision 96">
+            <a:extLst>
+              <a:ext uri="{FF2B5EF4-FFF2-40B4-BE49-F238E27FC236}">
+                <a16:creationId xmlns:a16="http://schemas.microsoft.com/office/drawing/2014/main" id="{D2B8E737-BBB7-4B8C-BDF8-2EF7A3E1DE44}"/>
+              </a:ext>
+            </a:extLst>
+          </p:cNvPr>
+          <p:cNvSpPr/>
+          <p:nvPr/>
+        </p:nvSpPr>
+        <p:spPr>
+          <a:xfrm>
+            <a:off x="6011342" y="3568728"/>
+            <a:ext cx="236048" cy="173380"/>
+          </a:xfrm>
+          <a:prstGeom prst="flowChartDecision">
+            <a:avLst/>
+          </a:prstGeom>
+          <a:noFill/>
+          <a:ln w="19050">
+            <a:solidFill>
+              <a:srgbClr val="7030A0"/>
+            </a:solidFill>
+          </a:ln>
+          <a:effectLst/>
+        </p:spPr>
+        <p:style>
+          <a:lnRef idx="1">
+            <a:schemeClr val="accent6"/>
+          </a:lnRef>
+          <a:fillRef idx="2">
+            <a:schemeClr val="accent6"/>
+          </a:fillRef>
+          <a:effectRef idx="1">
+            <a:schemeClr val="accent6"/>
+          </a:effectRef>
+          <a:fontRef idx="minor">
+            <a:schemeClr val="dk1"/>
+          </a:fontRef>
+        </p:style>
+        <p:txBody>
+          <a:bodyPr rtlCol="0" anchor="ctr"/>
+          <a:lstStyle/>
+          <a:p>
+            <a:pPr algn="ctr"/>
+            <a:endParaRPr lang="en-US" sz="1050"/>
+          </a:p>
+        </p:txBody>
+      </p:sp>
+      <p:cxnSp>
+        <p:nvCxnSpPr>
+          <p:cNvPr id="128" name="Elbow Connector 63">
+            <a:extLst>
+              <a:ext uri="{FF2B5EF4-FFF2-40B4-BE49-F238E27FC236}">
+                <a16:creationId xmlns:a16="http://schemas.microsoft.com/office/drawing/2014/main" id="{374521C2-65BA-4C6B-99B3-454966DC871F}"/>
+              </a:ext>
+            </a:extLst>
+          </p:cNvPr>
+          <p:cNvCxnSpPr>
+            <a:cxnSpLocks/>
+            <a:stCxn id="127" idx="3"/>
+            <a:endCxn id="62" idx="1"/>
+          </p:cNvCxnSpPr>
+          <p:nvPr/>
+        </p:nvCxnSpPr>
+        <p:spPr>
+          <a:xfrm flipV="1">
+            <a:off x="6247390" y="2155148"/>
+            <a:ext cx="281780" cy="1500270"/>
+          </a:xfrm>
+          <a:prstGeom prst="bentConnector3">
+            <a:avLst/>
+          </a:prstGeom>
+          <a:ln w="19050">
+            <a:solidFill>
+              <a:srgbClr val="7030A0"/>
+            </a:solidFill>
+            <a:headEnd type="none" w="med" len="med"/>
+            <a:tailEnd type="arrow" w="med" len="med"/>
+          </a:ln>
+          <a:effectLst/>
+        </p:spPr>
+        <p:style>
+          <a:lnRef idx="1">
+            <a:schemeClr val="accent2"/>
+          </a:lnRef>
+          <a:fillRef idx="2">
+            <a:schemeClr val="accent2"/>
+          </a:fillRef>
+          <a:effectRef idx="1">
+            <a:schemeClr val="accent2"/>
+          </a:effectRef>
+          <a:fontRef idx="minor">
+            <a:schemeClr val="dk1"/>
+          </a:fontRef>
+        </p:style>
+      </p:cxnSp>
+      <p:sp>
+        <p:nvSpPr>
+          <p:cNvPr id="130" name="Flowchart: Decision 96">
+            <a:extLst>
+              <a:ext uri="{FF2B5EF4-FFF2-40B4-BE49-F238E27FC236}">
+                <a16:creationId xmlns:a16="http://schemas.microsoft.com/office/drawing/2014/main" id="{29550259-9575-4556-85FA-77BF2816480E}"/>
+              </a:ext>
+            </a:extLst>
+          </p:cNvPr>
+          <p:cNvSpPr/>
+          <p:nvPr/>
+        </p:nvSpPr>
+        <p:spPr>
+          <a:xfrm>
+            <a:off x="6011146" y="3001177"/>
+            <a:ext cx="236048" cy="173380"/>
+          </a:xfrm>
+          <a:prstGeom prst="flowChartDecision">
+            <a:avLst/>
+          </a:prstGeom>
+          <a:noFill/>
+          <a:ln w="19050">
+            <a:solidFill>
+              <a:srgbClr val="7030A0"/>
+            </a:solidFill>
+          </a:ln>
+          <a:effectLst/>
+        </p:spPr>
+        <p:style>
+          <a:lnRef idx="1">
+            <a:schemeClr val="accent6"/>
+          </a:lnRef>
+          <a:fillRef idx="2">
+            <a:schemeClr val="accent6"/>
+          </a:fillRef>
+          <a:effectRef idx="1">
+            <a:schemeClr val="accent6"/>
+          </a:effectRef>
+          <a:fontRef idx="minor">
+            <a:schemeClr val="dk1"/>
+          </a:fontRef>
+        </p:style>
+        <p:txBody>
+          <a:bodyPr rtlCol="0" anchor="ctr"/>
+          <a:lstStyle/>
+          <a:p>
+            <a:pPr algn="ctr"/>
+            <a:endParaRPr lang="en-US" sz="1050"/>
+          </a:p>
+        </p:txBody>
+      </p:sp>
+      <p:cxnSp>
+        <p:nvCxnSpPr>
+          <p:cNvPr id="131" name="Elbow Connector 63">
+            <a:extLst>
+              <a:ext uri="{FF2B5EF4-FFF2-40B4-BE49-F238E27FC236}">
+                <a16:creationId xmlns:a16="http://schemas.microsoft.com/office/drawing/2014/main" id="{EB39E71E-810D-4B41-98B2-26F71047CDC8}"/>
+              </a:ext>
+            </a:extLst>
+          </p:cNvPr>
+          <p:cNvCxnSpPr>
+            <a:cxnSpLocks/>
+            <a:stCxn id="130" idx="3"/>
+            <a:endCxn id="62" idx="1"/>
+          </p:cNvCxnSpPr>
+          <p:nvPr/>
+        </p:nvCxnSpPr>
+        <p:spPr>
+          <a:xfrm flipV="1">
+            <a:off x="6247194" y="2155148"/>
+            <a:ext cx="281976" cy="932719"/>
+          </a:xfrm>
+          <a:prstGeom prst="bentConnector3">
+            <a:avLst/>
+          </a:prstGeom>
+          <a:ln w="19050">
+            <a:solidFill>
+              <a:srgbClr val="7030A0"/>
+            </a:solidFill>
+            <a:headEnd type="none" w="med" len="med"/>
+            <a:tailEnd type="arrow" w="med" len="med"/>
+          </a:ln>
+          <a:effectLst/>
+        </p:spPr>
+        <p:style>
+          <a:lnRef idx="1">
+            <a:schemeClr val="accent2"/>
+          </a:lnRef>
+          <a:fillRef idx="2">
+            <a:schemeClr val="accent2"/>
+          </a:fillRef>
+          <a:effectRef idx="1">
+            <a:schemeClr val="accent2"/>
+          </a:effectRef>
+          <a:fontRef idx="minor">
+            <a:schemeClr val="dk1"/>
+          </a:fontRef>
+        </p:style>
+      </p:cxnSp>
+      <p:sp>
+        <p:nvSpPr>
+          <p:cNvPr id="132" name="Flowchart: Decision 96">
+            <a:extLst>
+              <a:ext uri="{FF2B5EF4-FFF2-40B4-BE49-F238E27FC236}">
+                <a16:creationId xmlns:a16="http://schemas.microsoft.com/office/drawing/2014/main" id="{94A79EB7-80BA-4FBB-9C94-4480E40AF89C}"/>
+              </a:ext>
+            </a:extLst>
+          </p:cNvPr>
+          <p:cNvSpPr/>
+          <p:nvPr/>
+        </p:nvSpPr>
+        <p:spPr>
+          <a:xfrm>
+            <a:off x="5999067" y="2443393"/>
+            <a:ext cx="236048" cy="173380"/>
+          </a:xfrm>
+          <a:prstGeom prst="flowChartDecision">
+            <a:avLst/>
+          </a:prstGeom>
+          <a:noFill/>
+          <a:ln w="19050">
+            <a:solidFill>
+              <a:srgbClr val="7030A0"/>
+            </a:solidFill>
+          </a:ln>
+          <a:effectLst/>
+        </p:spPr>
+        <p:style>
+          <a:lnRef idx="1">
+            <a:schemeClr val="accent6"/>
+          </a:lnRef>
+          <a:fillRef idx="2">
+            <a:schemeClr val="accent6"/>
+          </a:fillRef>
+          <a:effectRef idx="1">
+            <a:schemeClr val="accent6"/>
+          </a:effectRef>
+          <a:fontRef idx="minor">
+            <a:schemeClr val="dk1"/>
+          </a:fontRef>
+        </p:style>
+        <p:txBody>
+          <a:bodyPr rtlCol="0" anchor="ctr"/>
+          <a:lstStyle/>
+          <a:p>
+            <a:pPr algn="ctr"/>
+            <a:endParaRPr lang="en-US" sz="1050"/>
+          </a:p>
+        </p:txBody>
+      </p:sp>
+      <p:cxnSp>
+        <p:nvCxnSpPr>
+          <p:cNvPr id="133" name="Elbow Connector 63">
+            <a:extLst>
+              <a:ext uri="{FF2B5EF4-FFF2-40B4-BE49-F238E27FC236}">
+                <a16:creationId xmlns:a16="http://schemas.microsoft.com/office/drawing/2014/main" id="{26376927-F58A-48A5-B14D-FD12DFD768F8}"/>
+              </a:ext>
+            </a:extLst>
+          </p:cNvPr>
+          <p:cNvCxnSpPr>
+            <a:cxnSpLocks/>
+            <a:stCxn id="132" idx="3"/>
+            <a:endCxn id="62" idx="1"/>
+          </p:cNvCxnSpPr>
+          <p:nvPr/>
+        </p:nvCxnSpPr>
+        <p:spPr>
+          <a:xfrm flipV="1">
+            <a:off x="6235115" y="2155148"/>
+            <a:ext cx="294055" cy="374935"/>
+          </a:xfrm>
+          <a:prstGeom prst="bentConnector3">
+            <a:avLst/>
+          </a:prstGeom>
+          <a:ln w="19050">
+            <a:solidFill>
+              <a:srgbClr val="7030A0"/>
+            </a:solidFill>
+            <a:headEnd type="none" w="med" len="med"/>
+            <a:tailEnd type="arrow" w="med" len="med"/>
+          </a:ln>
+          <a:effectLst/>
+        </p:spPr>
+        <p:style>
+          <a:lnRef idx="1">
+            <a:schemeClr val="accent2"/>
+          </a:lnRef>
+          <a:fillRef idx="2">
+            <a:schemeClr val="accent2"/>
+          </a:fillRef>
+          <a:effectRef idx="1">
+            <a:schemeClr val="accent2"/>
+          </a:effectRef>
+          <a:fontRef idx="minor">
+            <a:schemeClr val="dk1"/>
+          </a:fontRef>
+        </p:style>
+      </p:cxnSp>
+      <p:sp>
+        <p:nvSpPr>
+          <p:cNvPr id="138" name="Isosceles Triangle 102">
+            <a:extLst>
+              <a:ext uri="{FF2B5EF4-FFF2-40B4-BE49-F238E27FC236}">
+                <a16:creationId xmlns:a16="http://schemas.microsoft.com/office/drawing/2014/main" id="{C405A132-B740-400A-9F71-C6A22C29B147}"/>
+              </a:ext>
+            </a:extLst>
+          </p:cNvPr>
+          <p:cNvSpPr/>
+          <p:nvPr/>
+        </p:nvSpPr>
+        <p:spPr>
+          <a:xfrm>
+            <a:off x="3218128" y="1602759"/>
+            <a:ext cx="270504" cy="175523"/>
+          </a:xfrm>
+          <a:prstGeom prst="triangle">
+            <a:avLst/>
+          </a:prstGeom>
+          <a:solidFill>
+            <a:srgbClr val="7030A0"/>
+          </a:solidFill>
+          <a:ln w="19050">
+            <a:solidFill>
+              <a:srgbClr val="7030A0"/>
+            </a:solidFill>
+          </a:ln>
+          <a:effectLst/>
+        </p:spPr>
+        <p:style>
+          <a:lnRef idx="1">
+            <a:schemeClr val="accent6"/>
+          </a:lnRef>
+          <a:fillRef idx="2">
+            <a:schemeClr val="accent6"/>
+          </a:fillRef>
+          <a:effectRef idx="1">
+            <a:schemeClr val="accent6"/>
+          </a:effectRef>
+          <a:fontRef idx="minor">
+            <a:schemeClr val="dk1"/>
+          </a:fontRef>
+        </p:style>
+        <p:txBody>
+          <a:bodyPr rtlCol="0" anchor="ctr"/>
+          <a:lstStyle/>
+          <a:p>
+            <a:pPr algn="ctr"/>
+            <a:endParaRPr lang="en-SG" sz="1050"/>
+          </a:p>
+        </p:txBody>
+      </p:sp>
+      <p:sp>
+        <p:nvSpPr>
+          <p:cNvPr id="115" name="Isosceles Triangle 102">
+            <a:extLst>
+              <a:ext uri="{FF2B5EF4-FFF2-40B4-BE49-F238E27FC236}">
+                <a16:creationId xmlns:a16="http://schemas.microsoft.com/office/drawing/2014/main" id="{E503DD09-E729-4510-AC1D-BB2C3C1A7DEA}"/>
+              </a:ext>
+            </a:extLst>
+          </p:cNvPr>
+          <p:cNvSpPr/>
+          <p:nvPr/>
+        </p:nvSpPr>
+        <p:spPr>
+          <a:xfrm rot="16200000">
+            <a:off x="4681253" y="4138517"/>
+            <a:ext cx="270504" cy="175523"/>
+          </a:xfrm>
+          <a:prstGeom prst="triangle">
+            <a:avLst/>
+          </a:prstGeom>
+          <a:solidFill>
+            <a:srgbClr val="7030A0"/>
+          </a:solidFill>
+          <a:ln w="19050">
+            <a:solidFill>
+              <a:srgbClr val="7030A0"/>
+            </a:solidFill>
+          </a:ln>
+          <a:effectLst/>
+        </p:spPr>
+        <p:style>
+          <a:lnRef idx="1">
+            <a:schemeClr val="accent6"/>
+          </a:lnRef>
+          <a:fillRef idx="2">
+            <a:schemeClr val="accent6"/>
+          </a:fillRef>
+          <a:effectRef idx="1">
+            <a:schemeClr val="accent6"/>
+          </a:effectRef>
+          <a:fontRef idx="minor">
+            <a:schemeClr val="dk1"/>
+          </a:fontRef>
+        </p:style>
+        <p:txBody>
+          <a:bodyPr rtlCol="0" anchor="ctr"/>
+          <a:lstStyle/>
+          <a:p>
+            <a:pPr algn="ctr"/>
+            <a:endParaRPr lang="en-SG" sz="1050"/>
+          </a:p>
+        </p:txBody>
+      </p:sp>
+      <p:sp>
+        <p:nvSpPr>
+          <p:cNvPr id="139" name="Isosceles Triangle 102">
+            <a:extLst>
+              <a:ext uri="{FF2B5EF4-FFF2-40B4-BE49-F238E27FC236}">
+                <a16:creationId xmlns:a16="http://schemas.microsoft.com/office/drawing/2014/main" id="{7EB10A3D-1FBF-428D-96DB-009E1EC6B9BB}"/>
+              </a:ext>
+            </a:extLst>
+          </p:cNvPr>
+          <p:cNvSpPr/>
+          <p:nvPr/>
+        </p:nvSpPr>
+        <p:spPr>
+          <a:xfrm rot="5400000" flipV="1">
+            <a:off x="3745192" y="3092705"/>
+            <a:ext cx="270504" cy="175523"/>
+          </a:xfrm>
+          <a:prstGeom prst="triangle">
+            <a:avLst/>
+          </a:prstGeom>
+          <a:ln w="19050">
+            <a:solidFill>
+              <a:srgbClr val="7030A0"/>
+            </a:solidFill>
+          </a:ln>
+          <a:effectLst/>
+        </p:spPr>
+        <p:style>
+          <a:lnRef idx="1">
+            <a:schemeClr val="accent4"/>
+          </a:lnRef>
+          <a:fillRef idx="2">
+            <a:schemeClr val="accent4"/>
+          </a:fillRef>
+          <a:effectRef idx="1">
+            <a:schemeClr val="accent4"/>
+          </a:effectRef>
+          <a:fontRef idx="minor">
+            <a:schemeClr val="dk1"/>
+          </a:fontRef>
+        </p:style>
+        <p:txBody>
+          <a:bodyPr rtlCol="0" anchor="ctr"/>
+          <a:lstStyle/>
+          <a:p>
+            <a:pPr algn="ctr"/>
+            <a:endParaRPr lang="en-SG" sz="1050" b="1">
+              <a:solidFill>
+                <a:srgbClr val="92D050"/>
+              </a:solidFill>
+            </a:endParaRPr>
+          </a:p>
+        </p:txBody>
+      </p:sp>
+      <p:cxnSp>
+        <p:nvCxnSpPr>
+          <p:cNvPr id="111" name="Elbow Connector 63">
+            <a:extLst>
+              <a:ext uri="{FF2B5EF4-FFF2-40B4-BE49-F238E27FC236}">
+                <a16:creationId xmlns:a16="http://schemas.microsoft.com/office/drawing/2014/main" id="{3EAC6062-FC92-44FF-950F-6E2016012F78}"/>
+              </a:ext>
+            </a:extLst>
+          </p:cNvPr>
+          <p:cNvCxnSpPr>
+            <a:cxnSpLocks/>
+            <a:stCxn id="62" idx="2"/>
+            <a:endCxn id="115" idx="3"/>
+          </p:cNvCxnSpPr>
+          <p:nvPr/>
+        </p:nvCxnSpPr>
+        <p:spPr>
+          <a:xfrm rot="5400000">
+            <a:off x="5005678" y="2227118"/>
+            <a:ext cx="1897751" cy="2100571"/>
+          </a:xfrm>
+          <a:prstGeom prst="bentConnector2">
+            <a:avLst/>
+          </a:prstGeom>
+          <a:ln w="19050">
+            <a:solidFill>
+              <a:srgbClr val="7030A0"/>
+            </a:solidFill>
+            <a:prstDash val="sysDot"/>
+            <a:headEnd type="none" w="med" len="med"/>
+            <a:tailEnd type="none" w="med" len="med"/>
+          </a:ln>
+          <a:effectLst/>
+        </p:spPr>
+        <p:style>
+          <a:lnRef idx="1">
+            <a:schemeClr val="accent2"/>
+          </a:lnRef>
+          <a:fillRef idx="2">
+            <a:schemeClr val="accent2"/>
+          </a:fillRef>
+          <a:effectRef idx="1">
+            <a:schemeClr val="accent2"/>
+          </a:effectRef>
+          <a:fontRef idx="minor">
+            <a:schemeClr val="dk1"/>
+          </a:fontRef>
+        </p:style>
+      </p:cxnSp>
+      <p:cxnSp>
+        <p:nvCxnSpPr>
+          <p:cNvPr id="123" name="Elbow Connector 63">
+            <a:extLst>
+              <a:ext uri="{FF2B5EF4-FFF2-40B4-BE49-F238E27FC236}">
+                <a16:creationId xmlns:a16="http://schemas.microsoft.com/office/drawing/2014/main" id="{3F1E1C5F-4AAB-4BAC-985F-016261F7AD19}"/>
+              </a:ext>
+            </a:extLst>
+          </p:cNvPr>
+          <p:cNvCxnSpPr>
+            <a:cxnSpLocks/>
+            <a:stCxn id="139" idx="3"/>
+          </p:cNvCxnSpPr>
+          <p:nvPr/>
+        </p:nvCxnSpPr>
+        <p:spPr>
+          <a:xfrm>
+            <a:off x="3968206" y="3180467"/>
+            <a:ext cx="859625" cy="544"/>
+          </a:xfrm>
+          <a:prstGeom prst="bentConnector3">
+            <a:avLst>
+              <a:gd name="adj1" fmla="val 50000"/>
+            </a:avLst>
+          </a:prstGeom>
+          <a:ln w="19050">
+            <a:solidFill>
+              <a:srgbClr val="7030A0"/>
+            </a:solidFill>
+            <a:prstDash val="solid"/>
+            <a:headEnd type="none" w="med" len="med"/>
+            <a:tailEnd type="none" w="med" len="med"/>
+          </a:ln>
+          <a:effectLst/>
+        </p:spPr>
+        <p:style>
+          <a:lnRef idx="1">
+            <a:schemeClr val="accent2"/>
+          </a:lnRef>
+          <a:fillRef idx="2">
+            <a:schemeClr val="accent2"/>
+          </a:fillRef>
+          <a:effectRef idx="1">
+            <a:schemeClr val="accent2"/>
+          </a:effectRef>
+          <a:fontRef idx="minor">
+            <a:schemeClr val="dk1"/>
+          </a:fontRef>
+        </p:style>
+      </p:cxnSp>
+      <p:sp>
+        <p:nvSpPr>
+          <p:cNvPr id="126" name="Rectangle 8">
+            <a:extLst>
+              <a:ext uri="{FF2B5EF4-FFF2-40B4-BE49-F238E27FC236}">
+                <a16:creationId xmlns:a16="http://schemas.microsoft.com/office/drawing/2014/main" id="{E895CE26-762D-4FE3-92C5-E40C1E7C9AB3}"/>
+              </a:ext>
+            </a:extLst>
+          </p:cNvPr>
+          <p:cNvSpPr/>
+          <p:nvPr/>
+        </p:nvSpPr>
+        <p:spPr>
+          <a:xfrm>
+            <a:off x="1640299" y="3958394"/>
+            <a:ext cx="1146688" cy="535027"/>
+          </a:xfrm>
+          <a:prstGeom prst="rect">
+            <a:avLst/>
+          </a:prstGeom>
+          <a:ln w="19050">
+            <a:solidFill>
+              <a:srgbClr val="7030A0"/>
+            </a:solidFill>
+          </a:ln>
+          <a:effectLst/>
+        </p:spPr>
+        <p:style>
+          <a:lnRef idx="1">
+            <a:schemeClr val="accent4"/>
+          </a:lnRef>
+          <a:fillRef idx="2">
+            <a:schemeClr val="accent4"/>
+          </a:fillRef>
+          <a:effectRef idx="1">
+            <a:schemeClr val="accent4"/>
+          </a:effectRef>
+          <a:fontRef idx="minor">
+            <a:schemeClr val="dk1"/>
+          </a:fontRef>
+        </p:style>
+        <p:txBody>
+          <a:bodyPr rtlCol="0" anchor="ctr"/>
+          <a:lstStyle/>
+          <a:p>
+            <a:pPr algn="ctr"/>
+            <a:r>
+              <a:rPr lang="en-US" sz="1050" dirty="0" err="1">
+                <a:solidFill>
+                  <a:srgbClr val="7030A0"/>
+                </a:solidFill>
+              </a:rPr>
+              <a:t>javafx.collections.transformation</a:t>
+            </a:r>
+            <a:endParaRPr lang="en-US" sz="1050" dirty="0">
+              <a:solidFill>
+                <a:srgbClr val="7030A0"/>
+              </a:solidFill>
+            </a:endParaRPr>
+          </a:p>
+          <a:p>
+            <a:pPr algn="ctr"/>
+            <a:r>
+              <a:rPr lang="en-US" sz="1050" dirty="0">
+                <a:solidFill>
+                  <a:srgbClr val="7030A0"/>
+                </a:solidFill>
+              </a:rPr>
+              <a:t>.</a:t>
+            </a:r>
+            <a:r>
+              <a:rPr lang="en-US" sz="1050" dirty="0" err="1">
+                <a:solidFill>
+                  <a:srgbClr val="7030A0"/>
+                </a:solidFill>
+              </a:rPr>
+              <a:t>FilteredList</a:t>
+            </a:r>
+            <a:endParaRPr lang="en-SG" sz="1050" dirty="0">
+              <a:solidFill>
+                <a:srgbClr val="7030A0"/>
+              </a:solidFill>
+            </a:endParaRPr>
+          </a:p>
+        </p:txBody>
+      </p:sp>
+      <p:cxnSp>
+        <p:nvCxnSpPr>
+          <p:cNvPr id="140" name="Elbow Connector 106">
+            <a:extLst>
+              <a:ext uri="{FF2B5EF4-FFF2-40B4-BE49-F238E27FC236}">
+                <a16:creationId xmlns:a16="http://schemas.microsoft.com/office/drawing/2014/main" id="{BF83FBE8-488A-472A-8F15-95B10D9050A2}"/>
+              </a:ext>
+            </a:extLst>
+          </p:cNvPr>
+          <p:cNvCxnSpPr>
+            <a:cxnSpLocks/>
+            <a:stCxn id="126" idx="3"/>
+            <a:endCxn id="72" idx="1"/>
+          </p:cNvCxnSpPr>
+          <p:nvPr/>
+        </p:nvCxnSpPr>
+        <p:spPr>
+          <a:xfrm>
+            <a:off x="2786987" y="4225908"/>
+            <a:ext cx="896373" cy="372"/>
+          </a:xfrm>
+          <a:prstGeom prst="bentConnector3">
+            <a:avLst>
+              <a:gd name="adj1" fmla="val 50000"/>
+            </a:avLst>
+          </a:prstGeom>
+          <a:ln w="19050">
+            <a:solidFill>
+              <a:srgbClr val="7030A0"/>
+            </a:solidFill>
+            <a:prstDash val="solid"/>
+            <a:headEnd type="none" w="med" len="med"/>
+            <a:tailEnd type="arrow" w="med" len="med"/>
+          </a:ln>
+          <a:effectLst/>
+        </p:spPr>
+        <p:style>
+          <a:lnRef idx="1">
+            <a:schemeClr val="accent2"/>
+          </a:lnRef>
+          <a:fillRef idx="2">
+            <a:schemeClr val="accent2"/>
+          </a:fillRef>
+          <a:effectRef idx="1">
+            <a:schemeClr val="accent2"/>
+          </a:effectRef>
+          <a:fontRef idx="minor">
+            <a:schemeClr val="dk1"/>
+          </a:fontRef>
+        </p:style>
+      </p:cxnSp>
+      <p:sp>
+        <p:nvSpPr>
+          <p:cNvPr id="142" name="TextBox 141">
+            <a:extLst>
+              <a:ext uri="{FF2B5EF4-FFF2-40B4-BE49-F238E27FC236}">
+                <a16:creationId xmlns:a16="http://schemas.microsoft.com/office/drawing/2014/main" id="{92EBB965-AEB9-4887-A96E-F0EE124EB42F}"/>
+              </a:ext>
+            </a:extLst>
+          </p:cNvPr>
+          <p:cNvSpPr txBox="1"/>
+          <p:nvPr/>
+        </p:nvSpPr>
+        <p:spPr>
+          <a:xfrm>
+            <a:off x="3414059" y="4038600"/>
+            <a:ext cx="189257" cy="178683"/>
+          </a:xfrm>
+          <a:prstGeom prst="rect">
+            <a:avLst/>
+          </a:prstGeom>
+          <a:noFill/>
+        </p:spPr>
+        <p:txBody>
+          <a:bodyPr wrap="square" lIns="0" tIns="0" rIns="0" bIns="0" rtlCol="0">
+            <a:noAutofit/>
+          </a:bodyPr>
+          <a:lstStyle/>
+          <a:p>
+            <a:pPr algn="ctr"/>
+            <a:r>
+              <a:rPr lang="en-SG" sz="1100" dirty="0">
+                <a:solidFill>
+                  <a:srgbClr val="7030A0"/>
+                </a:solidFill>
+              </a:rPr>
+              <a:t>*</a:t>
+            </a:r>
+          </a:p>
+        </p:txBody>
+      </p:sp>
+      <p:cxnSp>
+        <p:nvCxnSpPr>
+          <p:cNvPr id="89" name="Elbow Connector 63">
+            <a:extLst>
+              <a:ext uri="{FF2B5EF4-FFF2-40B4-BE49-F238E27FC236}">
+                <a16:creationId xmlns:a16="http://schemas.microsoft.com/office/drawing/2014/main" id="{757B8828-27CE-4427-AB91-A272F8DA53D0}"/>
+              </a:ext>
+            </a:extLst>
+          </p:cNvPr>
+          <p:cNvCxnSpPr>
+            <a:cxnSpLocks/>
+            <a:stCxn id="139" idx="3"/>
+          </p:cNvCxnSpPr>
+          <p:nvPr/>
+        </p:nvCxnSpPr>
+        <p:spPr>
+          <a:xfrm flipV="1">
+            <a:off x="3968206" y="2695332"/>
+            <a:ext cx="856620" cy="485135"/>
+          </a:xfrm>
+          <a:prstGeom prst="bentConnector3">
+            <a:avLst>
+              <a:gd name="adj1" fmla="val 50000"/>
+            </a:avLst>
+          </a:prstGeom>
+          <a:ln w="19050">
+            <a:solidFill>
+              <a:srgbClr val="7030A0"/>
+            </a:solidFill>
+            <a:prstDash val="solid"/>
+            <a:headEnd type="none" w="med" len="med"/>
+            <a:tailEnd type="none" w="med" len="med"/>
+          </a:ln>
+          <a:effectLst/>
+        </p:spPr>
+        <p:style>
+          <a:lnRef idx="1">
+            <a:schemeClr val="accent2"/>
+          </a:lnRef>
+          <a:fillRef idx="2">
+            <a:schemeClr val="accent2"/>
+          </a:fillRef>
+          <a:effectRef idx="1">
+            <a:schemeClr val="accent2"/>
+          </a:effectRef>
+          <a:fontRef idx="minor">
+            <a:schemeClr val="dk1"/>
+          </a:fontRef>
+        </p:style>
+      </p:cxnSp>
+      <p:sp>
+        <p:nvSpPr>
+          <p:cNvPr id="95" name="Rectangle 8">
+            <a:extLst>
+              <a:ext uri="{FF2B5EF4-FFF2-40B4-BE49-F238E27FC236}">
+                <a16:creationId xmlns:a16="http://schemas.microsoft.com/office/drawing/2014/main" id="{D11190CF-84F1-43D8-842C-0F704C362AC1}"/>
+              </a:ext>
+            </a:extLst>
+          </p:cNvPr>
+          <p:cNvSpPr/>
+          <p:nvPr/>
+        </p:nvSpPr>
+        <p:spPr>
+          <a:xfrm>
+            <a:off x="4648560" y="5641218"/>
+            <a:ext cx="1099150" cy="377140"/>
+          </a:xfrm>
+          <a:prstGeom prst="rect">
+            <a:avLst/>
+          </a:prstGeom>
+          <a:ln w="19050">
+            <a:solidFill>
+              <a:srgbClr val="7030A0"/>
+            </a:solidFill>
+          </a:ln>
+          <a:effectLst/>
+        </p:spPr>
+        <p:style>
+          <a:lnRef idx="1">
+            <a:schemeClr val="accent4"/>
+          </a:lnRef>
+          <a:fillRef idx="2">
+            <a:schemeClr val="accent4"/>
+          </a:fillRef>
+          <a:effectRef idx="1">
+            <a:schemeClr val="accent4"/>
+          </a:effectRef>
+          <a:fontRef idx="minor">
+            <a:schemeClr val="dk1"/>
+          </a:fontRef>
+        </p:style>
+        <p:txBody>
+          <a:bodyPr rtlCol="0" anchor="ctr"/>
+          <a:lstStyle/>
+          <a:p>
+            <a:pPr algn="ctr"/>
+            <a:r>
+              <a:rPr lang="en-US" sz="1050" dirty="0">
+                <a:solidFill>
+                  <a:srgbClr val="7030A0"/>
+                </a:solidFill>
+              </a:rPr>
+              <a:t>&lt;&lt;interface&gt;&gt;</a:t>
+            </a:r>
+          </a:p>
+          <a:p>
+            <a:pPr algn="ctr"/>
+            <a:r>
+              <a:rPr lang="en-US" sz="1050" dirty="0" err="1">
+                <a:solidFill>
+                  <a:srgbClr val="7030A0"/>
+                </a:solidFill>
+              </a:rPr>
+              <a:t>OverdueCapable</a:t>
+            </a:r>
+            <a:endParaRPr lang="en-SG" sz="1050" dirty="0">
+              <a:solidFill>
+                <a:srgbClr val="7030A0"/>
+              </a:solidFill>
+            </a:endParaRPr>
+          </a:p>
+        </p:txBody>
+      </p:sp>
+      <p:sp>
+        <p:nvSpPr>
+          <p:cNvPr id="96" name="Isosceles Triangle 102">
+            <a:extLst>
+              <a:ext uri="{FF2B5EF4-FFF2-40B4-BE49-F238E27FC236}">
+                <a16:creationId xmlns:a16="http://schemas.microsoft.com/office/drawing/2014/main" id="{A65E0C52-5206-46DE-B54D-1FAACD215357}"/>
+              </a:ext>
+            </a:extLst>
+          </p:cNvPr>
+          <p:cNvSpPr/>
+          <p:nvPr/>
+        </p:nvSpPr>
+        <p:spPr>
+          <a:xfrm rot="5400000" flipV="1">
+            <a:off x="5719131" y="5737901"/>
+            <a:ext cx="270504" cy="175523"/>
+          </a:xfrm>
+          <a:prstGeom prst="triangle">
+            <a:avLst/>
+          </a:prstGeom>
+          <a:solidFill>
+            <a:srgbClr val="7030A0"/>
+          </a:solidFill>
+          <a:ln w="19050">
+            <a:solidFill>
+              <a:srgbClr val="7030A0"/>
+            </a:solidFill>
+          </a:ln>
+          <a:effectLst/>
+        </p:spPr>
+        <p:style>
+          <a:lnRef idx="1">
+            <a:schemeClr val="accent4"/>
+          </a:lnRef>
+          <a:fillRef idx="2">
+            <a:schemeClr val="accent4"/>
+          </a:fillRef>
+          <a:effectRef idx="1">
+            <a:schemeClr val="accent4"/>
+          </a:effectRef>
+          <a:fontRef idx="minor">
+            <a:schemeClr val="dk1"/>
+          </a:fontRef>
+        </p:style>
+        <p:txBody>
+          <a:bodyPr rtlCol="0" anchor="ctr"/>
+          <a:lstStyle/>
+          <a:p>
+            <a:pPr algn="ctr"/>
+            <a:endParaRPr lang="en-SG" sz="1050" b="1">
+              <a:solidFill>
+                <a:srgbClr val="92D050"/>
+              </a:solidFill>
+            </a:endParaRPr>
+          </a:p>
+        </p:txBody>
+      </p:sp>
+      <p:cxnSp>
+        <p:nvCxnSpPr>
+          <p:cNvPr id="99" name="Elbow Connector 63">
+            <a:extLst>
+              <a:ext uri="{FF2B5EF4-FFF2-40B4-BE49-F238E27FC236}">
+                <a16:creationId xmlns:a16="http://schemas.microsoft.com/office/drawing/2014/main" id="{1A40DD81-A9E7-4CAF-BC25-3EE36E21651F}"/>
+              </a:ext>
+            </a:extLst>
+          </p:cNvPr>
+          <p:cNvCxnSpPr>
+            <a:cxnSpLocks/>
+            <a:stCxn id="96" idx="3"/>
+            <a:endCxn id="77" idx="2"/>
+          </p:cNvCxnSpPr>
+          <p:nvPr/>
+        </p:nvCxnSpPr>
+        <p:spPr>
+          <a:xfrm flipV="1">
+            <a:off x="5942145" y="5192158"/>
+            <a:ext cx="658976" cy="633505"/>
+          </a:xfrm>
+          <a:prstGeom prst="bentConnector2">
+            <a:avLst/>
+          </a:prstGeom>
+          <a:ln w="19050">
+            <a:solidFill>
+              <a:srgbClr val="7030A0"/>
+            </a:solidFill>
+            <a:prstDash val="sysDot"/>
+            <a:headEnd type="none" w="med" len="med"/>
+            <a:tailEnd type="none" w="med" len="med"/>
+          </a:ln>
+          <a:effectLst/>
+        </p:spPr>
+        <p:style>
+          <a:lnRef idx="1">
+            <a:schemeClr val="accent2"/>
+          </a:lnRef>
+          <a:fillRef idx="2">
+            <a:schemeClr val="accent2"/>
+          </a:fillRef>
+          <a:effectRef idx="1">
+            <a:schemeClr val="accent2"/>
+          </a:effectRef>
+          <a:fontRef idx="minor">
+            <a:schemeClr val="dk1"/>
+          </a:fontRef>
+        </p:style>
+      </p:cxnSp>
+      <p:cxnSp>
+        <p:nvCxnSpPr>
+          <p:cNvPr id="114" name="Elbow Connector 63">
+            <a:extLst>
+              <a:ext uri="{FF2B5EF4-FFF2-40B4-BE49-F238E27FC236}">
+                <a16:creationId xmlns:a16="http://schemas.microsoft.com/office/drawing/2014/main" id="{F581BE59-CB2A-4E09-BEEA-CD82754F6E5A}"/>
+              </a:ext>
+            </a:extLst>
+          </p:cNvPr>
+          <p:cNvCxnSpPr>
+            <a:cxnSpLocks/>
+            <a:stCxn id="96" idx="3"/>
+            <a:endCxn id="87" idx="2"/>
+          </p:cNvCxnSpPr>
+          <p:nvPr/>
+        </p:nvCxnSpPr>
+        <p:spPr>
+          <a:xfrm flipV="1">
+            <a:off x="5942145" y="5576231"/>
+            <a:ext cx="1325985" cy="249432"/>
+          </a:xfrm>
+          <a:prstGeom prst="bentConnector2">
+            <a:avLst/>
+          </a:prstGeom>
+          <a:ln w="19050">
+            <a:solidFill>
+              <a:srgbClr val="7030A0"/>
+            </a:solidFill>
+            <a:prstDash val="sysDot"/>
+            <a:headEnd type="none" w="med" len="med"/>
+            <a:tailEnd type="none" w="med" len="med"/>
+          </a:ln>
+          <a:effectLst/>
+        </p:spPr>
+        <p:style>
+          <a:lnRef idx="1">
+            <a:schemeClr val="accent2"/>
+          </a:lnRef>
+          <a:fillRef idx="2">
+            <a:schemeClr val="accent2"/>
+          </a:fillRef>
+          <a:effectRef idx="1">
+            <a:schemeClr val="accent2"/>
+          </a:effectRef>
+          <a:fontRef idx="minor">
+            <a:schemeClr val="dk1"/>
+          </a:fontRef>
+        </p:style>
+      </p:cxnSp>
+    </p:spTree>
+    <p:extLst>
+      <p:ext uri="{BB962C8B-B14F-4D97-AF65-F5344CB8AC3E}">
+        <p14:creationId xmlns:p14="http://schemas.microsoft.com/office/powerpoint/2010/main" val="1673096792"/>
       </p:ext>
     </p:extLst>
   </p:cSld>

</xml_diff>